<commit_message>
prop_iop.tex \subsubsection{Sates Consistent with a QIVPM Induced by the Born Rule} Updating...
</commit_message>
<xml_diff>
--- a/prop_letter.pptx
+++ b/prop_letter.pptx
@@ -5,17 +5,18 @@
     <p:sldMasterId id="2147483648" r:id="rId1"/>
   </p:sldMasterIdLst>
   <p:notesMasterIdLst>
-    <p:notesMasterId r:id="rId7"/>
+    <p:notesMasterId r:id="rId8"/>
   </p:notesMasterIdLst>
   <p:handoutMasterIdLst>
-    <p:handoutMasterId r:id="rId8"/>
+    <p:handoutMasterId r:id="rId9"/>
   </p:handoutMasterIdLst>
   <p:sldIdLst>
     <p:sldId id="256" r:id="rId2"/>
-    <p:sldId id="261" r:id="rId3"/>
-    <p:sldId id="257" r:id="rId4"/>
-    <p:sldId id="259" r:id="rId5"/>
-    <p:sldId id="260" r:id="rId6"/>
+    <p:sldId id="262" r:id="rId3"/>
+    <p:sldId id="261" r:id="rId4"/>
+    <p:sldId id="257" r:id="rId5"/>
+    <p:sldId id="259" r:id="rId6"/>
+    <p:sldId id="260" r:id="rId7"/>
   </p:sldIdLst>
   <p:sldSz cx="12192000" cy="6858000"/>
   <p:notesSz cx="6858000" cy="9144000"/>
@@ -115,6 +116,28 @@
     </a:lvl9pPr>
   </p:defaultTextStyle>
   <p:extLst>
+    <p:ext uri="{521415D9-36F7-43E2-AB2F-B90AF26B5E84}">
+      <p14:sectionLst xmlns:p14="http://schemas.microsoft.com/office/powerpoint/2010/main">
+        <p14:section name="Title" id="{1E12A82F-F0E3-4461-BE5B-707C8CA2F141}">
+          <p14:sldIdLst>
+            <p14:sldId id="256"/>
+          </p14:sldIdLst>
+        </p14:section>
+        <p14:section name="Interval-Valued Quantum Probabilities" id="{B11F37AE-DE06-4D02-9F44-498792825247}">
+          <p14:sldIdLst>
+            <p14:sldId id="262"/>
+            <p14:sldId id="261"/>
+          </p14:sldIdLst>
+        </p14:section>
+        <p14:section name="Kochen-Specker Theorem" id="{267E8203-33DC-4F7A-9CD7-887DDB8FDDB2}">
+          <p14:sldIdLst>
+            <p14:sldId id="257"/>
+            <p14:sldId id="259"/>
+            <p14:sldId id="260"/>
+          </p14:sldIdLst>
+        </p14:section>
+      </p14:sectionLst>
+    </p:ext>
     <p:ext uri="{EFAFB233-063F-42B5-8137-9DF3F51BA10A}">
       <p15:sldGuideLst xmlns:p15="http://schemas.microsoft.com/office/powerpoint/2012/main"/>
     </p:ext>
@@ -204,7 +227,7 @@
           <a:p>
             <a:fld id="{FE3023B1-3AFF-46C4-97DC-7BEE883CD9D8}" type="datetimeFigureOut">
               <a:rPr lang="en-US" smtClean="0"/>
-              <a:t>6/26/2017</a:t>
+              <a:t>6/30/2017</a:t>
             </a:fld>
             <a:endParaRPr lang="en-US"/>
           </a:p>
@@ -369,7 +392,7 @@
           <a:p>
             <a:fld id="{384BE3C3-7DB8-44EE-9555-F40C087B77CA}" type="datetimeFigureOut">
               <a:rPr lang="en-US" smtClean="0"/>
-              <a:t>6/26/2017</a:t>
+              <a:t>6/30/2017</a:t>
             </a:fld>
             <a:endParaRPr lang="en-US"/>
           </a:p>
@@ -811,7 +834,7 @@
           <a:p>
             <a:fld id="{553141C9-E3AF-4773-84E5-4C6860670B56}" type="slidenum">
               <a:rPr lang="en-US" smtClean="0"/>
-              <a:t>2</a:t>
+              <a:t>3</a:t>
             </a:fld>
             <a:endParaRPr lang="en-US"/>
           </a:p>
@@ -895,7 +918,7 @@
           <a:p>
             <a:fld id="{553141C9-E3AF-4773-84E5-4C6860670B56}" type="slidenum">
               <a:rPr lang="en-US" smtClean="0"/>
-              <a:t>3</a:t>
+              <a:t>4</a:t>
             </a:fld>
             <a:endParaRPr lang="en-US"/>
           </a:p>
@@ -979,7 +1002,7 @@
           <a:p>
             <a:fld id="{553141C9-E3AF-4773-84E5-4C6860670B56}" type="slidenum">
               <a:rPr lang="en-US" smtClean="0"/>
-              <a:t>4</a:t>
+              <a:t>5</a:t>
             </a:fld>
             <a:endParaRPr lang="en-US"/>
           </a:p>
@@ -1063,7 +1086,7 @@
           <a:p>
             <a:fld id="{553141C9-E3AF-4773-84E5-4C6860670B56}" type="slidenum">
               <a:rPr lang="en-US" smtClean="0"/>
-              <a:t>5</a:t>
+              <a:t>6</a:t>
             </a:fld>
             <a:endParaRPr lang="en-US"/>
           </a:p>
@@ -1213,7 +1236,7 @@
           <a:p>
             <a:fld id="{D1C3BEE1-3E90-49E5-9A2E-FAD1B5091927}" type="datetimeFigureOut">
               <a:rPr lang="en-US" smtClean="0"/>
-              <a:t>6/26/2017</a:t>
+              <a:t>6/30/2017</a:t>
             </a:fld>
             <a:endParaRPr lang="en-US"/>
           </a:p>
@@ -1383,7 +1406,7 @@
           <a:p>
             <a:fld id="{D1C3BEE1-3E90-49E5-9A2E-FAD1B5091927}" type="datetimeFigureOut">
               <a:rPr lang="en-US" smtClean="0"/>
-              <a:t>6/26/2017</a:t>
+              <a:t>6/30/2017</a:t>
             </a:fld>
             <a:endParaRPr lang="en-US"/>
           </a:p>
@@ -1563,7 +1586,7 @@
           <a:p>
             <a:fld id="{D1C3BEE1-3E90-49E5-9A2E-FAD1B5091927}" type="datetimeFigureOut">
               <a:rPr lang="en-US" smtClean="0"/>
-              <a:t>6/26/2017</a:t>
+              <a:t>6/30/2017</a:t>
             </a:fld>
             <a:endParaRPr lang="en-US"/>
           </a:p>
@@ -1733,7 +1756,7 @@
           <a:p>
             <a:fld id="{D1C3BEE1-3E90-49E5-9A2E-FAD1B5091927}" type="datetimeFigureOut">
               <a:rPr lang="en-US" smtClean="0"/>
-              <a:t>6/26/2017</a:t>
+              <a:t>6/30/2017</a:t>
             </a:fld>
             <a:endParaRPr lang="en-US"/>
           </a:p>
@@ -1979,7 +2002,7 @@
           <a:p>
             <a:fld id="{D1C3BEE1-3E90-49E5-9A2E-FAD1B5091927}" type="datetimeFigureOut">
               <a:rPr lang="en-US" smtClean="0"/>
-              <a:t>6/26/2017</a:t>
+              <a:t>6/30/2017</a:t>
             </a:fld>
             <a:endParaRPr lang="en-US"/>
           </a:p>
@@ -2211,7 +2234,7 @@
           <a:p>
             <a:fld id="{D1C3BEE1-3E90-49E5-9A2E-FAD1B5091927}" type="datetimeFigureOut">
               <a:rPr lang="en-US" smtClean="0"/>
-              <a:t>6/26/2017</a:t>
+              <a:t>6/30/2017</a:t>
             </a:fld>
             <a:endParaRPr lang="en-US"/>
           </a:p>
@@ -2578,7 +2601,7 @@
           <a:p>
             <a:fld id="{D1C3BEE1-3E90-49E5-9A2E-FAD1B5091927}" type="datetimeFigureOut">
               <a:rPr lang="en-US" smtClean="0"/>
-              <a:t>6/26/2017</a:t>
+              <a:t>6/30/2017</a:t>
             </a:fld>
             <a:endParaRPr lang="en-US"/>
           </a:p>
@@ -2696,7 +2719,7 @@
           <a:p>
             <a:fld id="{D1C3BEE1-3E90-49E5-9A2E-FAD1B5091927}" type="datetimeFigureOut">
               <a:rPr lang="en-US" smtClean="0"/>
-              <a:t>6/26/2017</a:t>
+              <a:t>6/30/2017</a:t>
             </a:fld>
             <a:endParaRPr lang="en-US"/>
           </a:p>
@@ -2791,7 +2814,7 @@
           <a:p>
             <a:fld id="{D1C3BEE1-3E90-49E5-9A2E-FAD1B5091927}" type="datetimeFigureOut">
               <a:rPr lang="en-US" smtClean="0"/>
-              <a:t>6/26/2017</a:t>
+              <a:t>6/30/2017</a:t>
             </a:fld>
             <a:endParaRPr lang="en-US"/>
           </a:p>
@@ -3068,7 +3091,7 @@
           <a:p>
             <a:fld id="{D1C3BEE1-3E90-49E5-9A2E-FAD1B5091927}" type="datetimeFigureOut">
               <a:rPr lang="en-US" smtClean="0"/>
-              <a:t>6/26/2017</a:t>
+              <a:t>6/30/2017</a:t>
             </a:fld>
             <a:endParaRPr lang="en-US"/>
           </a:p>
@@ -3321,7 +3344,7 @@
           <a:p>
             <a:fld id="{D1C3BEE1-3E90-49E5-9A2E-FAD1B5091927}" type="datetimeFigureOut">
               <a:rPr lang="en-US" smtClean="0"/>
-              <a:t>6/26/2017</a:t>
+              <a:t>6/30/2017</a:t>
             </a:fld>
             <a:endParaRPr lang="en-US"/>
           </a:p>
@@ -3534,7 +3557,7 @@
           <a:p>
             <a:fld id="{D1C3BEE1-3E90-49E5-9A2E-FAD1B5091927}" type="datetimeFigureOut">
               <a:rPr lang="en-US" smtClean="0"/>
-              <a:t>6/26/2017</a:t>
+              <a:t>6/30/2017</a:t>
             </a:fld>
             <a:endParaRPr lang="en-US"/>
           </a:p>
@@ -3951,12 +3974,18 @@
         </p:nvSpPr>
         <p:spPr/>
         <p:txBody>
-          <a:bodyPr/>
+          <a:bodyPr>
+            <a:normAutofit/>
+          </a:bodyPr>
           <a:lstStyle/>
           <a:p>
+            <a:r>
+              <a:rPr lang="en-US" dirty="0"/>
+              <a:t>Interval-Valued Quantum </a:t>
+            </a:r>
             <a:r>
               <a:rPr lang="en-US" dirty="0" smtClean="0"/>
-              <a:t>Kochen-Specker Theorem in QIVPM</a:t>
+              <a:t>Probabilities</a:t>
             </a:r>
             <a:endParaRPr lang="en-US" dirty="0"/>
           </a:p>
@@ -3977,7 +4006,11 @@
           <a:bodyPr/>
           <a:lstStyle/>
           <a:p>
-            <a:endParaRPr lang="en-US"/>
+            <a:r>
+              <a:rPr lang="en-US" dirty="0"/>
+              <a:t>Contextuality and the Born Rule</a:t>
+            </a:r>
+            <a:endParaRPr lang="en-US" dirty="0"/>
           </a:p>
         </p:txBody>
       </p:sp>
@@ -4002,6 +4035,994 @@
 </file>
 
 <file path=ppt/slides/slide2.xml><?xml version="1.0" encoding="utf-8"?>
+<p:sld xmlns:a="http://schemas.openxmlformats.org/drawingml/2006/main" xmlns:r="http://schemas.openxmlformats.org/officeDocument/2006/relationships" xmlns:p="http://schemas.openxmlformats.org/presentationml/2006/main">
+  <p:cSld>
+    <p:spTree>
+      <p:nvGrpSpPr>
+        <p:cNvPr id="1" name=""/>
+        <p:cNvGrpSpPr/>
+        <p:nvPr/>
+      </p:nvGrpSpPr>
+      <p:grpSpPr>
+        <a:xfrm>
+          <a:off x="0" y="0"/>
+          <a:ext cx="0" cy="0"/>
+          <a:chOff x="0" y="0"/>
+          <a:chExt cx="0" cy="0"/>
+        </a:xfrm>
+      </p:grpSpPr>
+      <p:sp>
+        <p:nvSpPr>
+          <p:cNvPr id="2" name="Title 1"/>
+          <p:cNvSpPr>
+            <a:spLocks noGrp="1"/>
+          </p:cNvSpPr>
+          <p:nvPr>
+            <p:ph type="title"/>
+          </p:nvPr>
+        </p:nvSpPr>
+        <p:spPr/>
+        <p:txBody>
+          <a:bodyPr/>
+          <a:lstStyle/>
+          <a:p>
+            <a:r>
+              <a:rPr lang="en-US" dirty="0" smtClean="0"/>
+              <a:t>Probability Models</a:t>
+            </a:r>
+            <a:endParaRPr lang="en-US" dirty="0"/>
+          </a:p>
+        </p:txBody>
+      </p:sp>
+      <mc:AlternateContent xmlns:mc="http://schemas.openxmlformats.org/markup-compatibility/2006">
+        <mc:Choice xmlns:a14="http://schemas.microsoft.com/office/drawing/2010/main" Requires="a14">
+          <p:graphicFrame>
+            <p:nvGraphicFramePr>
+              <p:cNvPr id="4" name="Content Placeholder 3"/>
+              <p:cNvGraphicFramePr>
+                <a:graphicFrameLocks noGrp="1"/>
+              </p:cNvGraphicFramePr>
+              <p:nvPr>
+                <p:ph idx="1"/>
+                <p:extLst>
+                  <p:ext uri="{D42A27DB-BD31-4B8C-83A1-F6EECF244321}">
+                    <p14:modId xmlns:p14="http://schemas.microsoft.com/office/powerpoint/2010/main" val="2198624936"/>
+                  </p:ext>
+                </p:extLst>
+              </p:nvPr>
+            </p:nvGraphicFramePr>
+            <p:xfrm>
+              <a:off x="838200" y="1825625"/>
+              <a:ext cx="10515600" cy="2565400"/>
+            </p:xfrm>
+            <a:graphic>
+              <a:graphicData uri="http://schemas.openxmlformats.org/drawingml/2006/table">
+                <a:tbl>
+                  <a:tblPr firstRow="1" bandRow="1">
+                    <a:tableStyleId>{5C22544A-7EE6-4342-B048-85BDC9FD1C3A}</a:tableStyleId>
+                  </a:tblPr>
+                  <a:tblGrid>
+                    <a:gridCol w="3505200"/>
+                    <a:gridCol w="3505200"/>
+                    <a:gridCol w="3505200"/>
+                  </a:tblGrid>
+                  <a:tr h="370840">
+                    <a:tc>
+                      <a:txBody>
+                        <a:bodyPr/>
+                        <a:lstStyle/>
+                        <a:p>
+                          <a:pPr algn="ctr"/>
+                          <a:endParaRPr lang="en-US" dirty="0"/>
+                        </a:p>
+                      </a:txBody>
+                      <a:tcPr anchor="ctr"/>
+                    </a:tc>
+                    <a:tc>
+                      <a:txBody>
+                        <a:bodyPr/>
+                        <a:lstStyle/>
+                        <a:p>
+                          <a:pPr algn="ctr"/>
+                          <a:r>
+                            <a:rPr lang="en-US" dirty="0" smtClean="0"/>
+                            <a:t>Classical</a:t>
+                          </a:r>
+                          <a:endParaRPr lang="en-US" dirty="0"/>
+                        </a:p>
+                      </a:txBody>
+                      <a:tcPr anchor="ctr"/>
+                    </a:tc>
+                    <a:tc>
+                      <a:txBody>
+                        <a:bodyPr/>
+                        <a:lstStyle/>
+                        <a:p>
+                          <a:pPr algn="ctr"/>
+                          <a:r>
+                            <a:rPr lang="en-US" dirty="0" smtClean="0"/>
+                            <a:t>Quantum</a:t>
+                          </a:r>
+                          <a:endParaRPr lang="en-US" dirty="0"/>
+                        </a:p>
+                      </a:txBody>
+                      <a:tcPr anchor="ctr"/>
+                    </a:tc>
+                  </a:tr>
+                  <a:tr h="370840">
+                    <a:tc>
+                      <a:txBody>
+                        <a:bodyPr/>
+                        <a:lstStyle/>
+                        <a:p>
+                          <a:pPr algn="ctr"/>
+                          <a:endParaRPr lang="en-US" dirty="0"/>
+                        </a:p>
+                      </a:txBody>
+                      <a:tcPr anchor="ctr"/>
+                    </a:tc>
+                    <a:tc>
+                      <a:txBody>
+                        <a:bodyPr/>
+                        <a:lstStyle/>
+                        <a:p>
+                          <a:pPr algn="ctr"/>
+                          <a:r>
+                            <a:rPr lang="en-US" dirty="0" smtClean="0"/>
+                            <a:t>Sample Space: Set </a:t>
+                          </a:r>
+                          <a14:m>
+                            <m:oMath xmlns:m="http://schemas.openxmlformats.org/officeDocument/2006/math">
+                              <m:r>
+                                <m:rPr>
+                                  <m:sty m:val="p"/>
+                                </m:rPr>
+                                <a:rPr lang="el-GR" i="1" smtClean="0">
+                                  <a:latin typeface="Cambria Math" panose="02040503050406030204" pitchFamily="18" charset="0"/>
+                                  <a:ea typeface="Cambria Math" panose="02040503050406030204" pitchFamily="18" charset="0"/>
+                                </a:rPr>
+                                <m:t>Ω</m:t>
+                              </m:r>
+                            </m:oMath>
+                          </a14:m>
+                          <a:endParaRPr lang="en-US" dirty="0" smtClean="0"/>
+                        </a:p>
+                        <a:p>
+                          <a:pPr marL="0" marR="0" lvl="0" indent="0" algn="ctr" defTabSz="914400" rtl="0" eaLnBrk="1" fontAlgn="auto" latinLnBrk="0" hangingPunct="1">
+                            <a:lnSpc>
+                              <a:spcPct val="100000"/>
+                            </a:lnSpc>
+                            <a:spcBef>
+                              <a:spcPts val="0"/>
+                            </a:spcBef>
+                            <a:spcAft>
+                              <a:spcPts val="0"/>
+                            </a:spcAft>
+                            <a:buClrTx/>
+                            <a:buSzTx/>
+                            <a:buFontTx/>
+                            <a:buNone/>
+                            <a:tabLst/>
+                            <a:defRPr/>
+                          </a:pPr>
+                          <a:r>
+                            <a:rPr lang="en-US" dirty="0" smtClean="0"/>
+                            <a:t>Event Space: Power Set </a:t>
+                          </a:r>
+                          <a14:m>
+                            <m:oMath xmlns:m="http://schemas.openxmlformats.org/officeDocument/2006/math">
+                              <m:r>
+                                <a:rPr lang="en-US" b="0" i="1" smtClean="0">
+                                  <a:latin typeface="Cambria Math" panose="02040503050406030204" pitchFamily="18" charset="0"/>
+                                  <a:ea typeface="Cambria Math" panose="02040503050406030204" pitchFamily="18" charset="0"/>
+                                </a:rPr>
+                                <m:t>ℰ</m:t>
+                              </m:r>
+                              <m:r>
+                                <a:rPr lang="en-US" b="0" i="0" smtClean="0">
+                                  <a:latin typeface="Cambria Math" panose="02040503050406030204" pitchFamily="18" charset="0"/>
+                                  <a:ea typeface="Cambria Math" panose="02040503050406030204" pitchFamily="18" charset="0"/>
+                                </a:rPr>
+                                <m:t>=</m:t>
+                              </m:r>
+                              <m:sSup>
+                                <m:sSupPr>
+                                  <m:ctrlPr>
+                                    <a:rPr lang="en-US" b="0" i="1" smtClean="0">
+                                      <a:latin typeface="Cambria Math" panose="02040503050406030204" pitchFamily="18" charset="0"/>
+                                      <a:ea typeface="Cambria Math" panose="02040503050406030204" pitchFamily="18" charset="0"/>
+                                    </a:rPr>
+                                  </m:ctrlPr>
+                                </m:sSupPr>
+                                <m:e>
+                                  <m:r>
+                                    <a:rPr lang="en-US" b="0" i="0" smtClean="0">
+                                      <a:latin typeface="Cambria Math" panose="02040503050406030204" pitchFamily="18" charset="0"/>
+                                      <a:ea typeface="Cambria Math" panose="02040503050406030204" pitchFamily="18" charset="0"/>
+                                    </a:rPr>
+                                    <m:t>2</m:t>
+                                  </m:r>
+                                </m:e>
+                                <m:sup>
+                                  <m:r>
+                                    <m:rPr>
+                                      <m:sty m:val="p"/>
+                                    </m:rPr>
+                                    <a:rPr lang="el-GR" i="1" smtClean="0">
+                                      <a:latin typeface="Cambria Math" panose="02040503050406030204" pitchFamily="18" charset="0"/>
+                                      <a:ea typeface="Cambria Math" panose="02040503050406030204" pitchFamily="18" charset="0"/>
+                                    </a:rPr>
+                                    <m:t>Ω</m:t>
+                                  </m:r>
+                                </m:sup>
+                              </m:sSup>
+                            </m:oMath>
+                          </a14:m>
+                          <a:endParaRPr lang="en-US" dirty="0"/>
+                        </a:p>
+                      </a:txBody>
+                      <a:tcPr anchor="ctr"/>
+                    </a:tc>
+                    <a:tc>
+                      <a:txBody>
+                        <a:bodyPr/>
+                        <a:lstStyle/>
+                        <a:p>
+                          <a:pPr algn="ctr"/>
+                          <a:r>
+                            <a:rPr lang="en-US" dirty="0" smtClean="0"/>
+                            <a:t>Hilbert Space </a:t>
+                          </a:r>
+                          <a14:m>
+                            <m:oMath xmlns:m="http://schemas.openxmlformats.org/officeDocument/2006/math">
+                              <m:r>
+                                <a:rPr lang="el-GR" i="1" smtClean="0">
+                                  <a:latin typeface="Cambria Math" panose="02040503050406030204" pitchFamily="18" charset="0"/>
+                                  <a:ea typeface="Cambria Math" panose="02040503050406030204" pitchFamily="18" charset="0"/>
+                                </a:rPr>
+                                <m:t>ℋ</m:t>
+                              </m:r>
+                            </m:oMath>
+                          </a14:m>
+                          <a:endParaRPr lang="en-US" dirty="0" smtClean="0"/>
+                        </a:p>
+                        <a:p>
+                          <a:pPr marL="0" marR="0" lvl="0" indent="0" algn="ctr" defTabSz="914400" rtl="0" eaLnBrk="1" fontAlgn="auto" latinLnBrk="0" hangingPunct="1">
+                            <a:lnSpc>
+                              <a:spcPct val="100000"/>
+                            </a:lnSpc>
+                            <a:spcBef>
+                              <a:spcPts val="0"/>
+                            </a:spcBef>
+                            <a:spcAft>
+                              <a:spcPts val="0"/>
+                            </a:spcAft>
+                            <a:buClrTx/>
+                            <a:buSzTx/>
+                            <a:buFontTx/>
+                            <a:buNone/>
+                            <a:tabLst/>
+                            <a:defRPr/>
+                          </a:pPr>
+                          <a:r>
+                            <a:rPr lang="en-US" dirty="0" smtClean="0"/>
+                            <a:t>Event Space: </a:t>
+                          </a:r>
+                          <a14:m>
+                            <m:oMath xmlns:m="http://schemas.openxmlformats.org/officeDocument/2006/math">
+                              <m:r>
+                                <a:rPr lang="en-US" b="0" i="1" smtClean="0">
+                                  <a:latin typeface="Cambria Math" panose="02040503050406030204" pitchFamily="18" charset="0"/>
+                                  <a:ea typeface="Cambria Math" panose="02040503050406030204" pitchFamily="18" charset="0"/>
+                                </a:rPr>
+                                <m:t>ℰ</m:t>
+                              </m:r>
+                              <m:r>
+                                <a:rPr lang="en-US" b="0" i="1" smtClean="0">
+                                  <a:latin typeface="Cambria Math" panose="02040503050406030204" pitchFamily="18" charset="0"/>
+                                  <a:ea typeface="Cambria Math" panose="02040503050406030204" pitchFamily="18" charset="0"/>
+                                </a:rPr>
+                                <m:t>=</m:t>
+                              </m:r>
+                              <m:d>
+                                <m:dPr>
+                                  <m:begChr m:val="{"/>
+                                  <m:endChr m:val="}"/>
+                                  <m:ctrlPr>
+                                    <a:rPr lang="en-US" b="0" i="1" smtClean="0">
+                                      <a:latin typeface="Cambria Math" panose="02040503050406030204" pitchFamily="18" charset="0"/>
+                                      <a:ea typeface="Cambria Math" panose="02040503050406030204" pitchFamily="18" charset="0"/>
+                                    </a:rPr>
+                                  </m:ctrlPr>
+                                </m:dPr>
+                                <m:e>
+                                  <m:r>
+                                    <m:rPr>
+                                      <m:nor/>
+                                    </m:rPr>
+                                    <a:rPr lang="en-US" b="0" i="0" smtClean="0">
+                                      <a:latin typeface="Cambria Math" panose="02040503050406030204" pitchFamily="18" charset="0"/>
+                                      <a:ea typeface="Cambria Math" panose="02040503050406030204" pitchFamily="18" charset="0"/>
+                                    </a:rPr>
+                                    <m:t>all</m:t>
+                                  </m:r>
+                                  <m:r>
+                                    <m:rPr>
+                                      <m:nor/>
+                                    </m:rPr>
+                                    <a:rPr lang="en-US" b="0" i="0" smtClean="0">
+                                      <a:latin typeface="Cambria Math" panose="02040503050406030204" pitchFamily="18" charset="0"/>
+                                      <a:ea typeface="Cambria Math" panose="02040503050406030204" pitchFamily="18" charset="0"/>
+                                    </a:rPr>
+                                    <m:t> </m:t>
+                                  </m:r>
+                                  <m:r>
+                                    <m:rPr>
+                                      <m:nor/>
+                                    </m:rPr>
+                                    <a:rPr lang="en-US" b="0" i="0" smtClean="0">
+                                      <a:latin typeface="Cambria Math" panose="02040503050406030204" pitchFamily="18" charset="0"/>
+                                      <a:ea typeface="Cambria Math" panose="02040503050406030204" pitchFamily="18" charset="0"/>
+                                    </a:rPr>
+                                    <m:t>projectors</m:t>
+                                  </m:r>
+                                  <m:r>
+                                    <m:rPr>
+                                      <m:nor/>
+                                    </m:rPr>
+                                    <a:rPr lang="en-US" b="0" i="0" smtClean="0">
+                                      <a:latin typeface="Cambria Math" panose="02040503050406030204" pitchFamily="18" charset="0"/>
+                                      <a:ea typeface="Cambria Math" panose="02040503050406030204" pitchFamily="18" charset="0"/>
+                                    </a:rPr>
+                                    <m:t> </m:t>
+                                  </m:r>
+                                  <m:r>
+                                    <m:rPr>
+                                      <m:nor/>
+                                    </m:rPr>
+                                    <a:rPr lang="en-US" b="0" i="0" smtClean="0">
+                                      <a:latin typeface="Cambria Math" panose="02040503050406030204" pitchFamily="18" charset="0"/>
+                                      <a:ea typeface="Cambria Math" panose="02040503050406030204" pitchFamily="18" charset="0"/>
+                                    </a:rPr>
+                                    <m:t>on</m:t>
+                                  </m:r>
+                                  <m:r>
+                                    <m:rPr>
+                                      <m:nor/>
+                                    </m:rPr>
+                                    <a:rPr lang="en-US" b="0" i="0" smtClean="0">
+                                      <a:latin typeface="Cambria Math" panose="02040503050406030204" pitchFamily="18" charset="0"/>
+                                      <a:ea typeface="Cambria Math" panose="02040503050406030204" pitchFamily="18" charset="0"/>
+                                    </a:rPr>
+                                    <m:t> </m:t>
+                                  </m:r>
+                                  <m:r>
+                                    <m:rPr>
+                                      <m:nor/>
+                                    </m:rPr>
+                                    <a:rPr lang="en-US" smtClean="0">
+                                      <a:effectLst/>
+                                    </a:rPr>
+                                    <m:t>a</m:t>
+                                  </m:r>
+                                  <m:r>
+                                    <m:rPr>
+                                      <m:nor/>
+                                    </m:rPr>
+                                    <a:rPr lang="en-US" smtClean="0">
+                                      <a:effectLst/>
+                                    </a:rPr>
+                                    <m:t> </m:t>
+                                  </m:r>
+                                  <m:r>
+                                    <m:rPr>
+                                      <m:nor/>
+                                    </m:rPr>
+                                    <a:rPr lang="en-US" smtClean="0">
+                                      <a:effectLst/>
+                                    </a:rPr>
+                                    <m:t>linear</m:t>
+                                  </m:r>
+                                  <m:r>
+                                    <m:rPr>
+                                      <m:nor/>
+                                    </m:rPr>
+                                    <a:rPr lang="en-US" smtClean="0">
+                                      <a:effectLst/>
+                                    </a:rPr>
+                                    <m:t> </m:t>
+                                  </m:r>
+                                  <m:r>
+                                    <m:rPr>
+                                      <m:nor/>
+                                    </m:rPr>
+                                    <a:rPr lang="en-US" smtClean="0">
+                                      <a:effectLst/>
+                                    </a:rPr>
+                                    <m:t>subspace</m:t>
+                                  </m:r>
+                                  <m:r>
+                                    <m:rPr>
+                                      <m:nor/>
+                                    </m:rPr>
+                                    <a:rPr lang="en-US" smtClean="0">
+                                      <a:effectLst/>
+                                    </a:rPr>
+                                    <m:t> </m:t>
+                                  </m:r>
+                                  <m:r>
+                                    <m:rPr>
+                                      <m:nor/>
+                                    </m:rPr>
+                                    <a:rPr lang="en-US" smtClean="0">
+                                      <a:effectLst/>
+                                    </a:rPr>
+                                    <m:t>of</m:t>
+                                  </m:r>
+                                  <m:r>
+                                    <m:rPr>
+                                      <m:nor/>
+                                    </m:rPr>
+                                    <a:rPr lang="en-US" b="0" i="0" smtClean="0">
+                                      <a:effectLst/>
+                                    </a:rPr>
+                                    <m:t> </m:t>
+                                  </m:r>
+                                  <m:r>
+                                    <a:rPr lang="el-GR" i="1" smtClean="0">
+                                      <a:latin typeface="Cambria Math" panose="02040503050406030204" pitchFamily="18" charset="0"/>
+                                      <a:ea typeface="Cambria Math" panose="02040503050406030204" pitchFamily="18" charset="0"/>
+                                    </a:rPr>
+                                    <m:t>ℋ</m:t>
+                                  </m:r>
+                                </m:e>
+                              </m:d>
+                            </m:oMath>
+                          </a14:m>
+                          <a:endParaRPr lang="en-US" dirty="0"/>
+                        </a:p>
+                      </a:txBody>
+                      <a:tcPr anchor="ctr"/>
+                    </a:tc>
+                  </a:tr>
+                  <a:tr h="370840">
+                    <a:tc>
+                      <a:txBody>
+                        <a:bodyPr/>
+                        <a:lstStyle/>
+                        <a:p>
+                          <a:pPr algn="ctr"/>
+                          <a:r>
+                            <a:rPr lang="en-US" dirty="0" smtClean="0"/>
+                            <a:t>Real-valued</a:t>
+                          </a:r>
+                        </a:p>
+                        <a:p>
+                          <a:pPr algn="ctr"/>
+                          <a14:m>
+                            <m:oMathPara xmlns:m="http://schemas.openxmlformats.org/officeDocument/2006/math">
+                              <m:oMathParaPr>
+                                <m:jc m:val="centerGroup"/>
+                              </m:oMathParaPr>
+                              <m:oMath xmlns:m="http://schemas.openxmlformats.org/officeDocument/2006/math">
+                                <m:d>
+                                  <m:dPr>
+                                    <m:begChr m:val="["/>
+                                    <m:endChr m:val="]"/>
+                                    <m:ctrlPr>
+                                      <a:rPr lang="en-US" b="0" i="1" smtClean="0">
+                                        <a:latin typeface="Cambria Math" panose="02040503050406030204" pitchFamily="18" charset="0"/>
+                                        <a:ea typeface="Cambria Math" panose="02040503050406030204" pitchFamily="18" charset="0"/>
+                                      </a:rPr>
+                                    </m:ctrlPr>
+                                  </m:dPr>
+                                  <m:e>
+                                    <m:r>
+                                      <a:rPr lang="en-US" b="0" i="1" smtClean="0">
+                                        <a:latin typeface="Cambria Math" panose="02040503050406030204" pitchFamily="18" charset="0"/>
+                                        <a:ea typeface="Cambria Math" panose="02040503050406030204" pitchFamily="18" charset="0"/>
+                                      </a:rPr>
+                                      <m:t>0,1</m:t>
+                                    </m:r>
+                                  </m:e>
+                                </m:d>
+                              </m:oMath>
+                            </m:oMathPara>
+                          </a14:m>
+                          <a:endParaRPr lang="en-US" dirty="0"/>
+                        </a:p>
+                      </a:txBody>
+                      <a:tcPr anchor="ctr"/>
+                    </a:tc>
+                    <a:tc>
+                      <a:txBody>
+                        <a:bodyPr/>
+                        <a:lstStyle/>
+                        <a:p>
+                          <a:pPr algn="ctr"/>
+                          <a14:m>
+                            <m:oMathPara xmlns:m="http://schemas.openxmlformats.org/officeDocument/2006/math">
+                              <m:oMathParaPr>
+                                <m:jc m:val="centerGroup"/>
+                              </m:oMathParaPr>
+                              <m:oMath xmlns:m="http://schemas.openxmlformats.org/officeDocument/2006/math">
+                                <m:r>
+                                  <a:rPr lang="en-US" b="0" i="1" smtClean="0">
+                                    <a:latin typeface="Cambria Math" panose="02040503050406030204" pitchFamily="18" charset="0"/>
+                                  </a:rPr>
+                                  <m:t>𝜇</m:t>
+                                </m:r>
+                                <m:r>
+                                  <a:rPr lang="en-US" b="0" i="1" smtClean="0">
+                                    <a:latin typeface="Cambria Math" panose="02040503050406030204" pitchFamily="18" charset="0"/>
+                                  </a:rPr>
+                                  <m:t>:</m:t>
+                                </m:r>
+                                <m:r>
+                                  <a:rPr lang="en-US" b="0" i="1" smtClean="0">
+                                    <a:latin typeface="Cambria Math" panose="02040503050406030204" pitchFamily="18" charset="0"/>
+                                    <a:ea typeface="Cambria Math" panose="02040503050406030204" pitchFamily="18" charset="0"/>
+                                  </a:rPr>
+                                  <m:t>ℰ</m:t>
+                                </m:r>
+                                <m:r>
+                                  <a:rPr lang="en-US" b="0" i="0" smtClean="0">
+                                    <a:latin typeface="Cambria Math" panose="02040503050406030204" pitchFamily="18" charset="0"/>
+                                    <a:ea typeface="Cambria Math" panose="02040503050406030204" pitchFamily="18" charset="0"/>
+                                  </a:rPr>
+                                  <m:t>→</m:t>
+                                </m:r>
+                                <m:d>
+                                  <m:dPr>
+                                    <m:begChr m:val="["/>
+                                    <m:endChr m:val="]"/>
+                                    <m:ctrlPr>
+                                      <a:rPr lang="en-US" b="0" i="0" smtClean="0">
+                                        <a:latin typeface="Cambria Math" panose="02040503050406030204" pitchFamily="18" charset="0"/>
+                                        <a:ea typeface="Cambria Math" panose="02040503050406030204" pitchFamily="18" charset="0"/>
+                                      </a:rPr>
+                                    </m:ctrlPr>
+                                  </m:dPr>
+                                  <m:e>
+                                    <m:r>
+                                      <a:rPr lang="en-US" b="0" i="1" smtClean="0">
+                                        <a:latin typeface="Cambria Math" panose="02040503050406030204" pitchFamily="18" charset="0"/>
+                                        <a:ea typeface="Cambria Math" panose="02040503050406030204" pitchFamily="18" charset="0"/>
+                                      </a:rPr>
+                                      <m:t>0,1</m:t>
+                                    </m:r>
+                                  </m:e>
+                                </m:d>
+                              </m:oMath>
+                            </m:oMathPara>
+                          </a14:m>
+                          <a:endParaRPr lang="en-US" dirty="0"/>
+                        </a:p>
+                      </a:txBody>
+                      <a:tcPr anchor="ctr"/>
+                    </a:tc>
+                    <a:tc>
+                      <a:txBody>
+                        <a:bodyPr/>
+                        <a:lstStyle/>
+                        <a:p>
+                          <a:pPr algn="ctr"/>
+                          <a:endParaRPr lang="en-US" dirty="0"/>
+                        </a:p>
+                      </a:txBody>
+                      <a:tcPr anchor="ctr"/>
+                    </a:tc>
+                  </a:tr>
+                  <a:tr h="370840">
+                    <a:tc>
+                      <a:txBody>
+                        <a:bodyPr/>
+                        <a:lstStyle/>
+                        <a:p>
+                          <a:pPr marL="0" marR="0" lvl="0" indent="0" algn="ctr" defTabSz="914400" rtl="0" eaLnBrk="1" fontAlgn="auto" latinLnBrk="0" hangingPunct="1">
+                            <a:lnSpc>
+                              <a:spcPct val="100000"/>
+                            </a:lnSpc>
+                            <a:spcBef>
+                              <a:spcPts val="0"/>
+                            </a:spcBef>
+                            <a:spcAft>
+                              <a:spcPts val="0"/>
+                            </a:spcAft>
+                            <a:buClrTx/>
+                            <a:buSzTx/>
+                            <a:buFontTx/>
+                            <a:buNone/>
+                            <a:tabLst/>
+                            <a:defRPr/>
+                          </a:pPr>
+                          <a:r>
+                            <a:rPr lang="en-US" dirty="0" smtClean="0"/>
+                            <a:t>Interval-valued</a:t>
+                          </a:r>
+                        </a:p>
+                        <a:p>
+                          <a:pPr marL="0" marR="0" lvl="0" indent="0" algn="ctr" defTabSz="914400" rtl="0" eaLnBrk="1" fontAlgn="auto" latinLnBrk="0" hangingPunct="1">
+                            <a:lnSpc>
+                              <a:spcPct val="100000"/>
+                            </a:lnSpc>
+                            <a:spcBef>
+                              <a:spcPts val="0"/>
+                            </a:spcBef>
+                            <a:spcAft>
+                              <a:spcPts val="0"/>
+                            </a:spcAft>
+                            <a:buClrTx/>
+                            <a:buSzTx/>
+                            <a:buFontTx/>
+                            <a:buNone/>
+                            <a:tabLst/>
+                            <a:defRPr/>
+                          </a:pPr>
+                          <a14:m>
+                            <m:oMathPara xmlns:m="http://schemas.openxmlformats.org/officeDocument/2006/math">
+                              <m:oMathParaPr>
+                                <m:jc m:val="centerGroup"/>
+                              </m:oMathParaPr>
+                              <m:oMath xmlns:m="http://schemas.openxmlformats.org/officeDocument/2006/math">
+                                <m:r>
+                                  <m:rPr>
+                                    <m:nor/>
+                                  </m:rPr>
+                                  <a:rPr lang="en-US" dirty="0" smtClean="0">
+                                    <a:latin typeface="XITS Math" panose="02000503000000000000" pitchFamily="50" charset="0"/>
+                                    <a:ea typeface="XITS Math" panose="02000503000000000000" pitchFamily="50" charset="0"/>
+                                    <a:cs typeface="XITS Math" panose="02000503000000000000" pitchFamily="50" charset="0"/>
+                                  </a:rPr>
+                                  <m:t>ℐ</m:t>
+                                </m:r>
+                                <m:r>
+                                  <a:rPr lang="en-US" b="0" i="1" smtClean="0">
+                                    <a:latin typeface="Cambria Math" panose="02040503050406030204" pitchFamily="18" charset="0"/>
+                                    <a:ea typeface="Cambria Math" panose="02040503050406030204" pitchFamily="18" charset="0"/>
+                                  </a:rPr>
+                                  <m:t>=</m:t>
+                                </m:r>
+                              </m:oMath>
+                            </m:oMathPara>
+                          </a14:m>
+                          <a:endParaRPr lang="en-US" dirty="0"/>
+                        </a:p>
+                      </a:txBody>
+                      <a:tcPr anchor="ctr"/>
+                    </a:tc>
+                    <a:tc>
+                      <a:txBody>
+                        <a:bodyPr/>
+                        <a:lstStyle/>
+                        <a:p>
+                          <a:pPr marL="0" marR="0" lvl="0" indent="0" algn="ctr" defTabSz="914400" rtl="0" eaLnBrk="1" fontAlgn="auto" latinLnBrk="0" hangingPunct="1">
+                            <a:lnSpc>
+                              <a:spcPct val="100000"/>
+                            </a:lnSpc>
+                            <a:spcBef>
+                              <a:spcPts val="0"/>
+                            </a:spcBef>
+                            <a:spcAft>
+                              <a:spcPts val="0"/>
+                            </a:spcAft>
+                            <a:buClrTx/>
+                            <a:buSzTx/>
+                            <a:buFontTx/>
+                            <a:buNone/>
+                            <a:tabLst/>
+                            <a:defRPr/>
+                          </a:pPr>
+                          <a14:m>
+                            <m:oMathPara xmlns:m="http://schemas.openxmlformats.org/officeDocument/2006/math">
+                              <m:oMathParaPr>
+                                <m:jc m:val="centerGroup"/>
+                              </m:oMathParaPr>
+                              <m:oMath xmlns:m="http://schemas.openxmlformats.org/officeDocument/2006/math">
+                                <m:r>
+                                  <a:rPr lang="en-US" b="0" i="1" smtClean="0">
+                                    <a:latin typeface="Cambria Math" panose="02040503050406030204" pitchFamily="18" charset="0"/>
+                                  </a:rPr>
+                                  <m:t>𝜇</m:t>
+                                </m:r>
+                                <m:r>
+                                  <a:rPr lang="en-US" b="0" i="1" smtClean="0">
+                                    <a:latin typeface="Cambria Math" panose="02040503050406030204" pitchFamily="18" charset="0"/>
+                                  </a:rPr>
+                                  <m:t>:</m:t>
+                                </m:r>
+                                <m:r>
+                                  <a:rPr lang="en-US" b="0" i="1" smtClean="0">
+                                    <a:latin typeface="Cambria Math" panose="02040503050406030204" pitchFamily="18" charset="0"/>
+                                    <a:ea typeface="Cambria Math" panose="02040503050406030204" pitchFamily="18" charset="0"/>
+                                  </a:rPr>
+                                  <m:t>ℰ</m:t>
+                                </m:r>
+                                <m:r>
+                                  <a:rPr lang="en-US" b="0" i="0" smtClean="0">
+                                    <a:latin typeface="Cambria Math" panose="02040503050406030204" pitchFamily="18" charset="0"/>
+                                    <a:ea typeface="Cambria Math" panose="02040503050406030204" pitchFamily="18" charset="0"/>
+                                  </a:rPr>
+                                  <m:t>→</m:t>
+                                </m:r>
+                                <m:r>
+                                  <m:rPr>
+                                    <m:nor/>
+                                  </m:rPr>
+                                  <a:rPr lang="en-US" dirty="0" smtClean="0">
+                                    <a:latin typeface="XITS Math" panose="02000503000000000000" pitchFamily="50" charset="0"/>
+                                    <a:ea typeface="XITS Math" panose="02000503000000000000" pitchFamily="50" charset="0"/>
+                                    <a:cs typeface="XITS Math" panose="02000503000000000000" pitchFamily="50" charset="0"/>
+                                  </a:rPr>
+                                  <m:t>ℐ</m:t>
+                                </m:r>
+                              </m:oMath>
+                            </m:oMathPara>
+                          </a14:m>
+                          <a:endParaRPr lang="en-US" dirty="0"/>
+                        </a:p>
+                      </a:txBody>
+                      <a:tcPr anchor="ctr"/>
+                    </a:tc>
+                    <a:tc>
+                      <a:txBody>
+                        <a:bodyPr/>
+                        <a:lstStyle/>
+                        <a:p>
+                          <a:pPr algn="ctr"/>
+                          <a:endParaRPr lang="en-US" dirty="0"/>
+                        </a:p>
+                      </a:txBody>
+                      <a:tcPr anchor="ctr"/>
+                    </a:tc>
+                  </a:tr>
+                </a:tbl>
+              </a:graphicData>
+            </a:graphic>
+          </p:graphicFrame>
+        </mc:Choice>
+        <mc:Fallback>
+          <p:graphicFrame>
+            <p:nvGraphicFramePr>
+              <p:cNvPr id="4" name="Content Placeholder 3"/>
+              <p:cNvGraphicFramePr>
+                <a:graphicFrameLocks noGrp="1"/>
+              </p:cNvGraphicFramePr>
+              <p:nvPr>
+                <p:ph idx="1"/>
+                <p:extLst>
+                  <p:ext uri="{D42A27DB-BD31-4B8C-83A1-F6EECF244321}">
+                    <p14:modId xmlns:p14="http://schemas.microsoft.com/office/powerpoint/2010/main" val="2198624936"/>
+                  </p:ext>
+                </p:extLst>
+              </p:nvPr>
+            </p:nvGraphicFramePr>
+            <p:xfrm>
+              <a:off x="838200" y="1825625"/>
+              <a:ext cx="10515600" cy="2565400"/>
+            </p:xfrm>
+            <a:graphic>
+              <a:graphicData uri="http://schemas.openxmlformats.org/drawingml/2006/table">
+                <a:tbl>
+                  <a:tblPr firstRow="1" bandRow="1">
+                    <a:tableStyleId>{5C22544A-7EE6-4342-B048-85BDC9FD1C3A}</a:tableStyleId>
+                  </a:tblPr>
+                  <a:tblGrid>
+                    <a:gridCol w="3505200"/>
+                    <a:gridCol w="3505200"/>
+                    <a:gridCol w="3505200"/>
+                  </a:tblGrid>
+                  <a:tr h="370840">
+                    <a:tc>
+                      <a:txBody>
+                        <a:bodyPr/>
+                        <a:lstStyle/>
+                        <a:p>
+                          <a:pPr algn="ctr"/>
+                          <a:endParaRPr lang="en-US" dirty="0"/>
+                        </a:p>
+                      </a:txBody>
+                      <a:tcPr anchor="ctr"/>
+                    </a:tc>
+                    <a:tc>
+                      <a:txBody>
+                        <a:bodyPr/>
+                        <a:lstStyle/>
+                        <a:p>
+                          <a:pPr algn="ctr"/>
+                          <a:r>
+                            <a:rPr lang="en-US" dirty="0" smtClean="0"/>
+                            <a:t>Classical</a:t>
+                          </a:r>
+                          <a:endParaRPr lang="en-US" dirty="0"/>
+                        </a:p>
+                      </a:txBody>
+                      <a:tcPr anchor="ctr"/>
+                    </a:tc>
+                    <a:tc>
+                      <a:txBody>
+                        <a:bodyPr/>
+                        <a:lstStyle/>
+                        <a:p>
+                          <a:pPr algn="ctr"/>
+                          <a:r>
+                            <a:rPr lang="en-US" dirty="0" smtClean="0"/>
+                            <a:t>Quantum</a:t>
+                          </a:r>
+                          <a:endParaRPr lang="en-US" dirty="0"/>
+                        </a:p>
+                      </a:txBody>
+                      <a:tcPr anchor="ctr"/>
+                    </a:tc>
+                  </a:tr>
+                  <a:tr h="914400">
+                    <a:tc>
+                      <a:txBody>
+                        <a:bodyPr/>
+                        <a:lstStyle/>
+                        <a:p>
+                          <a:pPr algn="ctr"/>
+                          <a:endParaRPr lang="en-US" dirty="0"/>
+                        </a:p>
+                      </a:txBody>
+                      <a:tcPr anchor="ctr"/>
+                    </a:tc>
+                    <a:tc>
+                      <a:txBody>
+                        <a:bodyPr/>
+                        <a:lstStyle/>
+                        <a:p>
+                          <a:endParaRPr lang="en-US"/>
+                        </a:p>
+                      </a:txBody>
+                      <a:tcPr anchor="ctr">
+                        <a:blipFill rotWithShape="0">
+                          <a:blip r:embed="rId2"/>
+                          <a:stretch>
+                            <a:fillRect l="-100000" t="-44000" r="-100521" b="-142000"/>
+                          </a:stretch>
+                        </a:blipFill>
+                      </a:tcPr>
+                    </a:tc>
+                    <a:tc>
+                      <a:txBody>
+                        <a:bodyPr/>
+                        <a:lstStyle/>
+                        <a:p>
+                          <a:endParaRPr lang="en-US"/>
+                        </a:p>
+                      </a:txBody>
+                      <a:tcPr anchor="ctr">
+                        <a:blipFill rotWithShape="0">
+                          <a:blip r:embed="rId2"/>
+                          <a:stretch>
+                            <a:fillRect l="-200348" t="-44000" r="-696" b="-142000"/>
+                          </a:stretch>
+                        </a:blipFill>
+                      </a:tcPr>
+                    </a:tc>
+                  </a:tr>
+                  <a:tr h="640080">
+                    <a:tc>
+                      <a:txBody>
+                        <a:bodyPr/>
+                        <a:lstStyle/>
+                        <a:p>
+                          <a:endParaRPr lang="en-US"/>
+                        </a:p>
+                      </a:txBody>
+                      <a:tcPr anchor="ctr">
+                        <a:blipFill rotWithShape="0">
+                          <a:blip r:embed="rId2"/>
+                          <a:stretch>
+                            <a:fillRect l="-174" t="-203774" r="-200870" b="-100943"/>
+                          </a:stretch>
+                        </a:blipFill>
+                      </a:tcPr>
+                    </a:tc>
+                    <a:tc>
+                      <a:txBody>
+                        <a:bodyPr/>
+                        <a:lstStyle/>
+                        <a:p>
+                          <a:endParaRPr lang="en-US"/>
+                        </a:p>
+                      </a:txBody>
+                      <a:tcPr anchor="ctr">
+                        <a:blipFill rotWithShape="0">
+                          <a:blip r:embed="rId2"/>
+                          <a:stretch>
+                            <a:fillRect l="-100000" t="-203774" r="-100521" b="-100943"/>
+                          </a:stretch>
+                        </a:blipFill>
+                      </a:tcPr>
+                    </a:tc>
+                    <a:tc>
+                      <a:txBody>
+                        <a:bodyPr/>
+                        <a:lstStyle/>
+                        <a:p>
+                          <a:pPr algn="ctr"/>
+                          <a:endParaRPr lang="en-US" dirty="0"/>
+                        </a:p>
+                      </a:txBody>
+                      <a:tcPr anchor="ctr"/>
+                    </a:tc>
+                  </a:tr>
+                  <a:tr h="640080">
+                    <a:tc>
+                      <a:txBody>
+                        <a:bodyPr/>
+                        <a:lstStyle/>
+                        <a:p>
+                          <a:endParaRPr lang="en-US"/>
+                        </a:p>
+                      </a:txBody>
+                      <a:tcPr anchor="ctr">
+                        <a:blipFill rotWithShape="0">
+                          <a:blip r:embed="rId2"/>
+                          <a:stretch>
+                            <a:fillRect l="-174" t="-306667" r="-200870" b="-1905"/>
+                          </a:stretch>
+                        </a:blipFill>
+                      </a:tcPr>
+                    </a:tc>
+                    <a:tc>
+                      <a:txBody>
+                        <a:bodyPr/>
+                        <a:lstStyle/>
+                        <a:p>
+                          <a:endParaRPr lang="en-US"/>
+                        </a:p>
+                      </a:txBody>
+                      <a:tcPr anchor="ctr">
+                        <a:blipFill rotWithShape="0">
+                          <a:blip r:embed="rId2"/>
+                          <a:stretch>
+                            <a:fillRect l="-100000" t="-306667" r="-100521" b="-1905"/>
+                          </a:stretch>
+                        </a:blipFill>
+                      </a:tcPr>
+                    </a:tc>
+                    <a:tc>
+                      <a:txBody>
+                        <a:bodyPr/>
+                        <a:lstStyle/>
+                        <a:p>
+                          <a:pPr algn="ctr"/>
+                          <a:endParaRPr lang="en-US" dirty="0"/>
+                        </a:p>
+                      </a:txBody>
+                      <a:tcPr anchor="ctr"/>
+                    </a:tc>
+                  </a:tr>
+                </a:tbl>
+              </a:graphicData>
+            </a:graphic>
+          </p:graphicFrame>
+        </mc:Fallback>
+      </mc:AlternateContent>
+    </p:spTree>
+    <p:extLst>
+      <p:ext uri="{BB962C8B-B14F-4D97-AF65-F5344CB8AC3E}">
+        <p14:creationId xmlns:p14="http://schemas.microsoft.com/office/powerpoint/2010/main" val="3541224134"/>
+      </p:ext>
+    </p:extLst>
+  </p:cSld>
+  <p:clrMapOvr>
+    <a:masterClrMapping/>
+  </p:clrMapOvr>
+  <p:timing>
+    <p:tnLst>
+      <p:par>
+        <p:cTn id="1" dur="indefinite" restart="never" nodeType="tmRoot"/>
+      </p:par>
+    </p:tnLst>
+  </p:timing>
+</p:sld>
+</file>
+
+<file path=ppt/slides/slide3.xml><?xml version="1.0" encoding="utf-8"?>
 <p:sld xmlns:a="http://schemas.openxmlformats.org/drawingml/2006/main" xmlns:r="http://schemas.openxmlformats.org/officeDocument/2006/relationships" xmlns:p="http://schemas.openxmlformats.org/presentationml/2006/main">
   <p:cSld>
     <p:spTree>
@@ -4118,23 +5139,11 @@
                       </a:rPr>
                       <m:t>ℐ</m:t>
                     </m:r>
-                    <m:r>
-                      <a:rPr lang="en-US" i="1" dirty="0">
-                        <a:latin typeface="XITS Math" panose="02000503000000000000" pitchFamily="50" charset="0"/>
-                        <a:ea typeface="XITS Math" panose="02000503000000000000" pitchFamily="50" charset="0"/>
-                        <a:cs typeface="XITS Math" panose="02000503000000000000" pitchFamily="50" charset="0"/>
-                      </a:rPr>
-                      <m:t> </m:t>
-                    </m:r>
                   </m:oMath>
                 </a14:m>
                 <a:r>
                   <a:rPr lang="en-US" dirty="0" smtClean="0"/>
-                  <a:t> be a set of intervals, a </a:t>
-                </a:r>
-                <a:r>
-                  <a:rPr lang="en-US" dirty="0" smtClean="0"/>
-                  <a:t>QIVPM</a:t>
+                  <a:t> be a set of intervals, a QIVPM</a:t>
                 </a:r>
                 <a:r>
                   <a:rPr lang="en-US" dirty="0"/>
@@ -5503,7 +6512,7 @@
 </p:sld>
 </file>
 
-<file path=ppt/slides/slide3.xml><?xml version="1.0" encoding="utf-8"?>
+<file path=ppt/slides/slide4.xml><?xml version="1.0" encoding="utf-8"?>
 <p:sld xmlns:a="http://schemas.openxmlformats.org/drawingml/2006/main" xmlns:r="http://schemas.openxmlformats.org/officeDocument/2006/relationships" xmlns:p="http://schemas.openxmlformats.org/presentationml/2006/main">
   <p:cSld>
     <p:spTree>
@@ -6466,7 +7475,7 @@
 </p:sld>
 </file>
 
-<file path=ppt/slides/slide4.xml><?xml version="1.0" encoding="utf-8"?>
+<file path=ppt/slides/slide5.xml><?xml version="1.0" encoding="utf-8"?>
 <p:sld xmlns:a="http://schemas.openxmlformats.org/drawingml/2006/main" xmlns:r="http://schemas.openxmlformats.org/officeDocument/2006/relationships" xmlns:p="http://schemas.openxmlformats.org/presentationml/2006/main">
   <p:cSld>
     <p:spTree>
@@ -6517,8 +7526,8 @@
           </a:p>
         </p:txBody>
       </p:sp>
-      <mc:AlternateContent xmlns:mc="http://schemas.openxmlformats.org/markup-compatibility/2006">
-        <mc:Choice xmlns:a14="http://schemas.microsoft.com/office/drawing/2010/main" Requires="a14">
+      <mc:AlternateContent xmlns:mc="http://schemas.openxmlformats.org/markup-compatibility/2006" xmlns:a14="http://schemas.microsoft.com/office/drawing/2010/main">
+        <mc:Choice Requires="a14">
           <p:sp>
             <p:nvSpPr>
               <p:cNvPr id="3" name="Content Placeholder 2"/>
@@ -6607,7 +7616,6 @@
                   <a:rPr lang="en-US" b="1" dirty="0" smtClean="0"/>
                   <a:t>Proof by Contradiction!</a:t>
                 </a:r>
-                <a:endParaRPr lang="en-US" b="1" dirty="0" smtClean="0"/>
               </a:p>
               <a:p>
                 <a:r>
@@ -7558,7 +8566,7 @@
             </p:txBody>
           </p:sp>
         </mc:Choice>
-        <mc:Fallback>
+        <mc:Fallback xmlns="">
           <p:sp>
             <p:nvSpPr>
               <p:cNvPr id="3" name="Content Placeholder 2"/>
@@ -7616,7 +8624,7 @@
 </p:sld>
 </file>
 
-<file path=ppt/slides/slide5.xml><?xml version="1.0" encoding="utf-8"?>
+<file path=ppt/slides/slide6.xml><?xml version="1.0" encoding="utf-8"?>
 <p:sld xmlns:a="http://schemas.openxmlformats.org/drawingml/2006/main" xmlns:r="http://schemas.openxmlformats.org/officeDocument/2006/relationships" xmlns:p="http://schemas.openxmlformats.org/presentationml/2006/main">
   <p:cSld>
     <p:spTree>

</xml_diff>

<commit_message>
prop_letter.pptx "Convexity and Expectation Value" Updating...
</commit_message>
<xml_diff>
--- a/prop_letter.pptx
+++ b/prop_letter.pptx
@@ -22,8 +22,8 @@
     <p:sldId id="261" r:id="rId10"/>
     <p:sldId id="272" r:id="rId11"/>
     <p:sldId id="276" r:id="rId12"/>
-    <p:sldId id="277" r:id="rId13"/>
-    <p:sldId id="278" r:id="rId14"/>
+    <p:sldId id="278" r:id="rId13"/>
+    <p:sldId id="280" r:id="rId14"/>
     <p:sldId id="273" r:id="rId15"/>
     <p:sldId id="274" r:id="rId16"/>
     <p:sldId id="275" r:id="rId17"/>
@@ -151,8 +151,8 @@
         <p14:section name="Convexity and Expectation Value" id="{EB4A07DE-6FD2-458B-84FD-CF318EF1C82A}">
           <p14:sldIdLst>
             <p14:sldId id="276"/>
-            <p14:sldId id="277"/>
             <p14:sldId id="278"/>
+            <p14:sldId id="280"/>
           </p14:sldIdLst>
         </p14:section>
         <p14:section name="Kochen-Specker Theorem" id="{267E8203-33DC-4F7A-9CD7-887DDB8FDDB2}">
@@ -1030,90 +1030,6 @@
           <a:p>
             <a:fld id="{553141C9-E3AF-4773-84E5-4C6860670B56}" type="slidenum">
               <a:rPr lang="en-US" smtClean="0"/>
-              <a:t>12</a:t>
-            </a:fld>
-            <a:endParaRPr lang="en-US"/>
-          </a:p>
-        </p:txBody>
-      </p:sp>
-    </p:spTree>
-    <p:extLst>
-      <p:ext uri="{BB962C8B-B14F-4D97-AF65-F5344CB8AC3E}">
-        <p14:creationId xmlns:p14="http://schemas.microsoft.com/office/powerpoint/2010/main" val="188421768"/>
-      </p:ext>
-    </p:extLst>
-  </p:cSld>
-  <p:clrMapOvr>
-    <a:masterClrMapping/>
-  </p:clrMapOvr>
-</p:notes>
-</file>
-
-<file path=ppt/notesSlides/notesSlide5.xml><?xml version="1.0" encoding="utf-8"?>
-<p:notes xmlns:a="http://schemas.openxmlformats.org/drawingml/2006/main" xmlns:r="http://schemas.openxmlformats.org/officeDocument/2006/relationships" xmlns:p="http://schemas.openxmlformats.org/presentationml/2006/main">
-  <p:cSld>
-    <p:spTree>
-      <p:nvGrpSpPr>
-        <p:cNvPr id="1" name=""/>
-        <p:cNvGrpSpPr/>
-        <p:nvPr/>
-      </p:nvGrpSpPr>
-      <p:grpSpPr>
-        <a:xfrm>
-          <a:off x="0" y="0"/>
-          <a:ext cx="0" cy="0"/>
-          <a:chOff x="0" y="0"/>
-          <a:chExt cx="0" cy="0"/>
-        </a:xfrm>
-      </p:grpSpPr>
-      <p:sp>
-        <p:nvSpPr>
-          <p:cNvPr id="2" name="Slide Image Placeholder 1"/>
-          <p:cNvSpPr>
-            <a:spLocks noGrp="1" noRot="1" noChangeAspect="1"/>
-          </p:cNvSpPr>
-          <p:nvPr>
-            <p:ph type="sldImg"/>
-          </p:nvPr>
-        </p:nvSpPr>
-        <p:spPr/>
-      </p:sp>
-      <p:sp>
-        <p:nvSpPr>
-          <p:cNvPr id="3" name="Notes Placeholder 2"/>
-          <p:cNvSpPr>
-            <a:spLocks noGrp="1"/>
-          </p:cNvSpPr>
-          <p:nvPr>
-            <p:ph type="body" idx="1"/>
-          </p:nvPr>
-        </p:nvSpPr>
-        <p:spPr/>
-        <p:txBody>
-          <a:bodyPr/>
-          <a:lstStyle/>
-          <a:p>
-            <a:endParaRPr lang="en-US" dirty="0"/>
-          </a:p>
-        </p:txBody>
-      </p:sp>
-      <p:sp>
-        <p:nvSpPr>
-          <p:cNvPr id="4" name="Slide Number Placeholder 3"/>
-          <p:cNvSpPr>
-            <a:spLocks noGrp="1"/>
-          </p:cNvSpPr>
-          <p:nvPr>
-            <p:ph type="sldNum" sz="quarter" idx="10"/>
-          </p:nvPr>
-        </p:nvSpPr>
-        <p:spPr/>
-        <p:txBody>
-          <a:bodyPr/>
-          <a:lstStyle/>
-          <a:p>
-            <a:fld id="{553141C9-E3AF-4773-84E5-4C6860670B56}" type="slidenum">
-              <a:rPr lang="en-US" smtClean="0"/>
               <a:t>17</a:t>
             </a:fld>
             <a:endParaRPr lang="en-US"/>
@@ -1133,7 +1049,7 @@
 </p:notes>
 </file>
 
-<file path=ppt/notesSlides/notesSlide6.xml><?xml version="1.0" encoding="utf-8"?>
+<file path=ppt/notesSlides/notesSlide5.xml><?xml version="1.0" encoding="utf-8"?>
 <p:notes xmlns:a="http://schemas.openxmlformats.org/drawingml/2006/main" xmlns:r="http://schemas.openxmlformats.org/officeDocument/2006/relationships" xmlns:p="http://schemas.openxmlformats.org/presentationml/2006/main">
   <p:cSld>
     <p:spTree>
@@ -4549,1539 +4465,6 @@
           <a:lstStyle/>
           <a:p>
             <a:r>
-              <a:rPr lang="en-US" dirty="0" smtClean="0"/>
-              <a:t>Inclusion and Convexity</a:t>
-            </a:r>
-            <a:endParaRPr lang="en-US" dirty="0"/>
-          </a:p>
-        </p:txBody>
-      </p:sp>
-      <mc:AlternateContent xmlns:mc="http://schemas.openxmlformats.org/markup-compatibility/2006" xmlns:a14="http://schemas.microsoft.com/office/drawing/2010/main">
-        <mc:Choice Requires="a14">
-          <p:graphicFrame>
-            <p:nvGraphicFramePr>
-              <p:cNvPr id="4" name="Content Placeholder 3"/>
-              <p:cNvGraphicFramePr>
-                <a:graphicFrameLocks noGrp="1"/>
-              </p:cNvGraphicFramePr>
-              <p:nvPr>
-                <p:ph idx="1"/>
-                <p:extLst>
-                  <p:ext uri="{D42A27DB-BD31-4B8C-83A1-F6EECF244321}">
-                    <p14:modId xmlns:p14="http://schemas.microsoft.com/office/powerpoint/2010/main" val="67151303"/>
-                  </p:ext>
-                </p:extLst>
-              </p:nvPr>
-            </p:nvGraphicFramePr>
-            <p:xfrm>
-              <a:off x="838200" y="1825625"/>
-              <a:ext cx="10515600" cy="4812792"/>
-            </p:xfrm>
-            <a:graphic>
-              <a:graphicData uri="http://schemas.openxmlformats.org/drawingml/2006/table">
-                <a:tbl>
-                  <a:tblPr firstRow="1" bandRow="1">
-                    <a:tableStyleId>{5C22544A-7EE6-4342-B048-85BDC9FD1C3A}</a:tableStyleId>
-                  </a:tblPr>
-                  <a:tblGrid>
-                    <a:gridCol w="5257800"/>
-                    <a:gridCol w="5257800"/>
-                  </a:tblGrid>
-                  <a:tr h="370840">
-                    <a:tc>
-                      <a:txBody>
-                        <a:bodyPr/>
-                        <a:lstStyle/>
-                        <a:p>
-                          <a:pPr marL="0" marR="0" lvl="0" indent="0" algn="l" defTabSz="914400" rtl="0" eaLnBrk="1" fontAlgn="auto" latinLnBrk="0" hangingPunct="1">
-                            <a:lnSpc>
-                              <a:spcPct val="100000"/>
-                            </a:lnSpc>
-                            <a:spcBef>
-                              <a:spcPts val="0"/>
-                            </a:spcBef>
-                            <a:spcAft>
-                              <a:spcPts val="0"/>
-                            </a:spcAft>
-                            <a:buClrTx/>
-                            <a:buSzTx/>
-                            <a:buFontTx/>
-                            <a:buNone/>
-                            <a:tabLst/>
-                            <a:defRPr/>
-                          </a:pPr>
-                          <a:r>
-                            <a:rPr lang="en-US" sz="2200" dirty="0" smtClean="0"/>
-                            <a:t>Classical </a:t>
-                          </a:r>
-                          <a:r>
-                            <a:rPr lang="en-US" sz="2200" dirty="0" smtClean="0">
-                              <a:solidFill>
-                                <a:schemeClr val="accent2"/>
-                              </a:solidFill>
-                            </a:rPr>
-                            <a:t>Interval</a:t>
-                          </a:r>
-                          <a:r>
-                            <a:rPr lang="en-US" sz="2200" dirty="0" smtClean="0"/>
-                            <a:t>-Valued Probability Measure (C</a:t>
-                          </a:r>
-                          <a:r>
-                            <a:rPr lang="en-US" sz="2200" dirty="0" smtClean="0">
-                              <a:solidFill>
-                                <a:schemeClr val="accent2"/>
-                              </a:solidFill>
-                            </a:rPr>
-                            <a:t>I</a:t>
-                          </a:r>
-                          <a:r>
-                            <a:rPr lang="en-US" sz="2200" dirty="0" smtClean="0"/>
-                            <a:t>VPM)</a:t>
-                          </a:r>
-                        </a:p>
-                      </a:txBody>
-                      <a:tcPr/>
-                    </a:tc>
-                    <a:tc>
-                      <a:txBody>
-                        <a:bodyPr/>
-                        <a:lstStyle/>
-                        <a:p>
-                          <a:pPr marL="0" marR="0" lvl="0" indent="0" algn="l" defTabSz="914400" rtl="0" eaLnBrk="1" fontAlgn="auto" latinLnBrk="0" hangingPunct="1">
-                            <a:lnSpc>
-                              <a:spcPct val="100000"/>
-                            </a:lnSpc>
-                            <a:spcBef>
-                              <a:spcPts val="0"/>
-                            </a:spcBef>
-                            <a:spcAft>
-                              <a:spcPts val="0"/>
-                            </a:spcAft>
-                            <a:buClrTx/>
-                            <a:buSzTx/>
-                            <a:buFontTx/>
-                            <a:buNone/>
-                            <a:tabLst/>
-                            <a:defRPr/>
-                          </a:pPr>
-                          <a:endParaRPr lang="en-US" sz="2200" dirty="0" smtClean="0"/>
-                        </a:p>
-                      </a:txBody>
-                      <a:tcPr/>
-                    </a:tc>
-                  </a:tr>
-                  <a:tr h="370840">
-                    <a:tc>
-                      <a:txBody>
-                        <a:bodyPr/>
-                        <a:lstStyle/>
-                        <a:p>
-                          <a:pPr marL="0" marR="0" lvl="0" indent="0" algn="l" defTabSz="914400" rtl="0" eaLnBrk="1" fontAlgn="auto" latinLnBrk="0" hangingPunct="1">
-                            <a:lnSpc>
-                              <a:spcPct val="100000"/>
-                            </a:lnSpc>
-                            <a:spcBef>
-                              <a:spcPts val="0"/>
-                            </a:spcBef>
-                            <a:spcAft>
-                              <a:spcPts val="0"/>
-                            </a:spcAft>
-                            <a:buClrTx/>
-                            <a:buSzTx/>
-                            <a:buFontTx/>
-                            <a:buNone/>
-                            <a:tabLst>
-                              <a:tab pos="2743200" algn="ctr"/>
-                              <a:tab pos="5035550" algn="r"/>
-                            </a:tabLst>
-                            <a:defRPr/>
-                          </a:pPr>
-                          <a:r>
-                            <a:rPr lang="en-US" sz="2200" i="1" baseline="0" dirty="0" smtClean="0">
-                              <a:solidFill>
-                                <a:schemeClr val="accent2"/>
-                              </a:solidFill>
-                            </a:rPr>
-                            <a:t>convexity</a:t>
-                          </a:r>
-                          <a:r>
-                            <a:rPr lang="en-US" sz="2200" baseline="0" dirty="0" smtClean="0"/>
-                            <a:t> </a:t>
-                          </a:r>
-                          <a:r>
-                            <a:rPr lang="en-US" sz="2200" baseline="0" dirty="0" smtClean="0">
-                              <a:solidFill>
-                                <a:schemeClr val="tx1"/>
-                              </a:solidFill>
-                            </a:rPr>
-                            <a:t>condition:</a:t>
-                          </a:r>
-                          <a:r>
-                            <a:rPr lang="en-US" sz="2200" baseline="0" dirty="0" smtClean="0"/>
-                            <a:t/>
-                          </a:r>
-                          <a:br>
-                            <a:rPr lang="en-US" sz="2200" baseline="0" dirty="0" smtClean="0"/>
-                          </a:br>
-                          <a14:m>
-                            <m:oMathPara xmlns:m="http://schemas.openxmlformats.org/officeDocument/2006/math">
-                              <m:oMathParaPr>
-                                <m:jc m:val="centerGroup"/>
-                              </m:oMathParaPr>
-                              <m:oMath xmlns:m="http://schemas.openxmlformats.org/officeDocument/2006/math">
-                                <m:bar>
-                                  <m:barPr>
-                                    <m:pos m:val="top"/>
-                                    <m:ctrlPr>
-                                      <a:rPr lang="en-US" sz="2200" i="1" smtClean="0">
-                                        <a:latin typeface="Cambria Math" panose="02040503050406030204" pitchFamily="18" charset="0"/>
-                                      </a:rPr>
-                                    </m:ctrlPr>
-                                  </m:barPr>
-                                  <m:e>
-                                    <m:r>
-                                      <a:rPr lang="en-US" sz="2200" i="1">
-                                        <a:latin typeface="Cambria Math" panose="02040503050406030204" pitchFamily="18" charset="0"/>
-                                      </a:rPr>
-                                      <m:t>𝜇</m:t>
-                                    </m:r>
-                                  </m:e>
-                                </m:bar>
-                                <m:d>
-                                  <m:dPr>
-                                    <m:ctrlPr>
-                                      <a:rPr lang="en-US" sz="2200" i="1">
-                                        <a:solidFill>
-                                          <a:schemeClr val="tx1"/>
-                                        </a:solidFill>
-                                        <a:latin typeface="Cambria Math" panose="02040503050406030204" pitchFamily="18" charset="0"/>
-                                      </a:rPr>
-                                    </m:ctrlPr>
-                                  </m:dPr>
-                                  <m:e>
-                                    <m:sSub>
-                                      <m:sSubPr>
-                                        <m:ctrlPr>
-                                          <a:rPr lang="en-US" sz="2200" i="1">
-                                            <a:solidFill>
-                                              <a:schemeClr val="tx1"/>
-                                            </a:solidFill>
-                                            <a:latin typeface="Cambria Math" panose="02040503050406030204" pitchFamily="18" charset="0"/>
-                                          </a:rPr>
-                                        </m:ctrlPr>
-                                      </m:sSubPr>
-                                      <m:e>
-                                        <m:r>
-                                          <a:rPr lang="en-US" sz="2200" i="1">
-                                            <a:solidFill>
-                                              <a:schemeClr val="tx1"/>
-                                            </a:solidFill>
-                                            <a:latin typeface="Cambria Math" panose="02040503050406030204" pitchFamily="18" charset="0"/>
-                                          </a:rPr>
-                                          <m:t>𝐸</m:t>
-                                        </m:r>
-                                      </m:e>
-                                      <m:sub>
-                                        <m:r>
-                                          <a:rPr lang="en-US" sz="2200" i="1">
-                                            <a:solidFill>
-                                              <a:schemeClr val="tx1"/>
-                                            </a:solidFill>
-                                            <a:latin typeface="Cambria Math" panose="02040503050406030204" pitchFamily="18" charset="0"/>
-                                          </a:rPr>
-                                          <m:t>0</m:t>
-                                        </m:r>
-                                      </m:sub>
-                                    </m:sSub>
-                                    <m:r>
-                                      <a:rPr lang="en-US" sz="2200" i="1">
-                                        <a:solidFill>
-                                          <a:schemeClr val="tx1"/>
-                                        </a:solidFill>
-                                        <a:latin typeface="Cambria Math" panose="02040503050406030204" pitchFamily="18" charset="0"/>
-                                      </a:rPr>
-                                      <m:t>∪</m:t>
-                                    </m:r>
-                                    <m:sSub>
-                                      <m:sSubPr>
-                                        <m:ctrlPr>
-                                          <a:rPr lang="en-US" sz="2200" i="1">
-                                            <a:solidFill>
-                                              <a:schemeClr val="tx1"/>
-                                            </a:solidFill>
-                                            <a:latin typeface="Cambria Math" panose="02040503050406030204" pitchFamily="18" charset="0"/>
-                                          </a:rPr>
-                                        </m:ctrlPr>
-                                      </m:sSubPr>
-                                      <m:e>
-                                        <m:r>
-                                          <a:rPr lang="en-US" sz="2200" i="1">
-                                            <a:solidFill>
-                                              <a:schemeClr val="tx1"/>
-                                            </a:solidFill>
-                                            <a:latin typeface="Cambria Math" panose="02040503050406030204" pitchFamily="18" charset="0"/>
-                                          </a:rPr>
-                                          <m:t>𝐸</m:t>
-                                        </m:r>
-                                      </m:e>
-                                      <m:sub>
-                                        <m:r>
-                                          <a:rPr lang="en-US" sz="2200" i="1">
-                                            <a:solidFill>
-                                              <a:schemeClr val="tx1"/>
-                                            </a:solidFill>
-                                            <a:latin typeface="Cambria Math" panose="02040503050406030204" pitchFamily="18" charset="0"/>
-                                          </a:rPr>
-                                          <m:t>1</m:t>
-                                        </m:r>
-                                      </m:sub>
-                                    </m:sSub>
-                                  </m:e>
-                                </m:d>
-                                <m:r>
-                                  <a:rPr lang="en-US" sz="2200" b="0" i="1" smtClean="0">
-                                    <a:solidFill>
-                                      <a:schemeClr val="tx1"/>
-                                    </a:solidFill>
-                                    <a:latin typeface="Cambria Math" panose="02040503050406030204" pitchFamily="18" charset="0"/>
-                                  </a:rPr>
-                                  <m:t>+</m:t>
-                                </m:r>
-                                <m:bar>
-                                  <m:barPr>
-                                    <m:pos m:val="top"/>
-                                    <m:ctrlPr>
-                                      <a:rPr lang="en-US" sz="2200" i="1" smtClean="0">
-                                        <a:latin typeface="Cambria Math" panose="02040503050406030204" pitchFamily="18" charset="0"/>
-                                      </a:rPr>
-                                    </m:ctrlPr>
-                                  </m:barPr>
-                                  <m:e>
-                                    <m:r>
-                                      <a:rPr lang="en-US" sz="2200" i="1">
-                                        <a:latin typeface="Cambria Math" panose="02040503050406030204" pitchFamily="18" charset="0"/>
-                                      </a:rPr>
-                                      <m:t>𝜇</m:t>
-                                    </m:r>
-                                  </m:e>
-                                </m:bar>
-                                <m:d>
-                                  <m:dPr>
-                                    <m:ctrlPr>
-                                      <a:rPr lang="en-US" sz="2200" i="1">
-                                        <a:solidFill>
-                                          <a:schemeClr val="tx1"/>
-                                        </a:solidFill>
-                                        <a:latin typeface="Cambria Math" panose="02040503050406030204" pitchFamily="18" charset="0"/>
-                                      </a:rPr>
-                                    </m:ctrlPr>
-                                  </m:dPr>
-                                  <m:e>
-                                    <m:sSub>
-                                      <m:sSubPr>
-                                        <m:ctrlPr>
-                                          <a:rPr lang="en-US" sz="2200" i="1">
-                                            <a:solidFill>
-                                              <a:schemeClr val="tx1"/>
-                                            </a:solidFill>
-                                            <a:latin typeface="Cambria Math" panose="02040503050406030204" pitchFamily="18" charset="0"/>
-                                          </a:rPr>
-                                        </m:ctrlPr>
-                                      </m:sSubPr>
-                                      <m:e>
-                                        <m:r>
-                                          <a:rPr lang="en-US" sz="2200" i="1">
-                                            <a:solidFill>
-                                              <a:schemeClr val="tx1"/>
-                                            </a:solidFill>
-                                            <a:latin typeface="Cambria Math" panose="02040503050406030204" pitchFamily="18" charset="0"/>
-                                          </a:rPr>
-                                          <m:t>𝐸</m:t>
-                                        </m:r>
-                                      </m:e>
-                                      <m:sub>
-                                        <m:r>
-                                          <a:rPr lang="en-US" sz="2200" i="1">
-                                            <a:solidFill>
-                                              <a:schemeClr val="tx1"/>
-                                            </a:solidFill>
-                                            <a:latin typeface="Cambria Math" panose="02040503050406030204" pitchFamily="18" charset="0"/>
-                                          </a:rPr>
-                                          <m:t>0</m:t>
-                                        </m:r>
-                                      </m:sub>
-                                    </m:sSub>
-                                    <m:r>
-                                      <a:rPr lang="en-US" sz="2200" b="0" i="1" smtClean="0">
-                                        <a:solidFill>
-                                          <a:schemeClr val="tx1"/>
-                                        </a:solidFill>
-                                        <a:latin typeface="Cambria Math" panose="02040503050406030204" pitchFamily="18" charset="0"/>
-                                      </a:rPr>
-                                      <m:t>∩</m:t>
-                                    </m:r>
-                                    <m:sSub>
-                                      <m:sSubPr>
-                                        <m:ctrlPr>
-                                          <a:rPr lang="en-US" sz="2200" i="1">
-                                            <a:solidFill>
-                                              <a:schemeClr val="tx1"/>
-                                            </a:solidFill>
-                                            <a:latin typeface="Cambria Math" panose="02040503050406030204" pitchFamily="18" charset="0"/>
-                                          </a:rPr>
-                                        </m:ctrlPr>
-                                      </m:sSubPr>
-                                      <m:e>
-                                        <m:r>
-                                          <a:rPr lang="en-US" sz="2200" i="1">
-                                            <a:solidFill>
-                                              <a:schemeClr val="tx1"/>
-                                            </a:solidFill>
-                                            <a:latin typeface="Cambria Math" panose="02040503050406030204" pitchFamily="18" charset="0"/>
-                                          </a:rPr>
-                                          <m:t>𝐸</m:t>
-                                        </m:r>
-                                      </m:e>
-                                      <m:sub>
-                                        <m:r>
-                                          <a:rPr lang="en-US" sz="2200" i="1">
-                                            <a:solidFill>
-                                              <a:schemeClr val="tx1"/>
-                                            </a:solidFill>
-                                            <a:latin typeface="Cambria Math" panose="02040503050406030204" pitchFamily="18" charset="0"/>
-                                          </a:rPr>
-                                          <m:t>1</m:t>
-                                        </m:r>
-                                      </m:sub>
-                                    </m:sSub>
-                                  </m:e>
-                                </m:d>
-                                <m:r>
-                                  <a:rPr lang="en-US" sz="2200" i="1" smtClean="0">
-                                    <a:solidFill>
-                                      <a:schemeClr val="accent2"/>
-                                    </a:solidFill>
-                                    <a:latin typeface="Cambria Math" panose="02040503050406030204" pitchFamily="18" charset="0"/>
-                                  </a:rPr>
-                                  <m:t>⊆</m:t>
-                                </m:r>
-                                <m:bar>
-                                  <m:barPr>
-                                    <m:pos m:val="top"/>
-                                    <m:ctrlPr>
-                                      <a:rPr lang="en-US" sz="2200" i="1" smtClean="0">
-                                        <a:latin typeface="Cambria Math" panose="02040503050406030204" pitchFamily="18" charset="0"/>
-                                      </a:rPr>
-                                    </m:ctrlPr>
-                                  </m:barPr>
-                                  <m:e>
-                                    <m:r>
-                                      <a:rPr lang="en-US" sz="2200" i="1">
-                                        <a:latin typeface="Cambria Math" panose="02040503050406030204" pitchFamily="18" charset="0"/>
-                                      </a:rPr>
-                                      <m:t>𝜇</m:t>
-                                    </m:r>
-                                  </m:e>
-                                </m:bar>
-                                <m:d>
-                                  <m:dPr>
-                                    <m:ctrlPr>
-                                      <a:rPr lang="en-US" sz="2200" i="1">
-                                        <a:solidFill>
-                                          <a:schemeClr val="tx1"/>
-                                        </a:solidFill>
-                                        <a:latin typeface="Cambria Math" panose="02040503050406030204" pitchFamily="18" charset="0"/>
-                                      </a:rPr>
-                                    </m:ctrlPr>
-                                  </m:dPr>
-                                  <m:e>
-                                    <m:sSub>
-                                      <m:sSubPr>
-                                        <m:ctrlPr>
-                                          <a:rPr lang="en-US" sz="2200" i="1">
-                                            <a:solidFill>
-                                              <a:schemeClr val="tx1"/>
-                                            </a:solidFill>
-                                            <a:latin typeface="Cambria Math" panose="02040503050406030204" pitchFamily="18" charset="0"/>
-                                          </a:rPr>
-                                        </m:ctrlPr>
-                                      </m:sSubPr>
-                                      <m:e>
-                                        <m:r>
-                                          <a:rPr lang="en-US" sz="2200" i="1">
-                                            <a:solidFill>
-                                              <a:schemeClr val="tx1"/>
-                                            </a:solidFill>
-                                            <a:latin typeface="Cambria Math" panose="02040503050406030204" pitchFamily="18" charset="0"/>
-                                          </a:rPr>
-                                          <m:t>𝐸</m:t>
-                                        </m:r>
-                                      </m:e>
-                                      <m:sub>
-                                        <m:r>
-                                          <a:rPr lang="en-US" sz="2200" i="1">
-                                            <a:solidFill>
-                                              <a:schemeClr val="tx1"/>
-                                            </a:solidFill>
-                                            <a:latin typeface="Cambria Math" panose="02040503050406030204" pitchFamily="18" charset="0"/>
-                                          </a:rPr>
-                                          <m:t>0</m:t>
-                                        </m:r>
-                                      </m:sub>
-                                    </m:sSub>
-                                  </m:e>
-                                </m:d>
-                                <m:r>
-                                  <a:rPr lang="en-US" sz="2200" i="1">
-                                    <a:solidFill>
-                                      <a:schemeClr val="tx1"/>
-                                    </a:solidFill>
-                                    <a:latin typeface="Cambria Math" panose="02040503050406030204" pitchFamily="18" charset="0"/>
-                                  </a:rPr>
-                                  <m:t>+</m:t>
-                                </m:r>
-                                <m:bar>
-                                  <m:barPr>
-                                    <m:pos m:val="top"/>
-                                    <m:ctrlPr>
-                                      <a:rPr lang="en-US" sz="2200" i="1" smtClean="0">
-                                        <a:latin typeface="Cambria Math" panose="02040503050406030204" pitchFamily="18" charset="0"/>
-                                      </a:rPr>
-                                    </m:ctrlPr>
-                                  </m:barPr>
-                                  <m:e>
-                                    <m:r>
-                                      <a:rPr lang="en-US" sz="2200" i="1">
-                                        <a:latin typeface="Cambria Math" panose="02040503050406030204" pitchFamily="18" charset="0"/>
-                                      </a:rPr>
-                                      <m:t>𝜇</m:t>
-                                    </m:r>
-                                  </m:e>
-                                </m:bar>
-                                <m:d>
-                                  <m:dPr>
-                                    <m:ctrlPr>
-                                      <a:rPr lang="en-US" sz="2200" i="1">
-                                        <a:solidFill>
-                                          <a:schemeClr val="tx1"/>
-                                        </a:solidFill>
-                                        <a:latin typeface="Cambria Math" panose="02040503050406030204" pitchFamily="18" charset="0"/>
-                                      </a:rPr>
-                                    </m:ctrlPr>
-                                  </m:dPr>
-                                  <m:e>
-                                    <m:sSub>
-                                      <m:sSubPr>
-                                        <m:ctrlPr>
-                                          <a:rPr lang="en-US" sz="2200" i="1">
-                                            <a:solidFill>
-                                              <a:schemeClr val="tx1"/>
-                                            </a:solidFill>
-                                            <a:latin typeface="Cambria Math" panose="02040503050406030204" pitchFamily="18" charset="0"/>
-                                          </a:rPr>
-                                        </m:ctrlPr>
-                                      </m:sSubPr>
-                                      <m:e>
-                                        <m:r>
-                                          <a:rPr lang="en-US" sz="2200" i="1">
-                                            <a:solidFill>
-                                              <a:schemeClr val="tx1"/>
-                                            </a:solidFill>
-                                            <a:latin typeface="Cambria Math" panose="02040503050406030204" pitchFamily="18" charset="0"/>
-                                          </a:rPr>
-                                          <m:t>𝐸</m:t>
-                                        </m:r>
-                                      </m:e>
-                                      <m:sub>
-                                        <m:r>
-                                          <a:rPr lang="en-US" sz="2200" i="1">
-                                            <a:solidFill>
-                                              <a:schemeClr val="tx1"/>
-                                            </a:solidFill>
-                                            <a:latin typeface="Cambria Math" panose="02040503050406030204" pitchFamily="18" charset="0"/>
-                                          </a:rPr>
-                                          <m:t>1</m:t>
-                                        </m:r>
-                                      </m:sub>
-                                    </m:sSub>
-                                  </m:e>
-                                </m:d>
-                              </m:oMath>
-                            </m:oMathPara>
-                          </a14:m>
-                          <a:r>
-                            <a:rPr lang="en-US" sz="2200" dirty="0" smtClean="0"/>
-                            <a:t/>
-                          </a:r>
-                          <a:br>
-                            <a:rPr lang="en-US" sz="2200" dirty="0" smtClean="0"/>
-                          </a:br>
-                          <a:r>
-                            <a:rPr lang="en-US" sz="2200" dirty="0" smtClean="0">
-                              <a:solidFill>
-                                <a:schemeClr val="tx1"/>
-                              </a:solidFill>
-                            </a:rPr>
-                            <a:t>for any </a:t>
-                          </a:r>
-                          <a:r>
-                            <a:rPr lang="en-US" sz="2200" dirty="0">
-                              <a:solidFill>
-                                <a:schemeClr val="tx1"/>
-                              </a:solidFill>
-                            </a:rPr>
-                            <a:t>events </a:t>
-                          </a:r>
-                          <a14:m>
-                            <m:oMath xmlns:m="http://schemas.openxmlformats.org/officeDocument/2006/math">
-                              <m:sSub>
-                                <m:sSubPr>
-                                  <m:ctrlPr>
-                                    <a:rPr lang="en-US" sz="2200" i="1">
-                                      <a:solidFill>
-                                        <a:schemeClr val="tx1"/>
-                                      </a:solidFill>
-                                      <a:latin typeface="Cambria Math" panose="02040503050406030204" pitchFamily="18" charset="0"/>
-                                    </a:rPr>
-                                  </m:ctrlPr>
-                                </m:sSubPr>
-                                <m:e>
-                                  <m:r>
-                                    <a:rPr lang="en-US" sz="2200" i="1">
-                                      <a:solidFill>
-                                        <a:schemeClr val="tx1"/>
-                                      </a:solidFill>
-                                      <a:latin typeface="Cambria Math" panose="02040503050406030204" pitchFamily="18" charset="0"/>
-                                    </a:rPr>
-                                    <m:t>𝐸</m:t>
-                                  </m:r>
-                                </m:e>
-                                <m:sub>
-                                  <m:r>
-                                    <a:rPr lang="en-US" sz="2200" i="1">
-                                      <a:solidFill>
-                                        <a:schemeClr val="tx1"/>
-                                      </a:solidFill>
-                                      <a:latin typeface="Cambria Math" panose="02040503050406030204" pitchFamily="18" charset="0"/>
-                                    </a:rPr>
-                                    <m:t>0</m:t>
-                                  </m:r>
-                                </m:sub>
-                              </m:sSub>
-                            </m:oMath>
-                          </a14:m>
-                          <a:r>
-                            <a:rPr lang="en-US" sz="2200" dirty="0">
-                              <a:solidFill>
-                                <a:schemeClr val="tx1"/>
-                              </a:solidFill>
-                            </a:rPr>
-                            <a:t> and </a:t>
-                          </a:r>
-                          <a14:m>
-                            <m:oMath xmlns:m="http://schemas.openxmlformats.org/officeDocument/2006/math">
-                              <m:sSub>
-                                <m:sSubPr>
-                                  <m:ctrlPr>
-                                    <a:rPr lang="en-US" sz="2200" i="1">
-                                      <a:solidFill>
-                                        <a:schemeClr val="tx1"/>
-                                      </a:solidFill>
-                                      <a:latin typeface="Cambria Math" panose="02040503050406030204" pitchFamily="18" charset="0"/>
-                                    </a:rPr>
-                                  </m:ctrlPr>
-                                </m:sSubPr>
-                                <m:e>
-                                  <m:r>
-                                    <a:rPr lang="en-US" sz="2200" i="1">
-                                      <a:solidFill>
-                                        <a:schemeClr val="tx1"/>
-                                      </a:solidFill>
-                                      <a:latin typeface="Cambria Math" panose="02040503050406030204" pitchFamily="18" charset="0"/>
-                                    </a:rPr>
-                                    <m:t>𝐸</m:t>
-                                  </m:r>
-                                </m:e>
-                                <m:sub>
-                                  <m:r>
-                                    <a:rPr lang="en-US" sz="2200" i="1">
-                                      <a:solidFill>
-                                        <a:schemeClr val="tx1"/>
-                                      </a:solidFill>
-                                      <a:latin typeface="Cambria Math" panose="02040503050406030204" pitchFamily="18" charset="0"/>
-                                    </a:rPr>
-                                    <m:t>1</m:t>
-                                  </m:r>
-                                </m:sub>
-                              </m:sSub>
-                            </m:oMath>
-                          </a14:m>
-                          <a:r>
-                            <a:rPr lang="en-US" sz="2200" dirty="0" smtClean="0">
-                              <a:solidFill>
-                                <a:schemeClr val="tx1"/>
-                              </a:solidFill>
-                            </a:rPr>
-                            <a:t>.</a:t>
-                          </a:r>
-                          <a:endParaRPr lang="en-US" sz="2200" dirty="0"/>
-                        </a:p>
-                      </a:txBody>
-                      <a:tcPr/>
-                    </a:tc>
-                    <a:tc>
-                      <a:txBody>
-                        <a:bodyPr/>
-                        <a:lstStyle/>
-                        <a:p>
-                          <a:pPr marL="0" marR="0" lvl="0" indent="0" algn="l" defTabSz="914400" rtl="0" eaLnBrk="1" fontAlgn="auto" latinLnBrk="0" hangingPunct="1">
-                            <a:lnSpc>
-                              <a:spcPct val="100000"/>
-                            </a:lnSpc>
-                            <a:spcBef>
-                              <a:spcPts val="0"/>
-                            </a:spcBef>
-                            <a:spcAft>
-                              <a:spcPts val="0"/>
-                            </a:spcAft>
-                            <a:buClrTx/>
-                            <a:buSzTx/>
-                            <a:buFontTx/>
-                            <a:buNone/>
-                            <a:tabLst>
-                              <a:tab pos="2743200" algn="ctr"/>
-                              <a:tab pos="5035550" algn="r"/>
-                            </a:tabLst>
-                            <a:defRPr/>
-                          </a:pPr>
-                          <a:endParaRPr lang="en-US" sz="2200" dirty="0" smtClean="0"/>
-                        </a:p>
-                      </a:txBody>
-                      <a:tcPr/>
-                    </a:tc>
-                  </a:tr>
-                  <a:tr h="370840">
-                    <a:tc>
-                      <a:txBody>
-                        <a:bodyPr/>
-                        <a:lstStyle/>
-                        <a:p>
-                          <a:pPr/>
-                          <a:r>
-                            <a:rPr lang="en-US" sz="2400" dirty="0" smtClean="0"/>
-                            <a:t>For every </a:t>
-                          </a:r>
-                          <a:r>
-                            <a:rPr lang="en-US" sz="2400" dirty="0" smtClean="0">
-                              <a:solidFill>
-                                <a:schemeClr val="accent2"/>
-                              </a:solidFill>
-                            </a:rPr>
-                            <a:t>convex</a:t>
-                          </a:r>
-                          <a:r>
-                            <a:rPr lang="en-US" sz="2400" dirty="0" smtClean="0"/>
-                            <a:t> CIVPM</a:t>
-                          </a:r>
-                          <a:r>
-                            <a:rPr lang="en-US" sz="2400" dirty="0"/>
-                            <a:t> </a:t>
-                          </a:r>
-                          <a14:m>
-                            <m:oMath xmlns:m="http://schemas.openxmlformats.org/officeDocument/2006/math">
-                              <m:bar>
-                                <m:barPr>
-                                  <m:pos m:val="top"/>
-                                  <m:ctrlPr>
-                                    <a:rPr lang="en-US" sz="2400" i="1">
-                                      <a:latin typeface="Cambria Math" panose="02040503050406030204" pitchFamily="18" charset="0"/>
-                                    </a:rPr>
-                                  </m:ctrlPr>
-                                </m:barPr>
-                                <m:e>
-                                  <m:r>
-                                    <a:rPr lang="en-US" sz="2400" i="1">
-                                      <a:latin typeface="Cambria Math" panose="02040503050406030204" pitchFamily="18" charset="0"/>
-                                    </a:rPr>
-                                    <m:t>𝜇</m:t>
-                                  </m:r>
-                                </m:e>
-                              </m:bar>
-                              <m:r>
-                                <a:rPr lang="en-US" sz="2400" i="1">
-                                  <a:latin typeface="Cambria Math" panose="02040503050406030204" pitchFamily="18" charset="0"/>
-                                </a:rPr>
-                                <m:t>:</m:t>
-                              </m:r>
-                              <m:sSup>
-                                <m:sSupPr>
-                                  <m:ctrlPr>
-                                    <a:rPr lang="en-US" sz="2400" i="1">
-                                      <a:latin typeface="Cambria Math" panose="02040503050406030204" pitchFamily="18" charset="0"/>
-                                      <a:ea typeface="Cambria Math" panose="02040503050406030204" pitchFamily="18" charset="0"/>
-                                    </a:rPr>
-                                  </m:ctrlPr>
-                                </m:sSupPr>
-                                <m:e>
-                                  <m:r>
-                                    <a:rPr lang="en-US" sz="2400" i="1">
-                                      <a:latin typeface="Cambria Math" panose="02040503050406030204" pitchFamily="18" charset="0"/>
-                                      <a:ea typeface="Cambria Math" panose="02040503050406030204" pitchFamily="18" charset="0"/>
-                                    </a:rPr>
-                                    <m:t>2</m:t>
-                                  </m:r>
-                                </m:e>
-                                <m:sup>
-                                  <m:r>
-                                    <m:rPr>
-                                      <m:sty m:val="p"/>
-                                    </m:rPr>
-                                    <a:rPr lang="el-GR" sz="2400" i="1">
-                                      <a:latin typeface="Cambria Math" panose="02040503050406030204" pitchFamily="18" charset="0"/>
-                                      <a:ea typeface="Cambria Math" panose="02040503050406030204" pitchFamily="18" charset="0"/>
-                                    </a:rPr>
-                                    <m:t>Ω</m:t>
-                                  </m:r>
-                                </m:sup>
-                              </m:sSup>
-                              <m:r>
-                                <a:rPr lang="en-US" sz="2400">
-                                  <a:latin typeface="Cambria Math" panose="02040503050406030204" pitchFamily="18" charset="0"/>
-                                  <a:ea typeface="Cambria Math" panose="02040503050406030204" pitchFamily="18" charset="0"/>
-                                </a:rPr>
-                                <m:t>→</m:t>
-                              </m:r>
-                              <m:d>
-                                <m:dPr>
-                                  <m:begChr m:val=""/>
-                                  <m:endChr m:val=""/>
-                                  <m:ctrlPr>
-                                    <a:rPr lang="en-US" sz="2400" i="1">
-                                      <a:latin typeface="Cambria Math" panose="02040503050406030204" pitchFamily="18" charset="0"/>
-                                      <a:ea typeface="Cambria Math" panose="02040503050406030204" pitchFamily="18" charset="0"/>
-                                      <a:cs typeface="XITS Math" panose="02000503000000000000" pitchFamily="50" charset="0"/>
-                                    </a:rPr>
-                                  </m:ctrlPr>
-                                </m:dPr>
-                                <m:e>
-                                  <m:r>
-                                    <a:rPr lang="en-US" sz="2400" i="1">
-                                      <a:latin typeface="XITS Math" panose="02000503000000000000" pitchFamily="50" charset="0"/>
-                                      <a:ea typeface="XITS Math" panose="02000503000000000000" pitchFamily="50" charset="0"/>
-                                      <a:cs typeface="XITS Math" panose="02000503000000000000" pitchFamily="50" charset="0"/>
-                                    </a:rPr>
-                                    <m:t>ℐ</m:t>
-                                  </m:r>
-                                </m:e>
-                              </m:d>
-                            </m:oMath>
-                          </a14:m>
-                          <a:r>
-                            <a:rPr lang="en-US" sz="2400" dirty="0"/>
-                            <a:t> </a:t>
-                          </a:r>
-                          <a:r>
-                            <a:rPr lang="en-US" sz="2400" dirty="0" smtClean="0"/>
-                            <a:t>and any random variable</a:t>
-                          </a:r>
-                          <a:r>
-                            <a:rPr lang="en-US" sz="2400" dirty="0"/>
-                            <a:t> </a:t>
-                          </a:r>
-                          <a14:m>
-                            <m:oMath xmlns:m="http://schemas.openxmlformats.org/officeDocument/2006/math">
-                              <m:r>
-                                <a:rPr lang="en-US" sz="2400" b="0" i="1" smtClean="0">
-                                  <a:latin typeface="Cambria Math" panose="02040503050406030204" pitchFamily="18" charset="0"/>
-                                </a:rPr>
-                                <m:t>𝑋</m:t>
-                              </m:r>
-                              <m:r>
-                                <a:rPr lang="en-US" sz="2400" b="0" i="1" smtClean="0">
-                                  <a:latin typeface="Cambria Math" panose="02040503050406030204" pitchFamily="18" charset="0"/>
-                                </a:rPr>
-                                <m:t>:</m:t>
-                              </m:r>
-                              <m:r>
-                                <m:rPr>
-                                  <m:sty m:val="p"/>
-                                </m:rPr>
-                                <a:rPr lang="el-GR" sz="2400" i="1">
-                                  <a:latin typeface="Cambria Math" panose="02040503050406030204" pitchFamily="18" charset="0"/>
-                                  <a:ea typeface="Cambria Math" panose="02040503050406030204" pitchFamily="18" charset="0"/>
-                                </a:rPr>
-                                <m:t>Ω</m:t>
-                              </m:r>
-                              <m:r>
-                                <a:rPr lang="en-US" sz="2400" b="0" i="0" smtClean="0">
-                                  <a:latin typeface="Cambria Math" panose="02040503050406030204" pitchFamily="18" charset="0"/>
-                                  <a:ea typeface="Cambria Math" panose="02040503050406030204" pitchFamily="18" charset="0"/>
-                                </a:rPr>
-                                <m:t>→</m:t>
-                              </m:r>
-                              <m:r>
-                                <a:rPr lang="en-US" sz="2400" b="0" i="1" smtClean="0">
-                                  <a:latin typeface="Cambria Math" panose="02040503050406030204" pitchFamily="18" charset="0"/>
-                                  <a:ea typeface="Cambria Math" panose="02040503050406030204" pitchFamily="18" charset="0"/>
-                                </a:rPr>
-                                <m:t>ℝ</m:t>
-                              </m:r>
-                            </m:oMath>
-                          </a14:m>
-                          <a:r>
-                            <a:rPr lang="en-US" sz="2400" dirty="0" smtClean="0"/>
-                            <a:t>, </a:t>
-                          </a:r>
-                          <a:br>
-                            <a:rPr lang="en-US" sz="2400" dirty="0" smtClean="0"/>
-                          </a:br>
-                          <a14:m>
-                            <m:oMathPara xmlns:m="http://schemas.openxmlformats.org/officeDocument/2006/math">
-                              <m:oMathParaPr>
-                                <m:jc m:val="centerGroup"/>
-                              </m:oMathParaPr>
-                              <m:oMath xmlns:m="http://schemas.openxmlformats.org/officeDocument/2006/math">
-                                <m:nary>
-                                  <m:naryPr>
-                                    <m:limLoc m:val="undOvr"/>
-                                    <m:subHide m:val="on"/>
-                                    <m:supHide m:val="on"/>
-                                    <m:ctrlPr>
-                                      <a:rPr lang="en-US" sz="2400" i="1" smtClean="0">
-                                        <a:latin typeface="Cambria Math" panose="02040503050406030204" pitchFamily="18" charset="0"/>
-                                      </a:rPr>
-                                    </m:ctrlPr>
-                                  </m:naryPr>
-                                  <m:sub/>
-                                  <m:sup/>
-                                  <m:e>
-                                    <m:r>
-                                      <a:rPr lang="en-US" sz="2400" b="0" i="1" smtClean="0">
-                                        <a:latin typeface="Cambria Math" panose="02040503050406030204" pitchFamily="18" charset="0"/>
-                                      </a:rPr>
-                                      <m:t>𝑋</m:t>
-                                    </m:r>
-                                  </m:e>
-                                </m:nary>
-                                <m:r>
-                                  <a:rPr lang="en-US" sz="2400" i="1" smtClean="0">
-                                    <a:latin typeface="Cambria Math" panose="02040503050406030204" pitchFamily="18" charset="0"/>
-                                  </a:rPr>
-                                  <m:t>ⅆ</m:t>
-                                </m:r>
-                                <m:bar>
-                                  <m:barPr>
-                                    <m:pos m:val="top"/>
-                                    <m:ctrlPr>
-                                      <a:rPr lang="en-US" sz="2400" i="1" smtClean="0">
-                                        <a:solidFill>
-                                          <a:schemeClr val="accent2"/>
-                                        </a:solidFill>
-                                        <a:latin typeface="Cambria Math" panose="02040503050406030204" pitchFamily="18" charset="0"/>
-                                      </a:rPr>
-                                    </m:ctrlPr>
-                                  </m:barPr>
-                                  <m:e>
-                                    <m:r>
-                                      <a:rPr lang="en-US" sz="2400" i="1">
-                                        <a:solidFill>
-                                          <a:schemeClr val="accent2"/>
-                                        </a:solidFill>
-                                        <a:latin typeface="Cambria Math" panose="02040503050406030204" pitchFamily="18" charset="0"/>
-                                      </a:rPr>
-                                      <m:t>𝜇</m:t>
-                                    </m:r>
-                                  </m:e>
-                                </m:bar>
-                                <m:r>
-                                  <a:rPr lang="en-US" sz="2400" b="0" i="1" smtClean="0">
-                                    <a:latin typeface="Cambria Math" panose="02040503050406030204" pitchFamily="18" charset="0"/>
-                                  </a:rPr>
-                                  <m:t>=</m:t>
-                                </m:r>
-                                <m:d>
-                                  <m:dPr>
-                                    <m:begChr m:val="["/>
-                                    <m:endChr m:val="]"/>
-                                    <m:ctrlPr>
-                                      <a:rPr lang="en-US" sz="2400" b="0" i="1" smtClean="0">
-                                        <a:latin typeface="Cambria Math" panose="02040503050406030204" pitchFamily="18" charset="0"/>
-                                      </a:rPr>
-                                    </m:ctrlPr>
-                                  </m:dPr>
-                                  <m:e>
-                                    <m:func>
-                                      <m:funcPr>
-                                        <m:ctrlPr>
-                                          <a:rPr lang="en-US" sz="2400" b="0" i="1" smtClean="0">
-                                            <a:latin typeface="Cambria Math" panose="02040503050406030204" pitchFamily="18" charset="0"/>
-                                          </a:rPr>
-                                        </m:ctrlPr>
-                                      </m:funcPr>
-                                      <m:fName>
-                                        <m:limLow>
-                                          <m:limLowPr>
-                                            <m:ctrlPr>
-                                              <a:rPr lang="en-US" sz="2400" b="0" i="1" smtClean="0">
-                                                <a:latin typeface="Cambria Math" panose="02040503050406030204" pitchFamily="18" charset="0"/>
-                                              </a:rPr>
-                                            </m:ctrlPr>
-                                          </m:limLowPr>
-                                          <m:e>
-                                            <m:r>
-                                              <m:rPr>
-                                                <m:sty m:val="p"/>
-                                              </m:rPr>
-                                              <a:rPr lang="en-US" sz="2400" b="0" i="0" smtClean="0">
-                                                <a:latin typeface="Cambria Math" panose="02040503050406030204" pitchFamily="18" charset="0"/>
-                                              </a:rPr>
-                                              <m:t>min</m:t>
-                                            </m:r>
-                                          </m:e>
-                                          <m:lim>
-                                            <m:r>
-                                              <a:rPr lang="en-US" sz="2400" i="1" smtClean="0">
-                                                <a:solidFill>
-                                                  <a:schemeClr val="accent2"/>
-                                                </a:solidFill>
-                                                <a:latin typeface="Cambria Math" panose="02040503050406030204" pitchFamily="18" charset="0"/>
-                                              </a:rPr>
-                                              <m:t>𝜇</m:t>
-                                            </m:r>
-                                            <m:r>
-                                              <a:rPr lang="en-US" sz="2400" i="1" smtClean="0">
-                                                <a:solidFill>
-                                                  <a:schemeClr val="accent2"/>
-                                                </a:solidFill>
-                                                <a:latin typeface="Cambria Math" panose="02040503050406030204" pitchFamily="18" charset="0"/>
-                                              </a:rPr>
-                                              <m:t>∈</m:t>
-                                            </m:r>
-                                            <m:r>
-                                              <m:rPr>
-                                                <m:nor/>
-                                              </m:rPr>
-                                              <a:rPr lang="en-US" sz="2400">
-                                                <a:solidFill>
-                                                  <a:schemeClr val="accent2"/>
-                                                </a:solidFill>
-                                                <a:latin typeface="Cambria Math" panose="02040503050406030204" pitchFamily="18" charset="0"/>
-                                              </a:rPr>
-                                              <m:t>core</m:t>
-                                            </m:r>
-                                            <m:d>
-                                              <m:dPr>
-                                                <m:ctrlPr>
-                                                  <a:rPr lang="en-US" sz="2400" i="1">
-                                                    <a:solidFill>
-                                                      <a:schemeClr val="accent2"/>
-                                                    </a:solidFill>
-                                                    <a:latin typeface="Cambria Math" panose="02040503050406030204" pitchFamily="18" charset="0"/>
-                                                  </a:rPr>
-                                                </m:ctrlPr>
-                                              </m:dPr>
-                                              <m:e>
-                                                <m:bar>
-                                                  <m:barPr>
-                                                    <m:pos m:val="top"/>
-                                                    <m:ctrlPr>
-                                                      <a:rPr lang="en-US" sz="2400" i="1">
-                                                        <a:solidFill>
-                                                          <a:schemeClr val="accent2"/>
-                                                        </a:solidFill>
-                                                        <a:latin typeface="Cambria Math" panose="02040503050406030204" pitchFamily="18" charset="0"/>
-                                                      </a:rPr>
-                                                    </m:ctrlPr>
-                                                  </m:barPr>
-                                                  <m:e>
-                                                    <m:r>
-                                                      <a:rPr lang="en-US" sz="2400" i="1">
-                                                        <a:solidFill>
-                                                          <a:schemeClr val="accent2"/>
-                                                        </a:solidFill>
-                                                        <a:latin typeface="Cambria Math" panose="02040503050406030204" pitchFamily="18" charset="0"/>
-                                                      </a:rPr>
-                                                      <m:t>𝜇</m:t>
-                                                    </m:r>
-                                                  </m:e>
-                                                </m:bar>
-                                              </m:e>
-                                            </m:d>
-                                          </m:lim>
-                                        </m:limLow>
-                                      </m:fName>
-                                      <m:e>
-                                        <m:nary>
-                                          <m:naryPr>
-                                            <m:limLoc m:val="undOvr"/>
-                                            <m:subHide m:val="on"/>
-                                            <m:supHide m:val="on"/>
-                                            <m:ctrlPr>
-                                              <a:rPr lang="en-US" sz="2400" i="1">
-                                                <a:latin typeface="Cambria Math" panose="02040503050406030204" pitchFamily="18" charset="0"/>
-                                              </a:rPr>
-                                            </m:ctrlPr>
-                                          </m:naryPr>
-                                          <m:sub/>
-                                          <m:sup/>
-                                          <m:e>
-                                            <m:r>
-                                              <a:rPr lang="en-US" sz="2400" i="1">
-                                                <a:latin typeface="Cambria Math" panose="02040503050406030204" pitchFamily="18" charset="0"/>
-                                              </a:rPr>
-                                              <m:t>𝑋</m:t>
-                                            </m:r>
-                                          </m:e>
-                                        </m:nary>
-                                        <m:r>
-                                          <a:rPr lang="en-US" sz="2400" i="1">
-                                            <a:latin typeface="Cambria Math" panose="02040503050406030204" pitchFamily="18" charset="0"/>
-                                          </a:rPr>
-                                          <m:t>ⅆ</m:t>
-                                        </m:r>
-                                        <m:r>
-                                          <a:rPr lang="en-US" sz="2400" i="1" smtClean="0">
-                                            <a:solidFill>
-                                              <a:schemeClr val="accent2"/>
-                                            </a:solidFill>
-                                            <a:latin typeface="Cambria Math" panose="02040503050406030204" pitchFamily="18" charset="0"/>
-                                          </a:rPr>
-                                          <m:t>𝜇</m:t>
-                                        </m:r>
-                                      </m:e>
-                                    </m:func>
-                                    <m:r>
-                                      <a:rPr lang="en-US" sz="2400" b="0" i="1" smtClean="0">
-                                        <a:latin typeface="Cambria Math" panose="02040503050406030204" pitchFamily="18" charset="0"/>
-                                      </a:rPr>
-                                      <m:t>,</m:t>
-                                    </m:r>
-                                    <m:func>
-                                      <m:funcPr>
-                                        <m:ctrlPr>
-                                          <a:rPr lang="en-US" sz="2400" i="1">
-                                            <a:latin typeface="Cambria Math" panose="02040503050406030204" pitchFamily="18" charset="0"/>
-                                          </a:rPr>
-                                        </m:ctrlPr>
-                                      </m:funcPr>
-                                      <m:fName>
-                                        <m:limLow>
-                                          <m:limLowPr>
-                                            <m:ctrlPr>
-                                              <a:rPr lang="en-US" sz="2400" i="1">
-                                                <a:latin typeface="Cambria Math" panose="02040503050406030204" pitchFamily="18" charset="0"/>
-                                              </a:rPr>
-                                            </m:ctrlPr>
-                                          </m:limLowPr>
-                                          <m:e>
-                                            <m:r>
-                                              <m:rPr>
-                                                <m:sty m:val="p"/>
-                                              </m:rPr>
-                                              <a:rPr lang="en-US" sz="2400">
-                                                <a:latin typeface="Cambria Math" panose="02040503050406030204" pitchFamily="18" charset="0"/>
-                                              </a:rPr>
-                                              <m:t>m</m:t>
-                                            </m:r>
-                                            <m:r>
-                                              <m:rPr>
-                                                <m:sty m:val="p"/>
-                                              </m:rPr>
-                                              <a:rPr lang="en-US" sz="2400" b="0" i="0" smtClean="0">
-                                                <a:latin typeface="Cambria Math" panose="02040503050406030204" pitchFamily="18" charset="0"/>
-                                              </a:rPr>
-                                              <m:t>ax</m:t>
-                                            </m:r>
-                                          </m:e>
-                                          <m:lim>
-                                            <m:r>
-                                              <a:rPr lang="en-US" sz="2400" i="1" smtClean="0">
-                                                <a:solidFill>
-                                                  <a:schemeClr val="accent2"/>
-                                                </a:solidFill>
-                                                <a:latin typeface="Cambria Math" panose="02040503050406030204" pitchFamily="18" charset="0"/>
-                                              </a:rPr>
-                                              <m:t>𝜇</m:t>
-                                            </m:r>
-                                            <m:r>
-                                              <a:rPr lang="en-US" sz="2400" i="1" smtClean="0">
-                                                <a:solidFill>
-                                                  <a:schemeClr val="accent2"/>
-                                                </a:solidFill>
-                                                <a:latin typeface="Cambria Math" panose="02040503050406030204" pitchFamily="18" charset="0"/>
-                                              </a:rPr>
-                                              <m:t>∈</m:t>
-                                            </m:r>
-                                            <m:r>
-                                              <m:rPr>
-                                                <m:nor/>
-                                              </m:rPr>
-                                              <a:rPr lang="en-US" sz="2400">
-                                                <a:solidFill>
-                                                  <a:schemeClr val="accent2"/>
-                                                </a:solidFill>
-                                                <a:latin typeface="Cambria Math" panose="02040503050406030204" pitchFamily="18" charset="0"/>
-                                              </a:rPr>
-                                              <m:t>core</m:t>
-                                            </m:r>
-                                            <m:d>
-                                              <m:dPr>
-                                                <m:ctrlPr>
-                                                  <a:rPr lang="en-US" sz="2400" i="1">
-                                                    <a:solidFill>
-                                                      <a:schemeClr val="accent2"/>
-                                                    </a:solidFill>
-                                                    <a:latin typeface="Cambria Math" panose="02040503050406030204" pitchFamily="18" charset="0"/>
-                                                  </a:rPr>
-                                                </m:ctrlPr>
-                                              </m:dPr>
-                                              <m:e>
-                                                <m:bar>
-                                                  <m:barPr>
-                                                    <m:pos m:val="top"/>
-                                                    <m:ctrlPr>
-                                                      <a:rPr lang="en-US" sz="2400" i="1">
-                                                        <a:solidFill>
-                                                          <a:schemeClr val="accent2"/>
-                                                        </a:solidFill>
-                                                        <a:latin typeface="Cambria Math" panose="02040503050406030204" pitchFamily="18" charset="0"/>
-                                                      </a:rPr>
-                                                    </m:ctrlPr>
-                                                  </m:barPr>
-                                                  <m:e>
-                                                    <m:r>
-                                                      <a:rPr lang="en-US" sz="2400" i="1">
-                                                        <a:solidFill>
-                                                          <a:schemeClr val="accent2"/>
-                                                        </a:solidFill>
-                                                        <a:latin typeface="Cambria Math" panose="02040503050406030204" pitchFamily="18" charset="0"/>
-                                                      </a:rPr>
-                                                      <m:t>𝜇</m:t>
-                                                    </m:r>
-                                                  </m:e>
-                                                </m:bar>
-                                              </m:e>
-                                            </m:d>
-                                          </m:lim>
-                                        </m:limLow>
-                                      </m:fName>
-                                      <m:e>
-                                        <m:nary>
-                                          <m:naryPr>
-                                            <m:limLoc m:val="undOvr"/>
-                                            <m:subHide m:val="on"/>
-                                            <m:supHide m:val="on"/>
-                                            <m:ctrlPr>
-                                              <a:rPr lang="en-US" sz="2400" i="1">
-                                                <a:latin typeface="Cambria Math" panose="02040503050406030204" pitchFamily="18" charset="0"/>
-                                              </a:rPr>
-                                            </m:ctrlPr>
-                                          </m:naryPr>
-                                          <m:sub/>
-                                          <m:sup/>
-                                          <m:e>
-                                            <m:r>
-                                              <a:rPr lang="en-US" sz="2400" i="1">
-                                                <a:latin typeface="Cambria Math" panose="02040503050406030204" pitchFamily="18" charset="0"/>
-                                              </a:rPr>
-                                              <m:t>𝑋</m:t>
-                                            </m:r>
-                                          </m:e>
-                                        </m:nary>
-                                        <m:r>
-                                          <a:rPr lang="en-US" sz="2400" i="1">
-                                            <a:latin typeface="Cambria Math" panose="02040503050406030204" pitchFamily="18" charset="0"/>
-                                          </a:rPr>
-                                          <m:t>ⅆ</m:t>
-                                        </m:r>
-                                        <m:r>
-                                          <a:rPr lang="en-US" sz="2400" i="1" smtClean="0">
-                                            <a:solidFill>
-                                              <a:schemeClr val="accent2"/>
-                                            </a:solidFill>
-                                            <a:latin typeface="Cambria Math" panose="02040503050406030204" pitchFamily="18" charset="0"/>
-                                          </a:rPr>
-                                          <m:t>𝜇</m:t>
-                                        </m:r>
-                                      </m:e>
-                                    </m:func>
-                                  </m:e>
-                                </m:d>
-                              </m:oMath>
-                            </m:oMathPara>
-                          </a14:m>
-                          <a:endParaRPr lang="en-US" sz="2200" dirty="0"/>
-                        </a:p>
-                      </a:txBody>
-                      <a:tcPr/>
-                    </a:tc>
-                    <a:tc>
-                      <a:txBody>
-                        <a:bodyPr/>
-                        <a:lstStyle/>
-                        <a:p>
-                          <a:endParaRPr lang="en-US" sz="2200" dirty="0"/>
-                        </a:p>
-                      </a:txBody>
-                      <a:tcPr/>
-                    </a:tc>
-                  </a:tr>
-                </a:tbl>
-              </a:graphicData>
-            </a:graphic>
-          </p:graphicFrame>
-        </mc:Choice>
-        <mc:Fallback xmlns="">
-          <p:graphicFrame>
-            <p:nvGraphicFramePr>
-              <p:cNvPr id="4" name="Content Placeholder 3"/>
-              <p:cNvGraphicFramePr>
-                <a:graphicFrameLocks noGrp="1"/>
-              </p:cNvGraphicFramePr>
-              <p:nvPr>
-                <p:ph idx="1"/>
-                <p:extLst>
-                  <p:ext uri="{D42A27DB-BD31-4B8C-83A1-F6EECF244321}">
-                    <p14:modId xmlns:p14="http://schemas.microsoft.com/office/powerpoint/2010/main" val="67151303"/>
-                  </p:ext>
-                </p:extLst>
-              </p:nvPr>
-            </p:nvGraphicFramePr>
-            <p:xfrm>
-              <a:off x="838200" y="1825625"/>
-              <a:ext cx="10515600" cy="4812792"/>
-            </p:xfrm>
-            <a:graphic>
-              <a:graphicData uri="http://schemas.openxmlformats.org/drawingml/2006/table">
-                <a:tbl>
-                  <a:tblPr firstRow="1" bandRow="1">
-                    <a:tableStyleId>{5C22544A-7EE6-4342-B048-85BDC9FD1C3A}</a:tableStyleId>
-                  </a:tblPr>
-                  <a:tblGrid>
-                    <a:gridCol w="5257800"/>
-                    <a:gridCol w="5257800"/>
-                  </a:tblGrid>
-                  <a:tr h="762000">
-                    <a:tc>
-                      <a:txBody>
-                        <a:bodyPr/>
-                        <a:lstStyle/>
-                        <a:p>
-                          <a:pPr marL="0" marR="0" lvl="0" indent="0" algn="l" defTabSz="914400" rtl="0" eaLnBrk="1" fontAlgn="auto" latinLnBrk="0" hangingPunct="1">
-                            <a:lnSpc>
-                              <a:spcPct val="100000"/>
-                            </a:lnSpc>
-                            <a:spcBef>
-                              <a:spcPts val="0"/>
-                            </a:spcBef>
-                            <a:spcAft>
-                              <a:spcPts val="0"/>
-                            </a:spcAft>
-                            <a:buClrTx/>
-                            <a:buSzTx/>
-                            <a:buFontTx/>
-                            <a:buNone/>
-                            <a:tabLst/>
-                            <a:defRPr/>
-                          </a:pPr>
-                          <a:r>
-                            <a:rPr lang="en-US" sz="2200" dirty="0" smtClean="0"/>
-                            <a:t>Classical </a:t>
-                          </a:r>
-                          <a:r>
-                            <a:rPr lang="en-US" sz="2200" dirty="0" smtClean="0">
-                              <a:solidFill>
-                                <a:schemeClr val="accent2"/>
-                              </a:solidFill>
-                            </a:rPr>
-                            <a:t>Interval</a:t>
-                          </a:r>
-                          <a:r>
-                            <a:rPr lang="en-US" sz="2200" dirty="0" smtClean="0"/>
-                            <a:t>-Valued Probability Measure (C</a:t>
-                          </a:r>
-                          <a:r>
-                            <a:rPr lang="en-US" sz="2200" dirty="0" smtClean="0">
-                              <a:solidFill>
-                                <a:schemeClr val="accent2"/>
-                              </a:solidFill>
-                            </a:rPr>
-                            <a:t>I</a:t>
-                          </a:r>
-                          <a:r>
-                            <a:rPr lang="en-US" sz="2200" dirty="0" smtClean="0"/>
-                            <a:t>VPM)</a:t>
-                          </a:r>
-                        </a:p>
-                      </a:txBody>
-                      <a:tcPr/>
-                    </a:tc>
-                    <a:tc>
-                      <a:txBody>
-                        <a:bodyPr/>
-                        <a:lstStyle/>
-                        <a:p>
-                          <a:pPr marL="0" marR="0" lvl="0" indent="0" algn="l" defTabSz="914400" rtl="0" eaLnBrk="1" fontAlgn="auto" latinLnBrk="0" hangingPunct="1">
-                            <a:lnSpc>
-                              <a:spcPct val="100000"/>
-                            </a:lnSpc>
-                            <a:spcBef>
-                              <a:spcPts val="0"/>
-                            </a:spcBef>
-                            <a:spcAft>
-                              <a:spcPts val="0"/>
-                            </a:spcAft>
-                            <a:buClrTx/>
-                            <a:buSzTx/>
-                            <a:buFontTx/>
-                            <a:buNone/>
-                            <a:tabLst/>
-                            <a:defRPr/>
-                          </a:pPr>
-                          <a:endParaRPr lang="en-US" sz="2200" dirty="0" smtClean="0"/>
-                        </a:p>
-                      </a:txBody>
-                      <a:tcPr/>
-                    </a:tc>
-                  </a:tr>
-                  <a:tr h="1097280">
-                    <a:tc>
-                      <a:txBody>
-                        <a:bodyPr/>
-                        <a:lstStyle/>
-                        <a:p>
-                          <a:endParaRPr lang="en-US"/>
-                        </a:p>
-                      </a:txBody>
-                      <a:tcPr>
-                        <a:blipFill rotWithShape="0">
-                          <a:blip r:embed="rId3"/>
-                          <a:stretch>
-                            <a:fillRect l="-116" t="-72778" r="-100463" b="-271111"/>
-                          </a:stretch>
-                        </a:blipFill>
-                      </a:tcPr>
-                    </a:tc>
-                    <a:tc>
-                      <a:txBody>
-                        <a:bodyPr/>
-                        <a:lstStyle/>
-                        <a:p>
-                          <a:pPr marL="0" marR="0" lvl="0" indent="0" algn="l" defTabSz="914400" rtl="0" eaLnBrk="1" fontAlgn="auto" latinLnBrk="0" hangingPunct="1">
-                            <a:lnSpc>
-                              <a:spcPct val="100000"/>
-                            </a:lnSpc>
-                            <a:spcBef>
-                              <a:spcPts val="0"/>
-                            </a:spcBef>
-                            <a:spcAft>
-                              <a:spcPts val="0"/>
-                            </a:spcAft>
-                            <a:buClrTx/>
-                            <a:buSzTx/>
-                            <a:buFontTx/>
-                            <a:buNone/>
-                            <a:tabLst>
-                              <a:tab pos="2743200" algn="ctr"/>
-                              <a:tab pos="5035550" algn="r"/>
-                            </a:tabLst>
-                            <a:defRPr/>
-                          </a:pPr>
-                          <a:endParaRPr lang="en-US" sz="2200" dirty="0" smtClean="0"/>
-                        </a:p>
-                      </a:txBody>
-                      <a:tcPr/>
-                    </a:tc>
-                  </a:tr>
-                  <a:tr h="2953512">
-                    <a:tc>
-                      <a:txBody>
-                        <a:bodyPr/>
-                        <a:lstStyle/>
-                        <a:p>
-                          <a:endParaRPr lang="en-US"/>
-                        </a:p>
-                      </a:txBody>
-                      <a:tcPr>
-                        <a:blipFill rotWithShape="0">
-                          <a:blip r:embed="rId3"/>
-                          <a:stretch>
-                            <a:fillRect l="-116" t="-64124" r="-100463" b="-619"/>
-                          </a:stretch>
-                        </a:blipFill>
-                      </a:tcPr>
-                    </a:tc>
-                    <a:tc>
-                      <a:txBody>
-                        <a:bodyPr/>
-                        <a:lstStyle/>
-                        <a:p>
-                          <a:pPr/>
-                          <a:endParaRPr lang="en-US" sz="2200" dirty="0"/>
-                        </a:p>
-                      </a:txBody>
-                      <a:tcPr/>
-                    </a:tc>
-                  </a:tr>
-                </a:tbl>
-              </a:graphicData>
-            </a:graphic>
-          </p:graphicFrame>
-        </mc:Fallback>
-      </mc:AlternateContent>
-    </p:spTree>
-    <p:extLst>
-      <p:ext uri="{BB962C8B-B14F-4D97-AF65-F5344CB8AC3E}">
-        <p14:creationId xmlns:p14="http://schemas.microsoft.com/office/powerpoint/2010/main" val="1333181481"/>
-      </p:ext>
-    </p:extLst>
-  </p:cSld>
-  <p:clrMapOvr>
-    <a:masterClrMapping/>
-  </p:clrMapOvr>
-  <p:timing>
-    <p:tnLst>
-      <p:par>
-        <p:cTn id="1" dur="indefinite" restart="never" nodeType="tmRoot"/>
-      </p:par>
-    </p:tnLst>
-  </p:timing>
-</p:sld>
-</file>
-
-<file path=ppt/slides/slide13.xml><?xml version="1.0" encoding="utf-8"?>
-<p:sld xmlns:a="http://schemas.openxmlformats.org/drawingml/2006/main" xmlns:r="http://schemas.openxmlformats.org/officeDocument/2006/relationships" xmlns:p="http://schemas.openxmlformats.org/presentationml/2006/main">
-  <p:cSld>
-    <p:spTree>
-      <p:nvGrpSpPr>
-        <p:cNvPr id="1" name=""/>
-        <p:cNvGrpSpPr/>
-        <p:nvPr/>
-      </p:nvGrpSpPr>
-      <p:grpSpPr>
-        <a:xfrm>
-          <a:off x="0" y="0"/>
-          <a:ext cx="0" cy="0"/>
-          <a:chOff x="0" y="0"/>
-          <a:chExt cx="0" cy="0"/>
-        </a:xfrm>
-      </p:grpSpPr>
-      <p:sp>
-        <p:nvSpPr>
-          <p:cNvPr id="2" name="Title 1"/>
-          <p:cNvSpPr>
-            <a:spLocks noGrp="1"/>
-          </p:cNvSpPr>
-          <p:nvPr>
-            <p:ph type="title"/>
-          </p:nvPr>
-        </p:nvSpPr>
-        <p:spPr/>
-        <p:txBody>
-          <a:bodyPr/>
-          <a:lstStyle/>
-          <a:p>
-            <a:r>
               <a:rPr lang="en-US" dirty="0"/>
               <a:t>Convexity</a:t>
             </a:r>
@@ -6362,71 +4745,6 @@
                   </m:oMath>
                 </a14:m>
                 <a:endParaRPr lang="en-US" dirty="0"/>
-              </a:p>
-              <a:p>
-                <a:pPr>
-                  <a:lnSpc>
-                    <a:spcPct val="95000"/>
-                  </a:lnSpc>
-                </a:pPr>
-                <a14:m>
-                  <m:oMath xmlns:m="http://schemas.openxmlformats.org/officeDocument/2006/math">
-                    <m:bar>
-                      <m:barPr>
-                        <m:pos m:val="top"/>
-                        <m:ctrlPr>
-                          <a:rPr lang="en-US" i="1">
-                            <a:latin typeface="Cambria Math" panose="02040503050406030204" pitchFamily="18" charset="0"/>
-                          </a:rPr>
-                        </m:ctrlPr>
-                      </m:barPr>
-                      <m:e>
-                        <m:r>
-                          <a:rPr lang="en-US" i="1">
-                            <a:latin typeface="Cambria Math" panose="02040503050406030204" pitchFamily="18" charset="0"/>
-                          </a:rPr>
-                          <m:t>𝜇</m:t>
-                        </m:r>
-                      </m:e>
-                    </m:bar>
-                    <m:r>
-                      <a:rPr lang="en-US" i="1">
-                        <a:latin typeface="Cambria Math" panose="02040503050406030204" pitchFamily="18" charset="0"/>
-                      </a:rPr>
-                      <m:t>:</m:t>
-                    </m:r>
-                    <m:r>
-                      <a:rPr lang="en-US" i="1">
-                        <a:latin typeface="Cambria Math" panose="02040503050406030204" pitchFamily="18" charset="0"/>
-                        <a:ea typeface="Cambria Math" panose="02040503050406030204" pitchFamily="18" charset="0"/>
-                      </a:rPr>
-                      <m:t>ℰ</m:t>
-                    </m:r>
-                    <m:r>
-                      <a:rPr lang="en-US">
-                        <a:latin typeface="Cambria Math" panose="02040503050406030204" pitchFamily="18" charset="0"/>
-                        <a:ea typeface="Cambria Math" panose="02040503050406030204" pitchFamily="18" charset="0"/>
-                      </a:rPr>
-                      <m:t>→</m:t>
-                    </m:r>
-                    <m:r>
-                      <a:rPr lang="en-US" i="1" smtClean="0">
-                        <a:latin typeface="XITS Math" panose="02000503000000000000" pitchFamily="50" charset="0"/>
-                        <a:ea typeface="XITS Math" panose="02000503000000000000" pitchFamily="50" charset="0"/>
-                        <a:cs typeface="XITS Math" panose="02000503000000000000" pitchFamily="50" charset="0"/>
-                      </a:rPr>
-                      <m:t>ℐ</m:t>
-                    </m:r>
-                  </m:oMath>
-                </a14:m>
-                <a:endParaRPr lang="en-US" i="1" dirty="0" smtClean="0">
-                  <a:solidFill>
-                    <a:schemeClr val="tx1"/>
-                  </a:solidFill>
-                  <a:latin typeface="XITS Math" panose="02000503000000000000" pitchFamily="50" charset="0"/>
-                  <a:ea typeface="XITS Math" panose="02000503000000000000" pitchFamily="50" charset="0"/>
-                  <a:cs typeface="XITS Math" panose="02000503000000000000" pitchFamily="50" charset="0"/>
-                </a:endParaRPr>
               </a:p>
               <a:p>
                 <a:pPr>
@@ -7092,7 +5410,7 @@
             <p:spPr/>
             <p:txBody>
               <a:bodyPr>
-                <a:normAutofit lnSpcReduction="10000"/>
+                <a:normAutofit fontScale="92500" lnSpcReduction="10000"/>
               </a:bodyPr>
               <a:lstStyle/>
               <a:p>
@@ -7410,71 +5728,17 @@
                     <a:spcPct val="100000"/>
                   </a:lnSpc>
                 </a:pPr>
-                <a14:m>
-                  <m:oMath xmlns:m="http://schemas.openxmlformats.org/officeDocument/2006/math">
-                    <m:bar>
-                      <m:barPr>
-                        <m:pos m:val="top"/>
-                        <m:ctrlPr>
-                          <a:rPr lang="en-US" i="1">
-                            <a:latin typeface="Cambria Math" panose="02040503050406030204" pitchFamily="18" charset="0"/>
-                          </a:rPr>
-                        </m:ctrlPr>
-                      </m:barPr>
-                      <m:e>
-                        <m:r>
-                          <a:rPr lang="en-US" i="1">
-                            <a:latin typeface="Cambria Math" panose="02040503050406030204" pitchFamily="18" charset="0"/>
-                          </a:rPr>
-                          <m:t>𝜇</m:t>
-                        </m:r>
-                      </m:e>
-                    </m:bar>
-                    <m:r>
-                      <a:rPr lang="en-US" i="1">
-                        <a:latin typeface="Cambria Math" panose="02040503050406030204" pitchFamily="18" charset="0"/>
-                      </a:rPr>
-                      <m:t>:</m:t>
-                    </m:r>
-                    <m:r>
-                      <a:rPr lang="en-US" i="1">
-                        <a:latin typeface="Cambria Math" panose="02040503050406030204" pitchFamily="18" charset="0"/>
-                        <a:ea typeface="Cambria Math" panose="02040503050406030204" pitchFamily="18" charset="0"/>
-                      </a:rPr>
-                      <m:t>ℰ</m:t>
-                    </m:r>
-                    <m:r>
-                      <a:rPr lang="en-US">
-                        <a:latin typeface="Cambria Math" panose="02040503050406030204" pitchFamily="18" charset="0"/>
-                        <a:ea typeface="Cambria Math" panose="02040503050406030204" pitchFamily="18" charset="0"/>
-                      </a:rPr>
-                      <m:t>→</m:t>
-                    </m:r>
-                    <m:r>
-                      <a:rPr lang="en-US" i="1">
-                        <a:latin typeface="XITS Math" panose="02000503000000000000" pitchFamily="50" charset="0"/>
-                        <a:ea typeface="XITS Math" panose="02000503000000000000" pitchFamily="50" charset="0"/>
-                        <a:cs typeface="XITS Math" panose="02000503000000000000" pitchFamily="50" charset="0"/>
-                      </a:rPr>
-                      <m:t>ℐ</m:t>
-                    </m:r>
-                  </m:oMath>
-                </a14:m>
-                <a:endParaRPr lang="en-US" dirty="0" smtClean="0"/>
-              </a:p>
-              <a:p>
-                <a:pPr>
-                  <a:lnSpc>
-                    <a:spcPct val="100000"/>
-                  </a:lnSpc>
-                </a:pPr>
                 <a:r>
-                  <a:rPr lang="en-US" i="1" dirty="0"/>
+                  <a:rPr lang="en-US" i="1" dirty="0" smtClean="0"/>
                   <a:t>convexity</a:t>
                 </a:r>
                 <a:r>
+                  <a:rPr lang="en-US" dirty="0" smtClean="0"/>
+                  <a:t> </a:t>
+                </a:r>
+                <a:r>
                   <a:rPr lang="en-US" dirty="0"/>
-                  <a:t> condition:</a:t>
+                  <a:t>condition:</a:t>
                 </a:r>
                 <a:br>
                   <a:rPr lang="en-US" dirty="0"/>
@@ -7550,7 +5814,7 @@
                             <a:latin typeface="Cambria Math" panose="02040503050406030204" pitchFamily="18" charset="0"/>
                             <a:ea typeface="Cambria Math" panose="02040503050406030204" pitchFamily="18" charset="0"/>
                           </a:rPr>
-                          <m:t>∨</m:t>
+                          <m:t>+</m:t>
                         </m:r>
                         <m:sSub>
                           <m:sSubPr>
@@ -7566,6 +5830,83 @@
                           <m:e>
                             <m:r>
                               <a:rPr lang="en-US" b="0" i="1" smtClean="0">
+                                <a:solidFill>
+                                  <a:srgbClr val="FF0000"/>
+                                </a:solidFill>
+                                <a:latin typeface="Cambria Math" panose="02040503050406030204" pitchFamily="18" charset="0"/>
+                              </a:rPr>
+                              <m:t>𝑃</m:t>
+                            </m:r>
+                          </m:e>
+                          <m:sub>
+                            <m:r>
+                              <a:rPr lang="en-US" i="1">
+                                <a:solidFill>
+                                  <a:srgbClr val="FF0000"/>
+                                </a:solidFill>
+                                <a:latin typeface="Cambria Math" panose="02040503050406030204" pitchFamily="18" charset="0"/>
+                              </a:rPr>
+                              <m:t>1</m:t>
+                            </m:r>
+                          </m:sub>
+                        </m:sSub>
+                        <m:r>
+                          <a:rPr lang="en-US" b="0" i="1" smtClean="0">
+                            <a:solidFill>
+                              <a:srgbClr val="FF0000"/>
+                            </a:solidFill>
+                            <a:latin typeface="Cambria Math" panose="02040503050406030204" pitchFamily="18" charset="0"/>
+                          </a:rPr>
+                          <m:t>−</m:t>
+                        </m:r>
+                        <m:sSub>
+                          <m:sSubPr>
+                            <m:ctrlPr>
+                              <a:rPr lang="en-US" i="1">
+                                <a:solidFill>
+                                  <a:srgbClr val="FF0000"/>
+                                </a:solidFill>
+                                <a:latin typeface="Cambria Math" panose="02040503050406030204" pitchFamily="18" charset="0"/>
+                              </a:rPr>
+                            </m:ctrlPr>
+                          </m:sSubPr>
+                          <m:e>
+                            <m:r>
+                              <a:rPr lang="en-US" i="1">
+                                <a:solidFill>
+                                  <a:srgbClr val="FF0000"/>
+                                </a:solidFill>
+                                <a:latin typeface="Cambria Math" panose="02040503050406030204" pitchFamily="18" charset="0"/>
+                              </a:rPr>
+                              <m:t>𝑃</m:t>
+                            </m:r>
+                          </m:e>
+                          <m:sub>
+                            <m:r>
+                              <a:rPr lang="en-US" i="1">
+                                <a:solidFill>
+                                  <a:srgbClr val="FF0000"/>
+                                </a:solidFill>
+                                <a:latin typeface="Cambria Math" panose="02040503050406030204" pitchFamily="18" charset="0"/>
+                              </a:rPr>
+                              <m:t>0</m:t>
+                            </m:r>
+                          </m:sub>
+                        </m:sSub>
+                        <m:sSub>
+                          <m:sSubPr>
+                            <m:ctrlPr>
+                              <a:rPr lang="en-US" i="1">
+                                <a:solidFill>
+                                  <a:srgbClr val="FF0000"/>
+                                </a:solidFill>
+                                <a:latin typeface="Cambria Math" panose="02040503050406030204" pitchFamily="18" charset="0"/>
+                              </a:rPr>
+                            </m:ctrlPr>
+                          </m:sSubPr>
+                          <m:e>
+                            <m:r>
+                              <a:rPr lang="en-US" i="1">
                                 <a:solidFill>
                                   <a:srgbClr val="FF0000"/>
                                 </a:solidFill>
@@ -7822,7 +6163,19 @@
                 </a:br>
                 <a:r>
                   <a:rPr lang="en-US" dirty="0"/>
-                  <a:t>for any events </a:t>
+                  <a:t>for any </a:t>
+                </a:r>
+                <a:r>
+                  <a:rPr lang="en-US" dirty="0" smtClean="0">
+                    <a:solidFill>
+                      <a:srgbClr val="FF0000"/>
+                    </a:solidFill>
+                  </a:rPr>
+                  <a:t>commuting</a:t>
+                </a:r>
+                <a:r>
+                  <a:rPr lang="en-US" dirty="0" smtClean="0"/>
+                  <a:t> </a:t>
                 </a:r>
                 <a14:m>
                   <m:oMath xmlns:m="http://schemas.openxmlformats.org/officeDocument/2006/math">
@@ -7887,9 +6240,338 @@
                   </m:oMath>
                 </a14:m>
                 <a:r>
-                  <a:rPr lang="en-US" dirty="0"/>
+                  <a:rPr lang="en-US" dirty="0" smtClean="0"/>
                   <a:t>.</a:t>
                 </a:r>
+              </a:p>
+              <a:p>
+                <a:pPr>
+                  <a:lnSpc>
+                    <a:spcPct val="100000"/>
+                  </a:lnSpc>
+                </a:pPr>
+                <a:r>
+                  <a:rPr lang="en-US" dirty="0" smtClean="0"/>
+                  <a:t>Since if </a:t>
+                </a:r>
+                <a14:m>
+                  <m:oMath xmlns:m="http://schemas.openxmlformats.org/officeDocument/2006/math">
+                    <m:sSub>
+                      <m:sSubPr>
+                        <m:ctrlPr>
+                          <a:rPr lang="en-US" i="1">
+                            <a:latin typeface="Cambria Math" panose="02040503050406030204" pitchFamily="18" charset="0"/>
+                          </a:rPr>
+                        </m:ctrlPr>
+                      </m:sSubPr>
+                      <m:e>
+                        <m:r>
+                          <a:rPr lang="en-US" i="1">
+                            <a:latin typeface="Cambria Math" panose="02040503050406030204" pitchFamily="18" charset="0"/>
+                          </a:rPr>
+                          <m:t>𝑃</m:t>
+                        </m:r>
+                      </m:e>
+                      <m:sub>
+                        <m:r>
+                          <a:rPr lang="en-US" i="1">
+                            <a:latin typeface="Cambria Math" panose="02040503050406030204" pitchFamily="18" charset="0"/>
+                          </a:rPr>
+                          <m:t>0</m:t>
+                        </m:r>
+                      </m:sub>
+                    </m:sSub>
+                  </m:oMath>
+                </a14:m>
+                <a:r>
+                  <a:rPr lang="en-US" dirty="0"/>
+                  <a:t> and </a:t>
+                </a:r>
+                <a14:m>
+                  <m:oMath xmlns:m="http://schemas.openxmlformats.org/officeDocument/2006/math">
+                    <m:sSub>
+                      <m:sSubPr>
+                        <m:ctrlPr>
+                          <a:rPr lang="en-US" i="1">
+                            <a:latin typeface="Cambria Math" panose="02040503050406030204" pitchFamily="18" charset="0"/>
+                          </a:rPr>
+                        </m:ctrlPr>
+                      </m:sSubPr>
+                      <m:e>
+                        <m:r>
+                          <a:rPr lang="en-US" i="1">
+                            <a:latin typeface="Cambria Math" panose="02040503050406030204" pitchFamily="18" charset="0"/>
+                          </a:rPr>
+                          <m:t>𝑃</m:t>
+                        </m:r>
+                      </m:e>
+                      <m:sub>
+                        <m:r>
+                          <a:rPr lang="en-US" i="1">
+                            <a:latin typeface="Cambria Math" panose="02040503050406030204" pitchFamily="18" charset="0"/>
+                          </a:rPr>
+                          <m:t>1</m:t>
+                        </m:r>
+                      </m:sub>
+                    </m:sSub>
+                  </m:oMath>
+                </a14:m>
+                <a:r>
+                  <a:rPr lang="en-US" dirty="0" smtClean="0"/>
+                  <a:t> do not </a:t>
+                </a:r>
+                <a:r>
+                  <a:rPr lang="en-US" dirty="0" smtClean="0">
+                    <a:solidFill>
+                      <a:srgbClr val="FF0000"/>
+                    </a:solidFill>
+                  </a:rPr>
+                  <a:t>commute</a:t>
+                </a:r>
+                <a:r>
+                  <a:rPr lang="en-US" dirty="0" smtClean="0"/>
+                  <a:t>, </a:t>
+                </a:r>
+                <a14:m>
+                  <m:oMath xmlns:m="http://schemas.openxmlformats.org/officeDocument/2006/math">
+                    <m:sSub>
+                      <m:sSubPr>
+                        <m:ctrlPr>
+                          <a:rPr lang="en-US" i="1">
+                            <a:solidFill>
+                              <a:srgbClr val="FF0000"/>
+                            </a:solidFill>
+                            <a:latin typeface="Cambria Math" panose="02040503050406030204" pitchFamily="18" charset="0"/>
+                          </a:rPr>
+                        </m:ctrlPr>
+                      </m:sSubPr>
+                      <m:e>
+                        <m:r>
+                          <a:rPr lang="en-US" i="1">
+                            <a:solidFill>
+                              <a:srgbClr val="FF0000"/>
+                            </a:solidFill>
+                            <a:latin typeface="Cambria Math" panose="02040503050406030204" pitchFamily="18" charset="0"/>
+                          </a:rPr>
+                          <m:t>𝑃</m:t>
+                        </m:r>
+                      </m:e>
+                      <m:sub>
+                        <m:r>
+                          <a:rPr lang="en-US" i="1">
+                            <a:solidFill>
+                              <a:srgbClr val="FF0000"/>
+                            </a:solidFill>
+                            <a:latin typeface="Cambria Math" panose="02040503050406030204" pitchFamily="18" charset="0"/>
+                          </a:rPr>
+                          <m:t>0</m:t>
+                        </m:r>
+                      </m:sub>
+                    </m:sSub>
+                    <m:r>
+                      <a:rPr lang="en-US" i="1">
+                        <a:solidFill>
+                          <a:srgbClr val="FF0000"/>
+                        </a:solidFill>
+                        <a:latin typeface="Cambria Math" panose="02040503050406030204" pitchFamily="18" charset="0"/>
+                        <a:ea typeface="Cambria Math" panose="02040503050406030204" pitchFamily="18" charset="0"/>
+                      </a:rPr>
+                      <m:t>+</m:t>
+                    </m:r>
+                    <m:sSub>
+                      <m:sSubPr>
+                        <m:ctrlPr>
+                          <a:rPr lang="en-US" i="1">
+                            <a:solidFill>
+                              <a:srgbClr val="FF0000"/>
+                            </a:solidFill>
+                            <a:latin typeface="Cambria Math" panose="02040503050406030204" pitchFamily="18" charset="0"/>
+                          </a:rPr>
+                        </m:ctrlPr>
+                      </m:sSubPr>
+                      <m:e>
+                        <m:r>
+                          <a:rPr lang="en-US" i="1">
+                            <a:solidFill>
+                              <a:srgbClr val="FF0000"/>
+                            </a:solidFill>
+                            <a:latin typeface="Cambria Math" panose="02040503050406030204" pitchFamily="18" charset="0"/>
+                          </a:rPr>
+                          <m:t>𝑃</m:t>
+                        </m:r>
+                      </m:e>
+                      <m:sub>
+                        <m:r>
+                          <a:rPr lang="en-US" i="1">
+                            <a:solidFill>
+                              <a:srgbClr val="FF0000"/>
+                            </a:solidFill>
+                            <a:latin typeface="Cambria Math" panose="02040503050406030204" pitchFamily="18" charset="0"/>
+                          </a:rPr>
+                          <m:t>1</m:t>
+                        </m:r>
+                      </m:sub>
+                    </m:sSub>
+                    <m:r>
+                      <a:rPr lang="en-US" i="1">
+                        <a:solidFill>
+                          <a:srgbClr val="FF0000"/>
+                        </a:solidFill>
+                        <a:latin typeface="Cambria Math" panose="02040503050406030204" pitchFamily="18" charset="0"/>
+                      </a:rPr>
+                      <m:t>−</m:t>
+                    </m:r>
+                    <m:sSub>
+                      <m:sSubPr>
+                        <m:ctrlPr>
+                          <a:rPr lang="en-US" i="1">
+                            <a:solidFill>
+                              <a:srgbClr val="FF0000"/>
+                            </a:solidFill>
+                            <a:latin typeface="Cambria Math" panose="02040503050406030204" pitchFamily="18" charset="0"/>
+                          </a:rPr>
+                        </m:ctrlPr>
+                      </m:sSubPr>
+                      <m:e>
+                        <m:r>
+                          <a:rPr lang="en-US" i="1">
+                            <a:solidFill>
+                              <a:srgbClr val="FF0000"/>
+                            </a:solidFill>
+                            <a:latin typeface="Cambria Math" panose="02040503050406030204" pitchFamily="18" charset="0"/>
+                          </a:rPr>
+                          <m:t>𝑃</m:t>
+                        </m:r>
+                      </m:e>
+                      <m:sub>
+                        <m:r>
+                          <a:rPr lang="en-US" i="1">
+                            <a:solidFill>
+                              <a:srgbClr val="FF0000"/>
+                            </a:solidFill>
+                            <a:latin typeface="Cambria Math" panose="02040503050406030204" pitchFamily="18" charset="0"/>
+                          </a:rPr>
+                          <m:t>0</m:t>
+                        </m:r>
+                      </m:sub>
+                    </m:sSub>
+                    <m:sSub>
+                      <m:sSubPr>
+                        <m:ctrlPr>
+                          <a:rPr lang="en-US" i="1">
+                            <a:solidFill>
+                              <a:srgbClr val="FF0000"/>
+                            </a:solidFill>
+                            <a:latin typeface="Cambria Math" panose="02040503050406030204" pitchFamily="18" charset="0"/>
+                          </a:rPr>
+                        </m:ctrlPr>
+                      </m:sSubPr>
+                      <m:e>
+                        <m:r>
+                          <a:rPr lang="en-US" i="1">
+                            <a:solidFill>
+                              <a:srgbClr val="FF0000"/>
+                            </a:solidFill>
+                            <a:latin typeface="Cambria Math" panose="02040503050406030204" pitchFamily="18" charset="0"/>
+                          </a:rPr>
+                          <m:t>𝑃</m:t>
+                        </m:r>
+                      </m:e>
+                      <m:sub>
+                        <m:r>
+                          <a:rPr lang="en-US" i="1">
+                            <a:solidFill>
+                              <a:srgbClr val="FF0000"/>
+                            </a:solidFill>
+                            <a:latin typeface="Cambria Math" panose="02040503050406030204" pitchFamily="18" charset="0"/>
+                          </a:rPr>
+                          <m:t>1</m:t>
+                        </m:r>
+                      </m:sub>
+                    </m:sSub>
+                  </m:oMath>
+                </a14:m>
+                <a:r>
+                  <a:rPr lang="en-US" dirty="0" smtClean="0"/>
+                  <a:t> and </a:t>
+                </a:r>
+                <a14:m>
+                  <m:oMath xmlns:m="http://schemas.openxmlformats.org/officeDocument/2006/math">
+                    <m:sSub>
+                      <m:sSubPr>
+                        <m:ctrlPr>
+                          <a:rPr lang="en-US" i="1">
+                            <a:solidFill>
+                              <a:srgbClr val="FF0000"/>
+                            </a:solidFill>
+                            <a:latin typeface="Cambria Math" panose="02040503050406030204" pitchFamily="18" charset="0"/>
+                          </a:rPr>
+                        </m:ctrlPr>
+                      </m:sSubPr>
+                      <m:e>
+                        <m:r>
+                          <a:rPr lang="en-US" i="1">
+                            <a:solidFill>
+                              <a:srgbClr val="FF0000"/>
+                            </a:solidFill>
+                            <a:latin typeface="Cambria Math" panose="02040503050406030204" pitchFamily="18" charset="0"/>
+                          </a:rPr>
+                          <m:t>𝑃</m:t>
+                        </m:r>
+                      </m:e>
+                      <m:sub>
+                        <m:r>
+                          <a:rPr lang="en-US" i="1">
+                            <a:solidFill>
+                              <a:srgbClr val="FF0000"/>
+                            </a:solidFill>
+                            <a:latin typeface="Cambria Math" panose="02040503050406030204" pitchFamily="18" charset="0"/>
+                          </a:rPr>
+                          <m:t>0</m:t>
+                        </m:r>
+                      </m:sub>
+                    </m:sSub>
+                    <m:sSub>
+                      <m:sSubPr>
+                        <m:ctrlPr>
+                          <a:rPr lang="en-US" i="1">
+                            <a:solidFill>
+                              <a:srgbClr val="FF0000"/>
+                            </a:solidFill>
+                            <a:latin typeface="Cambria Math" panose="02040503050406030204" pitchFamily="18" charset="0"/>
+                          </a:rPr>
+                        </m:ctrlPr>
+                      </m:sSubPr>
+                      <m:e>
+                        <m:r>
+                          <a:rPr lang="en-US" i="1">
+                            <a:solidFill>
+                              <a:srgbClr val="FF0000"/>
+                            </a:solidFill>
+                            <a:latin typeface="Cambria Math" panose="02040503050406030204" pitchFamily="18" charset="0"/>
+                          </a:rPr>
+                          <m:t>𝑃</m:t>
+                        </m:r>
+                      </m:e>
+                      <m:sub>
+                        <m:r>
+                          <a:rPr lang="en-US" i="1">
+                            <a:solidFill>
+                              <a:srgbClr val="FF0000"/>
+                            </a:solidFill>
+                            <a:latin typeface="Cambria Math" panose="02040503050406030204" pitchFamily="18" charset="0"/>
+                          </a:rPr>
+                          <m:t>1</m:t>
+                        </m:r>
+                      </m:sub>
+                    </m:sSub>
+                  </m:oMath>
+                </a14:m>
+                <a:r>
+                  <a:rPr lang="en-US" dirty="0" smtClean="0"/>
+                  <a:t> are not projectors.</a:t>
+                </a:r>
+                <a:endParaRPr lang="en-US" dirty="0"/>
               </a:p>
               <a:p>
                 <a:pPr>
@@ -7925,7 +6607,7 @@
               <a:blipFill rotWithShape="0">
                 <a:blip r:embed="rId3"/>
                 <a:stretch>
-                  <a:fillRect l="-2118" b="-1490"/>
+                  <a:fillRect l="-1882" r="-2588" b="-2483"/>
                 </a:stretch>
               </a:blipFill>
             </p:spPr>
@@ -7948,6 +6630,1427 @@
     <p:extLst>
       <p:ext uri="{BB962C8B-B14F-4D97-AF65-F5344CB8AC3E}">
         <p14:creationId xmlns:p14="http://schemas.microsoft.com/office/powerpoint/2010/main" val="3998013743"/>
+      </p:ext>
+    </p:extLst>
+  </p:cSld>
+  <p:clrMapOvr>
+    <a:masterClrMapping/>
+  </p:clrMapOvr>
+  <p:timing>
+    <p:tnLst>
+      <p:par>
+        <p:cTn id="1" dur="indefinite" restart="never" nodeType="tmRoot"/>
+      </p:par>
+    </p:tnLst>
+  </p:timing>
+</p:sld>
+</file>
+
+<file path=ppt/slides/slide13.xml><?xml version="1.0" encoding="utf-8"?>
+<p:sld xmlns:a="http://schemas.openxmlformats.org/drawingml/2006/main" xmlns:r="http://schemas.openxmlformats.org/officeDocument/2006/relationships" xmlns:p="http://schemas.openxmlformats.org/presentationml/2006/main">
+  <p:cSld>
+    <p:spTree>
+      <p:nvGrpSpPr>
+        <p:cNvPr id="1" name=""/>
+        <p:cNvGrpSpPr/>
+        <p:nvPr/>
+      </p:nvGrpSpPr>
+      <p:grpSpPr>
+        <a:xfrm>
+          <a:off x="0" y="0"/>
+          <a:ext cx="0" cy="0"/>
+          <a:chOff x="0" y="0"/>
+          <a:chExt cx="0" cy="0"/>
+        </a:xfrm>
+      </p:grpSpPr>
+      <p:sp>
+        <p:nvSpPr>
+          <p:cNvPr id="2" name="Title 1"/>
+          <p:cNvSpPr>
+            <a:spLocks noGrp="1"/>
+          </p:cNvSpPr>
+          <p:nvPr>
+            <p:ph type="title"/>
+          </p:nvPr>
+        </p:nvSpPr>
+        <p:spPr/>
+        <p:txBody>
+          <a:bodyPr/>
+          <a:lstStyle/>
+          <a:p>
+            <a:r>
+              <a:rPr lang="en-US"/>
+              <a:t>Expectation Value</a:t>
+            </a:r>
+            <a:endParaRPr lang="en-US" dirty="0"/>
+          </a:p>
+        </p:txBody>
+      </p:sp>
+      <p:sp>
+        <p:nvSpPr>
+          <p:cNvPr id="3" name="Text Placeholder 2"/>
+          <p:cNvSpPr>
+            <a:spLocks noGrp="1"/>
+          </p:cNvSpPr>
+          <p:nvPr>
+            <p:ph type="body" idx="1"/>
+          </p:nvPr>
+        </p:nvSpPr>
+        <p:spPr/>
+        <p:txBody>
+          <a:bodyPr/>
+          <a:lstStyle/>
+          <a:p>
+            <a:r>
+              <a:rPr lang="en-US" dirty="0">
+                <a:solidFill>
+                  <a:srgbClr val="FF0000"/>
+                </a:solidFill>
+              </a:rPr>
+              <a:t>Classical</a:t>
+            </a:r>
+            <a:r>
+              <a:rPr lang="en-US" dirty="0"/>
+              <a:t> Interval-Valued Probability Measure (</a:t>
+            </a:r>
+            <a:r>
+              <a:rPr lang="en-US" dirty="0">
+                <a:solidFill>
+                  <a:srgbClr val="FF0000"/>
+                </a:solidFill>
+              </a:rPr>
+              <a:t>C</a:t>
+            </a:r>
+            <a:r>
+              <a:rPr lang="en-US" dirty="0"/>
+              <a:t>IVPM</a:t>
+            </a:r>
+            <a:r>
+              <a:rPr lang="en-US" dirty="0" smtClean="0"/>
+              <a:t>)</a:t>
+            </a:r>
+            <a:endParaRPr lang="en-US" dirty="0"/>
+          </a:p>
+        </p:txBody>
+      </p:sp>
+      <mc:AlternateContent xmlns:mc="http://schemas.openxmlformats.org/markup-compatibility/2006">
+        <mc:Choice xmlns:a14="http://schemas.microsoft.com/office/drawing/2010/main" Requires="a14">
+          <p:sp>
+            <p:nvSpPr>
+              <p:cNvPr id="4" name="Content Placeholder 3"/>
+              <p:cNvSpPr>
+                <a:spLocks noGrp="1"/>
+              </p:cNvSpPr>
+              <p:nvPr>
+                <p:ph sz="half" idx="2"/>
+              </p:nvPr>
+            </p:nvSpPr>
+            <p:spPr/>
+            <p:txBody>
+              <a:bodyPr>
+                <a:normAutofit fontScale="85000" lnSpcReduction="10000"/>
+              </a:bodyPr>
+              <a:lstStyle/>
+              <a:p>
+                <a:pPr>
+                  <a:lnSpc>
+                    <a:spcPct val="95000"/>
+                  </a:lnSpc>
+                </a:pPr>
+                <a:r>
+                  <a:rPr lang="en-US" dirty="0" smtClean="0">
+                    <a:solidFill>
+                      <a:schemeClr val="tx1"/>
+                    </a:solidFill>
+                  </a:rPr>
+                  <a:t>For every convex CIVPM</a:t>
+                </a:r>
+                <a:r>
+                  <a:rPr lang="en-US" dirty="0">
+                    <a:solidFill>
+                      <a:schemeClr val="tx1"/>
+                    </a:solidFill>
+                  </a:rPr>
+                  <a:t> </a:t>
+                </a:r>
+                <a14:m>
+                  <m:oMath xmlns:m="http://schemas.openxmlformats.org/officeDocument/2006/math">
+                    <m:bar>
+                      <m:barPr>
+                        <m:pos m:val="top"/>
+                        <m:ctrlPr>
+                          <a:rPr lang="en-US" i="1">
+                            <a:solidFill>
+                              <a:schemeClr val="tx1"/>
+                            </a:solidFill>
+                            <a:latin typeface="Cambria Math" panose="02040503050406030204" pitchFamily="18" charset="0"/>
+                          </a:rPr>
+                        </m:ctrlPr>
+                      </m:barPr>
+                      <m:e>
+                        <m:r>
+                          <a:rPr lang="en-US" i="1">
+                            <a:solidFill>
+                              <a:schemeClr val="tx1"/>
+                            </a:solidFill>
+                            <a:latin typeface="Cambria Math" panose="02040503050406030204" pitchFamily="18" charset="0"/>
+                          </a:rPr>
+                          <m:t>𝜇</m:t>
+                        </m:r>
+                      </m:e>
+                    </m:bar>
+                    <m:r>
+                      <a:rPr lang="en-US" i="1">
+                        <a:solidFill>
+                          <a:schemeClr val="tx1"/>
+                        </a:solidFill>
+                        <a:latin typeface="Cambria Math" panose="02040503050406030204" pitchFamily="18" charset="0"/>
+                      </a:rPr>
+                      <m:t>:</m:t>
+                    </m:r>
+                    <m:r>
+                      <a:rPr lang="en-US" i="1">
+                        <a:latin typeface="Cambria Math" panose="02040503050406030204" pitchFamily="18" charset="0"/>
+                        <a:ea typeface="Cambria Math" panose="02040503050406030204" pitchFamily="18" charset="0"/>
+                      </a:rPr>
+                      <m:t>ℰ</m:t>
+                    </m:r>
+                    <m:r>
+                      <a:rPr lang="en-US">
+                        <a:solidFill>
+                          <a:schemeClr val="tx1"/>
+                        </a:solidFill>
+                        <a:latin typeface="Cambria Math" panose="02040503050406030204" pitchFamily="18" charset="0"/>
+                        <a:ea typeface="Cambria Math" panose="02040503050406030204" pitchFamily="18" charset="0"/>
+                      </a:rPr>
+                      <m:t>→</m:t>
+                    </m:r>
+                    <m:d>
+                      <m:dPr>
+                        <m:begChr m:val=""/>
+                        <m:endChr m:val=""/>
+                        <m:ctrlPr>
+                          <a:rPr lang="en-US" i="1">
+                            <a:solidFill>
+                              <a:schemeClr val="tx1"/>
+                            </a:solidFill>
+                            <a:latin typeface="Cambria Math" panose="02040503050406030204" pitchFamily="18" charset="0"/>
+                            <a:ea typeface="Cambria Math" panose="02040503050406030204" pitchFamily="18" charset="0"/>
+                            <a:cs typeface="XITS Math" panose="02000503000000000000" pitchFamily="50" charset="0"/>
+                          </a:rPr>
+                        </m:ctrlPr>
+                      </m:dPr>
+                      <m:e>
+                        <m:r>
+                          <a:rPr lang="en-US" i="1">
+                            <a:solidFill>
+                              <a:schemeClr val="tx1"/>
+                            </a:solidFill>
+                            <a:latin typeface="XITS Math" panose="02000503000000000000" pitchFamily="50" charset="0"/>
+                            <a:ea typeface="XITS Math" panose="02000503000000000000" pitchFamily="50" charset="0"/>
+                            <a:cs typeface="XITS Math" panose="02000503000000000000" pitchFamily="50" charset="0"/>
+                          </a:rPr>
+                          <m:t>ℐ</m:t>
+                        </m:r>
+                      </m:e>
+                    </m:d>
+                  </m:oMath>
+                </a14:m>
+                <a:r>
+                  <a:rPr lang="en-US" dirty="0">
+                    <a:solidFill>
+                      <a:schemeClr val="tx1"/>
+                    </a:solidFill>
+                  </a:rPr>
+                  <a:t> </a:t>
+                </a:r>
+                <a:r>
+                  <a:rPr lang="en-US" dirty="0">
+                    <a:solidFill>
+                      <a:schemeClr val="tx1"/>
+                    </a:solidFill>
+                  </a:rPr>
+                  <a:t>and any random variable</a:t>
+                </a:r>
+                <a:r>
+                  <a:rPr lang="en-US" dirty="0">
+                    <a:solidFill>
+                      <a:schemeClr val="tx1"/>
+                    </a:solidFill>
+                  </a:rPr>
+                  <a:t> </a:t>
+                </a:r>
+                <a14:m>
+                  <m:oMath xmlns:m="http://schemas.openxmlformats.org/officeDocument/2006/math">
+                    <m:r>
+                      <a:rPr lang="en-US" i="1">
+                        <a:solidFill>
+                          <a:schemeClr val="tx1"/>
+                        </a:solidFill>
+                        <a:latin typeface="Cambria Math" panose="02040503050406030204" pitchFamily="18" charset="0"/>
+                      </a:rPr>
+                      <m:t>𝑋</m:t>
+                    </m:r>
+                    <m:r>
+                      <a:rPr lang="en-US" i="1">
+                        <a:solidFill>
+                          <a:schemeClr val="tx1"/>
+                        </a:solidFill>
+                        <a:latin typeface="Cambria Math" panose="02040503050406030204" pitchFamily="18" charset="0"/>
+                      </a:rPr>
+                      <m:t>:</m:t>
+                    </m:r>
+                    <m:r>
+                      <m:rPr>
+                        <m:sty m:val="p"/>
+                      </m:rPr>
+                      <a:rPr lang="el-GR" i="1">
+                        <a:solidFill>
+                          <a:schemeClr val="tx1"/>
+                        </a:solidFill>
+                        <a:latin typeface="Cambria Math" panose="02040503050406030204" pitchFamily="18" charset="0"/>
+                        <a:ea typeface="Cambria Math" panose="02040503050406030204" pitchFamily="18" charset="0"/>
+                      </a:rPr>
+                      <m:t>Ω</m:t>
+                    </m:r>
+                    <m:r>
+                      <a:rPr lang="en-US">
+                        <a:solidFill>
+                          <a:schemeClr val="tx1"/>
+                        </a:solidFill>
+                        <a:latin typeface="Cambria Math" panose="02040503050406030204" pitchFamily="18" charset="0"/>
+                        <a:ea typeface="Cambria Math" panose="02040503050406030204" pitchFamily="18" charset="0"/>
+                      </a:rPr>
+                      <m:t>→</m:t>
+                    </m:r>
+                    <m:r>
+                      <a:rPr lang="en-US" i="1">
+                        <a:solidFill>
+                          <a:schemeClr val="tx1"/>
+                        </a:solidFill>
+                        <a:latin typeface="Cambria Math" panose="02040503050406030204" pitchFamily="18" charset="0"/>
+                        <a:ea typeface="Cambria Math" panose="02040503050406030204" pitchFamily="18" charset="0"/>
+                      </a:rPr>
+                      <m:t>ℝ</m:t>
+                    </m:r>
+                  </m:oMath>
+                </a14:m>
+                <a:r>
+                  <a:rPr lang="en-US" dirty="0">
+                    <a:solidFill>
+                      <a:schemeClr val="tx1"/>
+                    </a:solidFill>
+                  </a:rPr>
+                  <a:t>, </a:t>
+                </a:r>
+                <a:br>
+                  <a:rPr lang="en-US" dirty="0">
+                    <a:solidFill>
+                      <a:schemeClr val="tx1"/>
+                    </a:solidFill>
+                  </a:rPr>
+                </a:br>
+                <a14:m>
+                  <m:oMath xmlns:m="http://schemas.openxmlformats.org/officeDocument/2006/math">
+                    <m:nary>
+                      <m:naryPr>
+                        <m:limLoc m:val="undOvr"/>
+                        <m:subHide m:val="on"/>
+                        <m:supHide m:val="on"/>
+                        <m:ctrlPr>
+                          <a:rPr lang="en-US" i="1">
+                            <a:solidFill>
+                              <a:schemeClr val="tx1"/>
+                            </a:solidFill>
+                            <a:latin typeface="Cambria Math" panose="02040503050406030204" pitchFamily="18" charset="0"/>
+                          </a:rPr>
+                        </m:ctrlPr>
+                      </m:naryPr>
+                      <m:sub/>
+                      <m:sup/>
+                      <m:e>
+                        <m:r>
+                          <a:rPr lang="en-US" i="1">
+                            <a:solidFill>
+                              <a:schemeClr val="tx1"/>
+                            </a:solidFill>
+                            <a:latin typeface="Cambria Math" panose="02040503050406030204" pitchFamily="18" charset="0"/>
+                          </a:rPr>
+                          <m:t>𝑋</m:t>
+                        </m:r>
+                      </m:e>
+                    </m:nary>
+                    <m:r>
+                      <a:rPr lang="en-US" i="1">
+                        <a:solidFill>
+                          <a:schemeClr val="tx1"/>
+                        </a:solidFill>
+                        <a:latin typeface="Cambria Math" panose="02040503050406030204" pitchFamily="18" charset="0"/>
+                      </a:rPr>
+                      <m:t>ⅆ</m:t>
+                    </m:r>
+                    <m:bar>
+                      <m:barPr>
+                        <m:pos m:val="top"/>
+                        <m:ctrlPr>
+                          <a:rPr lang="en-US" i="1">
+                            <a:solidFill>
+                              <a:schemeClr val="tx1"/>
+                            </a:solidFill>
+                            <a:latin typeface="Cambria Math" panose="02040503050406030204" pitchFamily="18" charset="0"/>
+                          </a:rPr>
+                        </m:ctrlPr>
+                      </m:barPr>
+                      <m:e>
+                        <m:r>
+                          <a:rPr lang="en-US" i="1">
+                            <a:solidFill>
+                              <a:schemeClr val="tx1"/>
+                            </a:solidFill>
+                            <a:latin typeface="Cambria Math" panose="02040503050406030204" pitchFamily="18" charset="0"/>
+                          </a:rPr>
+                          <m:t>𝜇</m:t>
+                        </m:r>
+                      </m:e>
+                    </m:bar>
+                    <m:r>
+                      <a:rPr lang="en-US" i="1">
+                        <a:solidFill>
+                          <a:schemeClr val="tx1"/>
+                        </a:solidFill>
+                        <a:latin typeface="Cambria Math" panose="02040503050406030204" pitchFamily="18" charset="0"/>
+                      </a:rPr>
+                      <m:t>=</m:t>
+                    </m:r>
+                    <m:d>
+                      <m:dPr>
+                        <m:begChr m:val="["/>
+                        <m:endChr m:val="]"/>
+                        <m:ctrlPr>
+                          <a:rPr lang="en-US" i="1">
+                            <a:solidFill>
+                              <a:schemeClr val="tx1"/>
+                            </a:solidFill>
+                            <a:latin typeface="Cambria Math" panose="02040503050406030204" pitchFamily="18" charset="0"/>
+                          </a:rPr>
+                        </m:ctrlPr>
+                      </m:dPr>
+                      <m:e>
+                        <m:func>
+                          <m:funcPr>
+                            <m:ctrlPr>
+                              <a:rPr lang="en-US" i="1">
+                                <a:solidFill>
+                                  <a:schemeClr val="tx1"/>
+                                </a:solidFill>
+                                <a:latin typeface="Cambria Math" panose="02040503050406030204" pitchFamily="18" charset="0"/>
+                              </a:rPr>
+                            </m:ctrlPr>
+                          </m:funcPr>
+                          <m:fName>
+                            <m:limLow>
+                              <m:limLowPr>
+                                <m:ctrlPr>
+                                  <a:rPr lang="en-US" i="1">
+                                    <a:solidFill>
+                                      <a:schemeClr val="tx1"/>
+                                    </a:solidFill>
+                                    <a:latin typeface="Cambria Math" panose="02040503050406030204" pitchFamily="18" charset="0"/>
+                                  </a:rPr>
+                                </m:ctrlPr>
+                              </m:limLowPr>
+                              <m:e>
+                                <m:r>
+                                  <m:rPr>
+                                    <m:sty m:val="p"/>
+                                  </m:rPr>
+                                  <a:rPr lang="en-US">
+                                    <a:solidFill>
+                                      <a:schemeClr val="tx1"/>
+                                    </a:solidFill>
+                                    <a:latin typeface="Cambria Math" panose="02040503050406030204" pitchFamily="18" charset="0"/>
+                                  </a:rPr>
+                                  <m:t>min</m:t>
+                                </m:r>
+                              </m:e>
+                              <m:lim>
+                                <m:r>
+                                  <a:rPr lang="en-US" i="1">
+                                    <a:solidFill>
+                                      <a:schemeClr val="tx1"/>
+                                    </a:solidFill>
+                                    <a:latin typeface="Cambria Math" panose="02040503050406030204" pitchFamily="18" charset="0"/>
+                                  </a:rPr>
+                                  <m:t>𝜇</m:t>
+                                </m:r>
+                                <m:r>
+                                  <a:rPr lang="en-US" i="1">
+                                    <a:solidFill>
+                                      <a:schemeClr val="tx1"/>
+                                    </a:solidFill>
+                                    <a:latin typeface="Cambria Math" panose="02040503050406030204" pitchFamily="18" charset="0"/>
+                                  </a:rPr>
+                                  <m:t>∈</m:t>
+                                </m:r>
+                                <m:r>
+                                  <m:rPr>
+                                    <m:nor/>
+                                  </m:rPr>
+                                  <a:rPr lang="en-US">
+                                    <a:solidFill>
+                                      <a:schemeClr val="tx1"/>
+                                    </a:solidFill>
+                                    <a:latin typeface="Cambria Math" panose="02040503050406030204" pitchFamily="18" charset="0"/>
+                                  </a:rPr>
+                                  <m:t>core</m:t>
+                                </m:r>
+                                <m:d>
+                                  <m:dPr>
+                                    <m:ctrlPr>
+                                      <a:rPr lang="en-US" i="1">
+                                        <a:solidFill>
+                                          <a:schemeClr val="tx1"/>
+                                        </a:solidFill>
+                                        <a:latin typeface="Cambria Math" panose="02040503050406030204" pitchFamily="18" charset="0"/>
+                                      </a:rPr>
+                                    </m:ctrlPr>
+                                  </m:dPr>
+                                  <m:e>
+                                    <m:bar>
+                                      <m:barPr>
+                                        <m:pos m:val="top"/>
+                                        <m:ctrlPr>
+                                          <a:rPr lang="en-US" i="1">
+                                            <a:solidFill>
+                                              <a:schemeClr val="tx1"/>
+                                            </a:solidFill>
+                                            <a:latin typeface="Cambria Math" panose="02040503050406030204" pitchFamily="18" charset="0"/>
+                                          </a:rPr>
+                                        </m:ctrlPr>
+                                      </m:barPr>
+                                      <m:e>
+                                        <m:r>
+                                          <a:rPr lang="en-US" i="1">
+                                            <a:solidFill>
+                                              <a:schemeClr val="tx1"/>
+                                            </a:solidFill>
+                                            <a:latin typeface="Cambria Math" panose="02040503050406030204" pitchFamily="18" charset="0"/>
+                                          </a:rPr>
+                                          <m:t>𝜇</m:t>
+                                        </m:r>
+                                      </m:e>
+                                    </m:bar>
+                                  </m:e>
+                                </m:d>
+                              </m:lim>
+                            </m:limLow>
+                          </m:fName>
+                          <m:e>
+                            <m:nary>
+                              <m:naryPr>
+                                <m:limLoc m:val="undOvr"/>
+                                <m:subHide m:val="on"/>
+                                <m:supHide m:val="on"/>
+                                <m:ctrlPr>
+                                  <a:rPr lang="en-US" i="1">
+                                    <a:solidFill>
+                                      <a:schemeClr val="tx1"/>
+                                    </a:solidFill>
+                                    <a:latin typeface="Cambria Math" panose="02040503050406030204" pitchFamily="18" charset="0"/>
+                                  </a:rPr>
+                                </m:ctrlPr>
+                              </m:naryPr>
+                              <m:sub/>
+                              <m:sup/>
+                              <m:e>
+                                <m:r>
+                                  <a:rPr lang="en-US" i="1">
+                                    <a:solidFill>
+                                      <a:schemeClr val="tx1"/>
+                                    </a:solidFill>
+                                    <a:latin typeface="Cambria Math" panose="02040503050406030204" pitchFamily="18" charset="0"/>
+                                  </a:rPr>
+                                  <m:t>𝑋</m:t>
+                                </m:r>
+                              </m:e>
+                            </m:nary>
+                            <m:r>
+                              <a:rPr lang="en-US" i="1">
+                                <a:solidFill>
+                                  <a:schemeClr val="tx1"/>
+                                </a:solidFill>
+                                <a:latin typeface="Cambria Math" panose="02040503050406030204" pitchFamily="18" charset="0"/>
+                              </a:rPr>
+                              <m:t>ⅆ</m:t>
+                            </m:r>
+                            <m:r>
+                              <a:rPr lang="en-US" i="1">
+                                <a:solidFill>
+                                  <a:schemeClr val="tx1"/>
+                                </a:solidFill>
+                                <a:latin typeface="Cambria Math" panose="02040503050406030204" pitchFamily="18" charset="0"/>
+                              </a:rPr>
+                              <m:t>𝜇</m:t>
+                            </m:r>
+                          </m:e>
+                        </m:func>
+                        <m:r>
+                          <a:rPr lang="en-US" i="1">
+                            <a:solidFill>
+                              <a:schemeClr val="tx1"/>
+                            </a:solidFill>
+                            <a:latin typeface="Cambria Math" panose="02040503050406030204" pitchFamily="18" charset="0"/>
+                          </a:rPr>
+                          <m:t>,</m:t>
+                        </m:r>
+                        <m:func>
+                          <m:funcPr>
+                            <m:ctrlPr>
+                              <a:rPr lang="en-US" i="1">
+                                <a:solidFill>
+                                  <a:schemeClr val="tx1"/>
+                                </a:solidFill>
+                                <a:latin typeface="Cambria Math" panose="02040503050406030204" pitchFamily="18" charset="0"/>
+                              </a:rPr>
+                            </m:ctrlPr>
+                          </m:funcPr>
+                          <m:fName>
+                            <m:limLow>
+                              <m:limLowPr>
+                                <m:ctrlPr>
+                                  <a:rPr lang="en-US" i="1">
+                                    <a:solidFill>
+                                      <a:schemeClr val="tx1"/>
+                                    </a:solidFill>
+                                    <a:latin typeface="Cambria Math" panose="02040503050406030204" pitchFamily="18" charset="0"/>
+                                  </a:rPr>
+                                </m:ctrlPr>
+                              </m:limLowPr>
+                              <m:e>
+                                <m:r>
+                                  <m:rPr>
+                                    <m:sty m:val="p"/>
+                                  </m:rPr>
+                                  <a:rPr lang="en-US">
+                                    <a:solidFill>
+                                      <a:schemeClr val="tx1"/>
+                                    </a:solidFill>
+                                    <a:latin typeface="Cambria Math" panose="02040503050406030204" pitchFamily="18" charset="0"/>
+                                  </a:rPr>
+                                  <m:t>m</m:t>
+                                </m:r>
+                                <m:r>
+                                  <m:rPr>
+                                    <m:sty m:val="p"/>
+                                  </m:rPr>
+                                  <a:rPr lang="en-US">
+                                    <a:solidFill>
+                                      <a:schemeClr val="tx1"/>
+                                    </a:solidFill>
+                                    <a:latin typeface="Cambria Math" panose="02040503050406030204" pitchFamily="18" charset="0"/>
+                                  </a:rPr>
+                                  <m:t>ax</m:t>
+                                </m:r>
+                              </m:e>
+                              <m:lim>
+                                <m:r>
+                                  <a:rPr lang="en-US" i="1">
+                                    <a:solidFill>
+                                      <a:schemeClr val="tx1"/>
+                                    </a:solidFill>
+                                    <a:latin typeface="Cambria Math" panose="02040503050406030204" pitchFamily="18" charset="0"/>
+                                  </a:rPr>
+                                  <m:t>𝜇</m:t>
+                                </m:r>
+                                <m:r>
+                                  <a:rPr lang="en-US" i="1">
+                                    <a:solidFill>
+                                      <a:schemeClr val="tx1"/>
+                                    </a:solidFill>
+                                    <a:latin typeface="Cambria Math" panose="02040503050406030204" pitchFamily="18" charset="0"/>
+                                  </a:rPr>
+                                  <m:t>∈</m:t>
+                                </m:r>
+                                <m:r>
+                                  <m:rPr>
+                                    <m:nor/>
+                                  </m:rPr>
+                                  <a:rPr lang="en-US">
+                                    <a:solidFill>
+                                      <a:schemeClr val="tx1"/>
+                                    </a:solidFill>
+                                    <a:latin typeface="Cambria Math" panose="02040503050406030204" pitchFamily="18" charset="0"/>
+                                  </a:rPr>
+                                  <m:t>core</m:t>
+                                </m:r>
+                                <m:d>
+                                  <m:dPr>
+                                    <m:ctrlPr>
+                                      <a:rPr lang="en-US" i="1">
+                                        <a:solidFill>
+                                          <a:schemeClr val="tx1"/>
+                                        </a:solidFill>
+                                        <a:latin typeface="Cambria Math" panose="02040503050406030204" pitchFamily="18" charset="0"/>
+                                      </a:rPr>
+                                    </m:ctrlPr>
+                                  </m:dPr>
+                                  <m:e>
+                                    <m:bar>
+                                      <m:barPr>
+                                        <m:pos m:val="top"/>
+                                        <m:ctrlPr>
+                                          <a:rPr lang="en-US" i="1">
+                                            <a:solidFill>
+                                              <a:schemeClr val="tx1"/>
+                                            </a:solidFill>
+                                            <a:latin typeface="Cambria Math" panose="02040503050406030204" pitchFamily="18" charset="0"/>
+                                          </a:rPr>
+                                        </m:ctrlPr>
+                                      </m:barPr>
+                                      <m:e>
+                                        <m:r>
+                                          <a:rPr lang="en-US" i="1">
+                                            <a:solidFill>
+                                              <a:schemeClr val="tx1"/>
+                                            </a:solidFill>
+                                            <a:latin typeface="Cambria Math" panose="02040503050406030204" pitchFamily="18" charset="0"/>
+                                          </a:rPr>
+                                          <m:t>𝜇</m:t>
+                                        </m:r>
+                                      </m:e>
+                                    </m:bar>
+                                  </m:e>
+                                </m:d>
+                              </m:lim>
+                            </m:limLow>
+                          </m:fName>
+                          <m:e>
+                            <m:nary>
+                              <m:naryPr>
+                                <m:limLoc m:val="undOvr"/>
+                                <m:subHide m:val="on"/>
+                                <m:supHide m:val="on"/>
+                                <m:ctrlPr>
+                                  <a:rPr lang="en-US" i="1">
+                                    <a:solidFill>
+                                      <a:schemeClr val="tx1"/>
+                                    </a:solidFill>
+                                    <a:latin typeface="Cambria Math" panose="02040503050406030204" pitchFamily="18" charset="0"/>
+                                  </a:rPr>
+                                </m:ctrlPr>
+                              </m:naryPr>
+                              <m:sub/>
+                              <m:sup/>
+                              <m:e>
+                                <m:r>
+                                  <a:rPr lang="en-US" i="1">
+                                    <a:solidFill>
+                                      <a:schemeClr val="tx1"/>
+                                    </a:solidFill>
+                                    <a:latin typeface="Cambria Math" panose="02040503050406030204" pitchFamily="18" charset="0"/>
+                                  </a:rPr>
+                                  <m:t>𝑋</m:t>
+                                </m:r>
+                              </m:e>
+                            </m:nary>
+                            <m:r>
+                              <a:rPr lang="en-US" i="1">
+                                <a:solidFill>
+                                  <a:schemeClr val="tx1"/>
+                                </a:solidFill>
+                                <a:latin typeface="Cambria Math" panose="02040503050406030204" pitchFamily="18" charset="0"/>
+                              </a:rPr>
+                              <m:t>ⅆ</m:t>
+                            </m:r>
+                            <m:r>
+                              <a:rPr lang="en-US" i="1">
+                                <a:solidFill>
+                                  <a:schemeClr val="tx1"/>
+                                </a:solidFill>
+                                <a:latin typeface="Cambria Math" panose="02040503050406030204" pitchFamily="18" charset="0"/>
+                              </a:rPr>
+                              <m:t>𝜇</m:t>
+                            </m:r>
+                          </m:e>
+                        </m:func>
+                      </m:e>
+                    </m:d>
+                  </m:oMath>
+                </a14:m>
+                <a:endParaRPr lang="en-US" dirty="0"/>
+              </a:p>
+            </p:txBody>
+          </p:sp>
+        </mc:Choice>
+        <mc:Fallback>
+          <p:sp>
+            <p:nvSpPr>
+              <p:cNvPr id="4" name="Content Placeholder 3"/>
+              <p:cNvSpPr>
+                <a:spLocks noGrp="1" noRot="1" noChangeAspect="1" noMove="1" noResize="1" noEditPoints="1" noAdjustHandles="1" noChangeArrowheads="1" noChangeShapeType="1" noTextEdit="1"/>
+              </p:cNvSpPr>
+              <p:nvPr>
+                <p:ph sz="half" idx="2"/>
+              </p:nvPr>
+            </p:nvSpPr>
+            <p:spPr>
+              <a:blipFill rotWithShape="0">
+                <a:blip r:embed="rId2"/>
+                <a:stretch>
+                  <a:fillRect l="-1655" t="-2815" r="-3310"/>
+                </a:stretch>
+              </a:blipFill>
+            </p:spPr>
+            <p:txBody>
+              <a:bodyPr/>
+              <a:lstStyle/>
+              <a:p>
+                <a:r>
+                  <a:rPr lang="en-US">
+                    <a:noFill/>
+                  </a:rPr>
+                  <a:t> </a:t>
+                </a:r>
+              </a:p>
+            </p:txBody>
+          </p:sp>
+        </mc:Fallback>
+      </mc:AlternateContent>
+      <p:sp>
+        <p:nvSpPr>
+          <p:cNvPr id="5" name="Text Placeholder 4"/>
+          <p:cNvSpPr>
+            <a:spLocks noGrp="1"/>
+          </p:cNvSpPr>
+          <p:nvPr>
+            <p:ph type="body" sz="quarter" idx="3"/>
+          </p:nvPr>
+        </p:nvSpPr>
+        <p:spPr/>
+        <p:txBody>
+          <a:bodyPr/>
+          <a:lstStyle/>
+          <a:p>
+            <a:r>
+              <a:rPr lang="en-US" dirty="0" smtClean="0">
+                <a:solidFill>
+                  <a:srgbClr val="FF0000"/>
+                </a:solidFill>
+              </a:rPr>
+              <a:t>Quantum</a:t>
+            </a:r>
+            <a:r>
+              <a:rPr lang="en-US" dirty="0" smtClean="0"/>
+              <a:t> </a:t>
+            </a:r>
+            <a:r>
+              <a:rPr lang="en-US" dirty="0"/>
+              <a:t>Interval-Valued Probability Measure </a:t>
+            </a:r>
+            <a:r>
+              <a:rPr lang="en-US" dirty="0" smtClean="0"/>
+              <a:t>(</a:t>
+            </a:r>
+            <a:r>
+              <a:rPr lang="en-US" dirty="0" smtClean="0">
+                <a:solidFill>
+                  <a:srgbClr val="FF0000"/>
+                </a:solidFill>
+              </a:rPr>
+              <a:t>Q</a:t>
+            </a:r>
+            <a:r>
+              <a:rPr lang="en-US" dirty="0" smtClean="0"/>
+              <a:t>IVPM)</a:t>
+            </a:r>
+            <a:endParaRPr lang="en-US" dirty="0"/>
+          </a:p>
+        </p:txBody>
+      </p:sp>
+      <mc:AlternateContent xmlns:mc="http://schemas.openxmlformats.org/markup-compatibility/2006">
+        <mc:Choice xmlns:a14="http://schemas.microsoft.com/office/drawing/2010/main" Requires="a14">
+          <p:sp>
+            <p:nvSpPr>
+              <p:cNvPr id="6" name="Content Placeholder 5"/>
+              <p:cNvSpPr>
+                <a:spLocks noGrp="1"/>
+              </p:cNvSpPr>
+              <p:nvPr>
+                <p:ph sz="quarter" idx="4"/>
+              </p:nvPr>
+            </p:nvSpPr>
+            <p:spPr/>
+            <p:txBody>
+              <a:bodyPr>
+                <a:normAutofit fontScale="85000" lnSpcReduction="10000"/>
+              </a:bodyPr>
+              <a:lstStyle/>
+              <a:p>
+                <a:pPr>
+                  <a:lnSpc>
+                    <a:spcPct val="100000"/>
+                  </a:lnSpc>
+                </a:pPr>
+                <a:r>
+                  <a:rPr lang="en-US" dirty="0" smtClean="0"/>
+                  <a:t>For every convex QIVPM</a:t>
+                </a:r>
+                <a:r>
+                  <a:rPr lang="en-US" dirty="0"/>
+                  <a:t> </a:t>
+                </a:r>
+                <a14:m>
+                  <m:oMath xmlns:m="http://schemas.openxmlformats.org/officeDocument/2006/math">
+                    <m:bar>
+                      <m:barPr>
+                        <m:pos m:val="top"/>
+                        <m:ctrlPr>
+                          <a:rPr lang="en-US" i="1">
+                            <a:latin typeface="Cambria Math" panose="02040503050406030204" pitchFamily="18" charset="0"/>
+                          </a:rPr>
+                        </m:ctrlPr>
+                      </m:barPr>
+                      <m:e>
+                        <m:r>
+                          <a:rPr lang="en-US" i="1">
+                            <a:latin typeface="Cambria Math" panose="02040503050406030204" pitchFamily="18" charset="0"/>
+                          </a:rPr>
+                          <m:t>𝜇</m:t>
+                        </m:r>
+                      </m:e>
+                    </m:bar>
+                    <m:r>
+                      <a:rPr lang="en-US" i="1">
+                        <a:latin typeface="Cambria Math" panose="02040503050406030204" pitchFamily="18" charset="0"/>
+                      </a:rPr>
+                      <m:t>:</m:t>
+                    </m:r>
+                    <m:r>
+                      <a:rPr lang="en-US" i="1">
+                        <a:latin typeface="Cambria Math" panose="02040503050406030204" pitchFamily="18" charset="0"/>
+                        <a:ea typeface="Cambria Math" panose="02040503050406030204" pitchFamily="18" charset="0"/>
+                      </a:rPr>
+                      <m:t>ℰ</m:t>
+                    </m:r>
+                    <m:r>
+                      <a:rPr lang="en-US">
+                        <a:latin typeface="Cambria Math" panose="02040503050406030204" pitchFamily="18" charset="0"/>
+                        <a:ea typeface="Cambria Math" panose="02040503050406030204" pitchFamily="18" charset="0"/>
+                      </a:rPr>
+                      <m:t>→</m:t>
+                    </m:r>
+                    <m:d>
+                      <m:dPr>
+                        <m:begChr m:val=""/>
+                        <m:endChr m:val=""/>
+                        <m:ctrlPr>
+                          <a:rPr lang="en-US" i="1">
+                            <a:latin typeface="Cambria Math" panose="02040503050406030204" pitchFamily="18" charset="0"/>
+                            <a:ea typeface="Cambria Math" panose="02040503050406030204" pitchFamily="18" charset="0"/>
+                            <a:cs typeface="XITS Math" panose="02000503000000000000" pitchFamily="50" charset="0"/>
+                          </a:rPr>
+                        </m:ctrlPr>
+                      </m:dPr>
+                      <m:e>
+                        <m:r>
+                          <a:rPr lang="en-US" i="1">
+                            <a:latin typeface="XITS Math" panose="02000503000000000000" pitchFamily="50" charset="0"/>
+                            <a:ea typeface="XITS Math" panose="02000503000000000000" pitchFamily="50" charset="0"/>
+                            <a:cs typeface="XITS Math" panose="02000503000000000000" pitchFamily="50" charset="0"/>
+                          </a:rPr>
+                          <m:t>ℐ</m:t>
+                        </m:r>
+                      </m:e>
+                    </m:d>
+                  </m:oMath>
+                </a14:m>
+                <a:r>
+                  <a:rPr lang="en-US" dirty="0"/>
+                  <a:t> and any </a:t>
+                </a:r>
+                <a:r>
+                  <a:rPr lang="en-US" dirty="0" smtClean="0"/>
+                  <a:t>observable</a:t>
+                </a:r>
+                <a:r>
+                  <a:rPr lang="en-US" dirty="0"/>
+                  <a:t> </a:t>
+                </a:r>
+                <a14:m>
+                  <m:oMath xmlns:m="http://schemas.openxmlformats.org/officeDocument/2006/math">
+                    <m:r>
+                      <a:rPr lang="en-US" b="1" i="0" smtClean="0">
+                        <a:latin typeface="Cambria Math" panose="02040503050406030204" pitchFamily="18" charset="0"/>
+                      </a:rPr>
+                      <m:t>𝐎</m:t>
+                    </m:r>
+                    <m:r>
+                      <a:rPr lang="en-US" b="0" i="1" smtClean="0">
+                        <a:latin typeface="Cambria Math" panose="02040503050406030204" pitchFamily="18" charset="0"/>
+                      </a:rPr>
+                      <m:t>=</m:t>
+                    </m:r>
+                    <m:nary>
+                      <m:naryPr>
+                        <m:chr m:val="∑"/>
+                        <m:ctrlPr>
+                          <a:rPr lang="en-US" b="0" i="1" smtClean="0">
+                            <a:latin typeface="Cambria Math" panose="02040503050406030204" pitchFamily="18" charset="0"/>
+                          </a:rPr>
+                        </m:ctrlPr>
+                      </m:naryPr>
+                      <m:sub>
+                        <m:r>
+                          <a:rPr lang="en-US" b="0" i="1" smtClean="0">
+                            <a:latin typeface="Cambria Math" panose="02040503050406030204" pitchFamily="18" charset="0"/>
+                          </a:rPr>
+                          <m:t>𝑖</m:t>
+                        </m:r>
+                        <m:r>
+                          <a:rPr lang="en-US" b="0" i="1" smtClean="0">
+                            <a:latin typeface="Cambria Math" panose="02040503050406030204" pitchFamily="18" charset="0"/>
+                          </a:rPr>
+                          <m:t>=1</m:t>
+                        </m:r>
+                      </m:sub>
+                      <m:sup>
+                        <m:r>
+                          <a:rPr lang="en-US" b="0" i="1" smtClean="0">
+                            <a:latin typeface="Cambria Math" panose="02040503050406030204" pitchFamily="18" charset="0"/>
+                          </a:rPr>
+                          <m:t>𝑁</m:t>
+                        </m:r>
+                      </m:sup>
+                      <m:e>
+                        <m:sSub>
+                          <m:sSubPr>
+                            <m:ctrlPr>
+                              <a:rPr lang="en-US" b="0" i="1" smtClean="0">
+                                <a:latin typeface="Cambria Math" panose="02040503050406030204" pitchFamily="18" charset="0"/>
+                              </a:rPr>
+                            </m:ctrlPr>
+                          </m:sSubPr>
+                          <m:e>
+                            <m:r>
+                              <a:rPr lang="en-US" b="0" i="1" smtClean="0">
+                                <a:latin typeface="Cambria Math" panose="02040503050406030204" pitchFamily="18" charset="0"/>
+                              </a:rPr>
+                              <m:t>𝜆</m:t>
+                            </m:r>
+                          </m:e>
+                          <m:sub>
+                            <m:r>
+                              <a:rPr lang="en-US" b="0" i="1" smtClean="0">
+                                <a:latin typeface="Cambria Math" panose="02040503050406030204" pitchFamily="18" charset="0"/>
+                              </a:rPr>
+                              <m:t>𝑖</m:t>
+                            </m:r>
+                          </m:sub>
+                        </m:sSub>
+                        <m:sSub>
+                          <m:sSubPr>
+                            <m:ctrlPr>
+                              <a:rPr lang="en-US" b="0" i="1" smtClean="0">
+                                <a:latin typeface="Cambria Math" panose="02040503050406030204" pitchFamily="18" charset="0"/>
+                              </a:rPr>
+                            </m:ctrlPr>
+                          </m:sSubPr>
+                          <m:e>
+                            <m:r>
+                              <a:rPr lang="en-US" b="0" i="1" smtClean="0">
+                                <a:latin typeface="Cambria Math" panose="02040503050406030204" pitchFamily="18" charset="0"/>
+                              </a:rPr>
+                              <m:t>𝑃</m:t>
+                            </m:r>
+                          </m:e>
+                          <m:sub>
+                            <m:r>
+                              <a:rPr lang="en-US" b="0" i="1" smtClean="0">
+                                <a:latin typeface="Cambria Math" panose="02040503050406030204" pitchFamily="18" charset="0"/>
+                              </a:rPr>
+                              <m:t>𝑖</m:t>
+                            </m:r>
+                          </m:sub>
+                        </m:sSub>
+                      </m:e>
+                    </m:nary>
+                  </m:oMath>
+                </a14:m>
+                <a:r>
+                  <a:rPr lang="en-US" dirty="0" smtClean="0"/>
+                  <a:t> (spectral decomposition), </a:t>
+                </a:r>
+                <a:r>
+                  <a:rPr lang="en-US" dirty="0"/>
+                  <a:t/>
+                </a:r>
+                <a:br>
+                  <a:rPr lang="en-US" dirty="0"/>
+                </a:br>
+                <a14:m>
+                  <m:oMath xmlns:m="http://schemas.openxmlformats.org/officeDocument/2006/math">
+                    <m:nary>
+                      <m:naryPr>
+                        <m:limLoc m:val="undOvr"/>
+                        <m:subHide m:val="on"/>
+                        <m:supHide m:val="on"/>
+                        <m:ctrlPr>
+                          <a:rPr lang="en-US" i="1">
+                            <a:latin typeface="Cambria Math" panose="02040503050406030204" pitchFamily="18" charset="0"/>
+                          </a:rPr>
+                        </m:ctrlPr>
+                      </m:naryPr>
+                      <m:sub/>
+                      <m:sup/>
+                      <m:e>
+                        <m:r>
+                          <a:rPr lang="en-US" i="1">
+                            <a:latin typeface="Cambria Math" panose="02040503050406030204" pitchFamily="18" charset="0"/>
+                          </a:rPr>
+                          <m:t>𝑋</m:t>
+                        </m:r>
+                      </m:e>
+                    </m:nary>
+                    <m:r>
+                      <a:rPr lang="en-US" i="1">
+                        <a:latin typeface="Cambria Math" panose="02040503050406030204" pitchFamily="18" charset="0"/>
+                      </a:rPr>
+                      <m:t>ⅆ</m:t>
+                    </m:r>
+                    <m:bar>
+                      <m:barPr>
+                        <m:pos m:val="top"/>
+                        <m:ctrlPr>
+                          <a:rPr lang="en-US" i="1">
+                            <a:latin typeface="Cambria Math" panose="02040503050406030204" pitchFamily="18" charset="0"/>
+                          </a:rPr>
+                        </m:ctrlPr>
+                      </m:barPr>
+                      <m:e>
+                        <m:r>
+                          <a:rPr lang="en-US" i="1">
+                            <a:latin typeface="Cambria Math" panose="02040503050406030204" pitchFamily="18" charset="0"/>
+                          </a:rPr>
+                          <m:t>𝜇</m:t>
+                        </m:r>
+                      </m:e>
+                    </m:bar>
+                    <m:r>
+                      <a:rPr lang="en-US" i="1">
+                        <a:latin typeface="Cambria Math" panose="02040503050406030204" pitchFamily="18" charset="0"/>
+                      </a:rPr>
+                      <m:t>=</m:t>
+                    </m:r>
+                    <m:d>
+                      <m:dPr>
+                        <m:begChr m:val="["/>
+                        <m:endChr m:val="]"/>
+                        <m:ctrlPr>
+                          <a:rPr lang="en-US" i="1">
+                            <a:latin typeface="Cambria Math" panose="02040503050406030204" pitchFamily="18" charset="0"/>
+                          </a:rPr>
+                        </m:ctrlPr>
+                      </m:dPr>
+                      <m:e>
+                        <m:func>
+                          <m:funcPr>
+                            <m:ctrlPr>
+                              <a:rPr lang="en-US" i="1">
+                                <a:latin typeface="Cambria Math" panose="02040503050406030204" pitchFamily="18" charset="0"/>
+                              </a:rPr>
+                            </m:ctrlPr>
+                          </m:funcPr>
+                          <m:fName>
+                            <m:limLow>
+                              <m:limLowPr>
+                                <m:ctrlPr>
+                                  <a:rPr lang="en-US" i="1">
+                                    <a:latin typeface="Cambria Math" panose="02040503050406030204" pitchFamily="18" charset="0"/>
+                                  </a:rPr>
+                                </m:ctrlPr>
+                              </m:limLowPr>
+                              <m:e>
+                                <m:r>
+                                  <m:rPr>
+                                    <m:sty m:val="p"/>
+                                  </m:rPr>
+                                  <a:rPr lang="en-US">
+                                    <a:latin typeface="Cambria Math" panose="02040503050406030204" pitchFamily="18" charset="0"/>
+                                  </a:rPr>
+                                  <m:t>min</m:t>
+                                </m:r>
+                              </m:e>
+                              <m:lim>
+                                <m:r>
+                                  <a:rPr lang="en-US" i="1">
+                                    <a:latin typeface="Cambria Math" panose="02040503050406030204" pitchFamily="18" charset="0"/>
+                                  </a:rPr>
+                                  <m:t>𝜇</m:t>
+                                </m:r>
+                                <m:r>
+                                  <a:rPr lang="en-US" i="1">
+                                    <a:latin typeface="Cambria Math" panose="02040503050406030204" pitchFamily="18" charset="0"/>
+                                  </a:rPr>
+                                  <m:t>∈</m:t>
+                                </m:r>
+                                <m:r>
+                                  <m:rPr>
+                                    <m:nor/>
+                                  </m:rPr>
+                                  <a:rPr lang="en-US">
+                                    <a:latin typeface="Cambria Math" panose="02040503050406030204" pitchFamily="18" charset="0"/>
+                                  </a:rPr>
+                                  <m:t>core</m:t>
+                                </m:r>
+                                <m:d>
+                                  <m:dPr>
+                                    <m:ctrlPr>
+                                      <a:rPr lang="en-US" i="1">
+                                        <a:latin typeface="Cambria Math" panose="02040503050406030204" pitchFamily="18" charset="0"/>
+                                      </a:rPr>
+                                    </m:ctrlPr>
+                                  </m:dPr>
+                                  <m:e>
+                                    <m:bar>
+                                      <m:barPr>
+                                        <m:pos m:val="top"/>
+                                        <m:ctrlPr>
+                                          <a:rPr lang="en-US" i="1">
+                                            <a:latin typeface="Cambria Math" panose="02040503050406030204" pitchFamily="18" charset="0"/>
+                                          </a:rPr>
+                                        </m:ctrlPr>
+                                      </m:barPr>
+                                      <m:e>
+                                        <m:r>
+                                          <a:rPr lang="en-US" i="1">
+                                            <a:latin typeface="Cambria Math" panose="02040503050406030204" pitchFamily="18" charset="0"/>
+                                          </a:rPr>
+                                          <m:t>𝜇</m:t>
+                                        </m:r>
+                                      </m:e>
+                                    </m:bar>
+                                  </m:e>
+                                </m:d>
+                              </m:lim>
+                            </m:limLow>
+                          </m:fName>
+                          <m:e>
+                            <m:nary>
+                              <m:naryPr>
+                                <m:limLoc m:val="undOvr"/>
+                                <m:subHide m:val="on"/>
+                                <m:supHide m:val="on"/>
+                                <m:ctrlPr>
+                                  <a:rPr lang="en-US" i="1">
+                                    <a:latin typeface="Cambria Math" panose="02040503050406030204" pitchFamily="18" charset="0"/>
+                                  </a:rPr>
+                                </m:ctrlPr>
+                              </m:naryPr>
+                              <m:sub/>
+                              <m:sup/>
+                              <m:e>
+                                <m:r>
+                                  <a:rPr lang="en-US" i="1">
+                                    <a:latin typeface="Cambria Math" panose="02040503050406030204" pitchFamily="18" charset="0"/>
+                                  </a:rPr>
+                                  <m:t>𝑋</m:t>
+                                </m:r>
+                              </m:e>
+                            </m:nary>
+                            <m:r>
+                              <a:rPr lang="en-US" i="1">
+                                <a:latin typeface="Cambria Math" panose="02040503050406030204" pitchFamily="18" charset="0"/>
+                              </a:rPr>
+                              <m:t>ⅆ</m:t>
+                            </m:r>
+                            <m:r>
+                              <a:rPr lang="en-US" i="1">
+                                <a:latin typeface="Cambria Math" panose="02040503050406030204" pitchFamily="18" charset="0"/>
+                              </a:rPr>
+                              <m:t>𝜇</m:t>
+                            </m:r>
+                          </m:e>
+                        </m:func>
+                        <m:r>
+                          <a:rPr lang="en-US" i="1">
+                            <a:latin typeface="Cambria Math" panose="02040503050406030204" pitchFamily="18" charset="0"/>
+                          </a:rPr>
+                          <m:t>,</m:t>
+                        </m:r>
+                        <m:func>
+                          <m:funcPr>
+                            <m:ctrlPr>
+                              <a:rPr lang="en-US" i="1">
+                                <a:latin typeface="Cambria Math" panose="02040503050406030204" pitchFamily="18" charset="0"/>
+                              </a:rPr>
+                            </m:ctrlPr>
+                          </m:funcPr>
+                          <m:fName>
+                            <m:limLow>
+                              <m:limLowPr>
+                                <m:ctrlPr>
+                                  <a:rPr lang="en-US" i="1">
+                                    <a:latin typeface="Cambria Math" panose="02040503050406030204" pitchFamily="18" charset="0"/>
+                                  </a:rPr>
+                                </m:ctrlPr>
+                              </m:limLowPr>
+                              <m:e>
+                                <m:r>
+                                  <m:rPr>
+                                    <m:sty m:val="p"/>
+                                  </m:rPr>
+                                  <a:rPr lang="en-US">
+                                    <a:latin typeface="Cambria Math" panose="02040503050406030204" pitchFamily="18" charset="0"/>
+                                  </a:rPr>
+                                  <m:t>max</m:t>
+                                </m:r>
+                              </m:e>
+                              <m:lim>
+                                <m:r>
+                                  <a:rPr lang="en-US" i="1">
+                                    <a:latin typeface="Cambria Math" panose="02040503050406030204" pitchFamily="18" charset="0"/>
+                                  </a:rPr>
+                                  <m:t>𝜇</m:t>
+                                </m:r>
+                                <m:r>
+                                  <a:rPr lang="en-US" i="1">
+                                    <a:latin typeface="Cambria Math" panose="02040503050406030204" pitchFamily="18" charset="0"/>
+                                  </a:rPr>
+                                  <m:t>∈</m:t>
+                                </m:r>
+                                <m:r>
+                                  <m:rPr>
+                                    <m:nor/>
+                                  </m:rPr>
+                                  <a:rPr lang="en-US">
+                                    <a:latin typeface="Cambria Math" panose="02040503050406030204" pitchFamily="18" charset="0"/>
+                                  </a:rPr>
+                                  <m:t>core</m:t>
+                                </m:r>
+                                <m:d>
+                                  <m:dPr>
+                                    <m:ctrlPr>
+                                      <a:rPr lang="en-US" i="1">
+                                        <a:latin typeface="Cambria Math" panose="02040503050406030204" pitchFamily="18" charset="0"/>
+                                      </a:rPr>
+                                    </m:ctrlPr>
+                                  </m:dPr>
+                                  <m:e>
+                                    <m:bar>
+                                      <m:barPr>
+                                        <m:pos m:val="top"/>
+                                        <m:ctrlPr>
+                                          <a:rPr lang="en-US" i="1">
+                                            <a:latin typeface="Cambria Math" panose="02040503050406030204" pitchFamily="18" charset="0"/>
+                                          </a:rPr>
+                                        </m:ctrlPr>
+                                      </m:barPr>
+                                      <m:e>
+                                        <m:r>
+                                          <a:rPr lang="en-US" i="1">
+                                            <a:latin typeface="Cambria Math" panose="02040503050406030204" pitchFamily="18" charset="0"/>
+                                          </a:rPr>
+                                          <m:t>𝜇</m:t>
+                                        </m:r>
+                                      </m:e>
+                                    </m:bar>
+                                  </m:e>
+                                </m:d>
+                              </m:lim>
+                            </m:limLow>
+                          </m:fName>
+                          <m:e>
+                            <m:nary>
+                              <m:naryPr>
+                                <m:limLoc m:val="undOvr"/>
+                                <m:subHide m:val="on"/>
+                                <m:supHide m:val="on"/>
+                                <m:ctrlPr>
+                                  <a:rPr lang="en-US" i="1">
+                                    <a:latin typeface="Cambria Math" panose="02040503050406030204" pitchFamily="18" charset="0"/>
+                                  </a:rPr>
+                                </m:ctrlPr>
+                              </m:naryPr>
+                              <m:sub/>
+                              <m:sup/>
+                              <m:e>
+                                <m:r>
+                                  <a:rPr lang="en-US" i="1">
+                                    <a:latin typeface="Cambria Math" panose="02040503050406030204" pitchFamily="18" charset="0"/>
+                                  </a:rPr>
+                                  <m:t>𝑋</m:t>
+                                </m:r>
+                              </m:e>
+                            </m:nary>
+                            <m:r>
+                              <a:rPr lang="en-US" i="1">
+                                <a:latin typeface="Cambria Math" panose="02040503050406030204" pitchFamily="18" charset="0"/>
+                              </a:rPr>
+                              <m:t>ⅆ</m:t>
+                            </m:r>
+                            <m:r>
+                              <a:rPr lang="en-US" i="1">
+                                <a:latin typeface="Cambria Math" panose="02040503050406030204" pitchFamily="18" charset="0"/>
+                              </a:rPr>
+                              <m:t>𝜇</m:t>
+                            </m:r>
+                          </m:e>
+                        </m:func>
+                      </m:e>
+                    </m:d>
+                  </m:oMath>
+                </a14:m>
+                <a:endParaRPr lang="en-US" dirty="0" smtClean="0"/>
+              </a:p>
+              <a:p>
+                <a:pPr>
+                  <a:lnSpc>
+                    <a:spcPct val="100000"/>
+                  </a:lnSpc>
+                </a:pPr>
+                <a:endParaRPr lang="en-US" dirty="0"/>
+              </a:p>
+            </p:txBody>
+          </p:sp>
+        </mc:Choice>
+        <mc:Fallback>
+          <p:sp>
+            <p:nvSpPr>
+              <p:cNvPr id="6" name="Content Placeholder 5"/>
+              <p:cNvSpPr>
+                <a:spLocks noGrp="1" noRot="1" noChangeAspect="1" noMove="1" noResize="1" noEditPoints="1" noAdjustHandles="1" noChangeArrowheads="1" noChangeShapeType="1" noTextEdit="1"/>
+              </p:cNvSpPr>
+              <p:nvPr>
+                <p:ph sz="quarter" idx="4"/>
+              </p:nvPr>
+            </p:nvSpPr>
+            <p:spPr>
+              <a:blipFill rotWithShape="0">
+                <a:blip r:embed="rId3"/>
+                <a:stretch>
+                  <a:fillRect l="-1647" t="-2318" r="-3059"/>
+                </a:stretch>
+              </a:blipFill>
+            </p:spPr>
+            <p:txBody>
+              <a:bodyPr/>
+              <a:lstStyle/>
+              <a:p>
+                <a:r>
+                  <a:rPr lang="en-US">
+                    <a:noFill/>
+                  </a:rPr>
+                  <a:t> </a:t>
+                </a:r>
+              </a:p>
+            </p:txBody>
+          </p:sp>
+        </mc:Fallback>
+      </mc:AlternateContent>
+    </p:spTree>
+    <p:extLst>
+      <p:ext uri="{BB962C8B-B14F-4D97-AF65-F5344CB8AC3E}">
+        <p14:creationId xmlns:p14="http://schemas.microsoft.com/office/powerpoint/2010/main" val="4139383902"/>
       </p:ext>
     </p:extLst>
   </p:cSld>

</xml_diff>